<commit_message>
Adding final prototype report
</commit_message>
<xml_diff>
--- a/Documents/Documentation/Prototype presentation.pptx
+++ b/Documents/Documentation/Prototype presentation.pptx
@@ -5,21 +5,20 @@
     <p:sldMasterId id="2147483648" r:id="rId1"/>
   </p:sldMasterIdLst>
   <p:notesMasterIdLst>
-    <p:notesMasterId r:id="rId14"/>
+    <p:notesMasterId r:id="rId13"/>
   </p:notesMasterIdLst>
   <p:sldIdLst>
     <p:sldId id="256" r:id="rId2"/>
-    <p:sldId id="260" r:id="rId3"/>
-    <p:sldId id="302" r:id="rId4"/>
-    <p:sldId id="303" r:id="rId5"/>
-    <p:sldId id="305" r:id="rId6"/>
-    <p:sldId id="304" r:id="rId7"/>
-    <p:sldId id="306" r:id="rId8"/>
-    <p:sldId id="309" r:id="rId9"/>
-    <p:sldId id="312" r:id="rId10"/>
-    <p:sldId id="311" r:id="rId11"/>
-    <p:sldId id="310" r:id="rId12"/>
-    <p:sldId id="264" r:id="rId13"/>
+    <p:sldId id="302" r:id="rId3"/>
+    <p:sldId id="303" r:id="rId4"/>
+    <p:sldId id="305" r:id="rId5"/>
+    <p:sldId id="304" r:id="rId6"/>
+    <p:sldId id="306" r:id="rId7"/>
+    <p:sldId id="309" r:id="rId8"/>
+    <p:sldId id="312" r:id="rId9"/>
+    <p:sldId id="311" r:id="rId10"/>
+    <p:sldId id="310" r:id="rId11"/>
+    <p:sldId id="264" r:id="rId12"/>
   </p:sldIdLst>
   <p:sldSz cx="12192000" cy="6858000"/>
   <p:notesSz cx="6858000" cy="9144000"/>
@@ -774,62 +773,6 @@
           <a:bodyPr/>
           <a:lstStyle/>
           <a:p>
-            <a:pPr algn="r"/>
-            <a:r>
-              <a:rPr lang="he-IL" dirty="0" smtClean="0"/>
-              <a:t>* בתרשים הבא ניתן לראות את הארכיטקטורה</a:t>
-            </a:r>
-            <a:r>
-              <a:rPr lang="he-IL" baseline="0" dirty="0" smtClean="0"/>
-              <a:t> הכללית של המערכת.</a:t>
-            </a:r>
-          </a:p>
-          <a:p>
-            <a:pPr algn="r"/>
-            <a:endParaRPr lang="he-IL" baseline="0" dirty="0" smtClean="0"/>
-          </a:p>
-          <a:p>
-            <a:pPr algn="r"/>
-            <a:r>
-              <a:rPr lang="he-IL" baseline="0" dirty="0" smtClean="0"/>
-              <a:t>* האקדחים מתחברים למחשבי השטח אשר מפיצים רשת אלחוטית (הוטספוט)</a:t>
-            </a:r>
-          </a:p>
-          <a:p>
-            <a:pPr algn="r"/>
-            <a:endParaRPr lang="he-IL" baseline="0" dirty="0" smtClean="0"/>
-          </a:p>
-          <a:p>
-            <a:pPr algn="r"/>
-            <a:r>
-              <a:rPr lang="he-IL" baseline="0" dirty="0" smtClean="0"/>
-              <a:t>* מחשבי השטח מתחברים לשרת המרכזרי שמתחבר למסד הנתונים המרכזי.</a:t>
-            </a:r>
-          </a:p>
-          <a:p>
-            <a:pPr algn="r"/>
-            <a:endParaRPr lang="he-IL" baseline="0" dirty="0" smtClean="0"/>
-          </a:p>
-          <a:p>
-            <a:pPr algn="r"/>
-            <a:r>
-              <a:rPr lang="he-IL" baseline="0" dirty="0" smtClean="0"/>
-              <a:t>* מצד שמאל ניתן לראות את  המסך של אפליקצית השו"ב שנמצאת על מחשב השליטה</a:t>
-            </a:r>
-          </a:p>
-          <a:p>
-            <a:pPr algn="r"/>
-            <a:endParaRPr lang="he-IL" baseline="0" dirty="0" smtClean="0"/>
-          </a:p>
-          <a:p>
-            <a:pPr algn="r"/>
-            <a:r>
-              <a:rPr lang="he-IL" baseline="0" dirty="0" smtClean="0"/>
-              <a:t>* בנוסף, ניתן לראות גרף רראמן לדוגמא שהאקדח פולט</a:t>
-            </a:r>
-          </a:p>
-          <a:p>
-            <a:pPr algn="r"/>
             <a:endParaRPr lang="en-US" dirty="0"/>
           </a:p>
         </p:txBody>
@@ -851,7 +794,7 @@
           <a:p>
             <a:fld id="{305265CD-E972-4CA7-8CB3-4CBC876448DE}" type="slidenum">
               <a:rPr lang="he-IL" smtClean="0"/>
-              <a:t>6</a:t>
+              <a:t>4</a:t>
             </a:fld>
             <a:endParaRPr lang="he-IL"/>
           </a:p>
@@ -860,7 +803,7 @@
     </p:spTree>
     <p:extLst>
       <p:ext uri="{BB962C8B-B14F-4D97-AF65-F5344CB8AC3E}">
-        <p14:creationId xmlns:p14="http://schemas.microsoft.com/office/powerpoint/2010/main" val="68329780"/>
+        <p14:creationId xmlns:p14="http://schemas.microsoft.com/office/powerpoint/2010/main" val="1723511126"/>
       </p:ext>
     </p:extLst>
   </p:cSld>
@@ -914,6 +857,62 @@
           <a:bodyPr/>
           <a:lstStyle/>
           <a:p>
+            <a:pPr algn="r"/>
+            <a:r>
+              <a:rPr lang="he-IL" dirty="0" smtClean="0"/>
+              <a:t>* בתרשים הבא ניתן לראות את הארכיטקטורה</a:t>
+            </a:r>
+            <a:r>
+              <a:rPr lang="he-IL" baseline="0" dirty="0" smtClean="0"/>
+              <a:t> הכללית של המערכת.</a:t>
+            </a:r>
+          </a:p>
+          <a:p>
+            <a:pPr algn="r"/>
+            <a:endParaRPr lang="he-IL" baseline="0" dirty="0" smtClean="0"/>
+          </a:p>
+          <a:p>
+            <a:pPr algn="r"/>
+            <a:r>
+              <a:rPr lang="he-IL" baseline="0" dirty="0" smtClean="0"/>
+              <a:t>* האקדחים מתחברים למחשבי השטח אשר מפיצים רשת אלחוטית (הוטספוט)</a:t>
+            </a:r>
+          </a:p>
+          <a:p>
+            <a:pPr algn="r"/>
+            <a:endParaRPr lang="he-IL" baseline="0" dirty="0" smtClean="0"/>
+          </a:p>
+          <a:p>
+            <a:pPr algn="r"/>
+            <a:r>
+              <a:rPr lang="he-IL" baseline="0" dirty="0" smtClean="0"/>
+              <a:t>* מחשבי השטח מתחברים לשרת המרכזרי שמתחבר למסד הנתונים המרכזי.</a:t>
+            </a:r>
+          </a:p>
+          <a:p>
+            <a:pPr algn="r"/>
+            <a:endParaRPr lang="he-IL" baseline="0" dirty="0" smtClean="0"/>
+          </a:p>
+          <a:p>
+            <a:pPr algn="r"/>
+            <a:r>
+              <a:rPr lang="he-IL" baseline="0" dirty="0" smtClean="0"/>
+              <a:t>* מצד שמאל ניתן לראות את  המסך של אפליקצית השו"ב שנמצאת על מחשב השליטה</a:t>
+            </a:r>
+          </a:p>
+          <a:p>
+            <a:pPr algn="r"/>
+            <a:endParaRPr lang="he-IL" baseline="0" dirty="0" smtClean="0"/>
+          </a:p>
+          <a:p>
+            <a:pPr algn="r"/>
+            <a:r>
+              <a:rPr lang="he-IL" baseline="0" dirty="0" smtClean="0"/>
+              <a:t>* בנוסף, ניתן לראות גרף רראמן לדוגמא שהאקדח פולט</a:t>
+            </a:r>
+          </a:p>
+          <a:p>
+            <a:pPr algn="r"/>
             <a:endParaRPr lang="en-US" dirty="0"/>
           </a:p>
         </p:txBody>
@@ -935,7 +934,7 @@
           <a:p>
             <a:fld id="{305265CD-E972-4CA7-8CB3-4CBC876448DE}" type="slidenum">
               <a:rPr lang="he-IL" smtClean="0"/>
-              <a:t>7</a:t>
+              <a:t>5</a:t>
             </a:fld>
             <a:endParaRPr lang="he-IL"/>
           </a:p>
@@ -944,7 +943,7 @@
     </p:spTree>
     <p:extLst>
       <p:ext uri="{BB962C8B-B14F-4D97-AF65-F5344CB8AC3E}">
-        <p14:creationId xmlns:p14="http://schemas.microsoft.com/office/powerpoint/2010/main" val="1895536430"/>
+        <p14:creationId xmlns:p14="http://schemas.microsoft.com/office/powerpoint/2010/main" val="68329780"/>
       </p:ext>
     </p:extLst>
   </p:cSld>
@@ -998,6 +997,174 @@
           <a:bodyPr/>
           <a:lstStyle/>
           <a:p>
+            <a:endParaRPr lang="en-US" dirty="0"/>
+          </a:p>
+        </p:txBody>
+      </p:sp>
+      <p:sp>
+        <p:nvSpPr>
+          <p:cNvPr id="4" name="Slide Number Placeholder 3"/>
+          <p:cNvSpPr>
+            <a:spLocks noGrp="1"/>
+          </p:cNvSpPr>
+          <p:nvPr>
+            <p:ph type="sldNum" sz="quarter" idx="10"/>
+          </p:nvPr>
+        </p:nvSpPr>
+        <p:spPr/>
+        <p:txBody>
+          <a:bodyPr/>
+          <a:lstStyle/>
+          <a:p>
+            <a:fld id="{305265CD-E972-4CA7-8CB3-4CBC876448DE}" type="slidenum">
+              <a:rPr lang="he-IL" smtClean="0"/>
+              <a:t>6</a:t>
+            </a:fld>
+            <a:endParaRPr lang="he-IL"/>
+          </a:p>
+        </p:txBody>
+      </p:sp>
+    </p:spTree>
+    <p:extLst>
+      <p:ext uri="{BB962C8B-B14F-4D97-AF65-F5344CB8AC3E}">
+        <p14:creationId xmlns:p14="http://schemas.microsoft.com/office/powerpoint/2010/main" val="1895536430"/>
+      </p:ext>
+    </p:extLst>
+  </p:cSld>
+  <p:clrMapOvr>
+    <a:masterClrMapping/>
+  </p:clrMapOvr>
+</p:notes>
+</file>
+
+<file path=ppt/notesSlides/notesSlide5.xml><?xml version="1.0" encoding="utf-8"?>
+<p:notes xmlns:a="http://schemas.openxmlformats.org/drawingml/2006/main" xmlns:r="http://schemas.openxmlformats.org/officeDocument/2006/relationships" xmlns:p="http://schemas.openxmlformats.org/presentationml/2006/main">
+  <p:cSld>
+    <p:spTree>
+      <p:nvGrpSpPr>
+        <p:cNvPr id="1" name=""/>
+        <p:cNvGrpSpPr/>
+        <p:nvPr/>
+      </p:nvGrpSpPr>
+      <p:grpSpPr>
+        <a:xfrm>
+          <a:off x="0" y="0"/>
+          <a:ext cx="0" cy="0"/>
+          <a:chOff x="0" y="0"/>
+          <a:chExt cx="0" cy="0"/>
+        </a:xfrm>
+      </p:grpSpPr>
+      <p:sp>
+        <p:nvSpPr>
+          <p:cNvPr id="2" name="Slide Image Placeholder 1"/>
+          <p:cNvSpPr>
+            <a:spLocks noGrp="1" noRot="1" noChangeAspect="1"/>
+          </p:cNvSpPr>
+          <p:nvPr>
+            <p:ph type="sldImg"/>
+          </p:nvPr>
+        </p:nvSpPr>
+        <p:spPr/>
+      </p:sp>
+      <p:sp>
+        <p:nvSpPr>
+          <p:cNvPr id="3" name="Notes Placeholder 2"/>
+          <p:cNvSpPr>
+            <a:spLocks noGrp="1"/>
+          </p:cNvSpPr>
+          <p:nvPr>
+            <p:ph type="body" idx="1"/>
+          </p:nvPr>
+        </p:nvSpPr>
+        <p:spPr/>
+        <p:txBody>
+          <a:bodyPr/>
+          <a:lstStyle/>
+          <a:p>
+            <a:endParaRPr lang="en-US" dirty="0"/>
+          </a:p>
+        </p:txBody>
+      </p:sp>
+      <p:sp>
+        <p:nvSpPr>
+          <p:cNvPr id="4" name="Slide Number Placeholder 3"/>
+          <p:cNvSpPr>
+            <a:spLocks noGrp="1"/>
+          </p:cNvSpPr>
+          <p:nvPr>
+            <p:ph type="sldNum" sz="quarter" idx="10"/>
+          </p:nvPr>
+        </p:nvSpPr>
+        <p:spPr/>
+        <p:txBody>
+          <a:bodyPr/>
+          <a:lstStyle/>
+          <a:p>
+            <a:fld id="{305265CD-E972-4CA7-8CB3-4CBC876448DE}" type="slidenum">
+              <a:rPr lang="he-IL" smtClean="0"/>
+              <a:t>9</a:t>
+            </a:fld>
+            <a:endParaRPr lang="he-IL"/>
+          </a:p>
+        </p:txBody>
+      </p:sp>
+    </p:spTree>
+    <p:extLst>
+      <p:ext uri="{BB962C8B-B14F-4D97-AF65-F5344CB8AC3E}">
+        <p14:creationId xmlns:p14="http://schemas.microsoft.com/office/powerpoint/2010/main" val="878021780"/>
+      </p:ext>
+    </p:extLst>
+  </p:cSld>
+  <p:clrMapOvr>
+    <a:masterClrMapping/>
+  </p:clrMapOvr>
+</p:notes>
+</file>
+
+<file path=ppt/notesSlides/notesSlide6.xml><?xml version="1.0" encoding="utf-8"?>
+<p:notes xmlns:a="http://schemas.openxmlformats.org/drawingml/2006/main" xmlns:r="http://schemas.openxmlformats.org/officeDocument/2006/relationships" xmlns:p="http://schemas.openxmlformats.org/presentationml/2006/main">
+  <p:cSld>
+    <p:spTree>
+      <p:nvGrpSpPr>
+        <p:cNvPr id="1" name=""/>
+        <p:cNvGrpSpPr/>
+        <p:nvPr/>
+      </p:nvGrpSpPr>
+      <p:grpSpPr>
+        <a:xfrm>
+          <a:off x="0" y="0"/>
+          <a:ext cx="0" cy="0"/>
+          <a:chOff x="0" y="0"/>
+          <a:chExt cx="0" cy="0"/>
+        </a:xfrm>
+      </p:grpSpPr>
+      <p:sp>
+        <p:nvSpPr>
+          <p:cNvPr id="2" name="Slide Image Placeholder 1"/>
+          <p:cNvSpPr>
+            <a:spLocks noGrp="1" noRot="1" noChangeAspect="1"/>
+          </p:cNvSpPr>
+          <p:nvPr>
+            <p:ph type="sldImg"/>
+          </p:nvPr>
+        </p:nvSpPr>
+        <p:spPr/>
+      </p:sp>
+      <p:sp>
+        <p:nvSpPr>
+          <p:cNvPr id="3" name="Notes Placeholder 2"/>
+          <p:cNvSpPr>
+            <a:spLocks noGrp="1"/>
+          </p:cNvSpPr>
+          <p:nvPr>
+            <p:ph type="body" idx="1"/>
+          </p:nvPr>
+        </p:nvSpPr>
+        <p:spPr/>
+        <p:txBody>
+          <a:bodyPr/>
+          <a:lstStyle/>
+          <a:p>
             <a:pPr algn="r" rtl="1"/>
             <a:r>
               <a:rPr lang="he-IL" dirty="0" smtClean="0"/>
@@ -1005,11 +1172,7 @@
             </a:r>
             <a:r>
               <a:rPr lang="he-IL" baseline="0" dirty="0" smtClean="0"/>
-              <a:t> </a:t>
-            </a:r>
-            <a:r>
-              <a:rPr lang="he-IL" baseline="0" dirty="0" smtClean="0"/>
-              <a:t>הבא ניתן לראות את מודל ה</a:t>
+              <a:t> הבא ניתן לראות את מודל ה</a:t>
             </a:r>
             <a:r>
               <a:rPr lang="en-US" baseline="0" dirty="0" smtClean="0"/>
@@ -1017,11 +1180,7 @@
             </a:r>
             <a:r>
               <a:rPr lang="he-IL" baseline="0" dirty="0" smtClean="0"/>
-              <a:t> </a:t>
-            </a:r>
-            <a:r>
-              <a:rPr lang="he-IL" baseline="0" dirty="0" smtClean="0"/>
-              <a:t>והשימוש בתבניות התיכון </a:t>
+              <a:t> והשימוש בתבניות התיכון </a:t>
             </a:r>
             <a:r>
               <a:rPr lang="en-US" baseline="0" dirty="0" smtClean="0"/>
@@ -1048,11 +1207,7 @@
             </a:r>
             <a:r>
               <a:rPr lang="he-IL" baseline="0" dirty="0" smtClean="0"/>
-              <a:t>, לשם פשטות אנו מציגים </a:t>
-            </a:r>
-            <a:r>
-              <a:rPr lang="he-IL" baseline="0" dirty="0" smtClean="0"/>
-              <a:t>דוגמה קונקרטית על </a:t>
+              <a:t>, לשם פשטות אנו מציגים דוגמה קונקרטית על </a:t>
             </a:r>
             <a:r>
               <a:rPr lang="en-US" baseline="0" dirty="0" smtClean="0"/>
@@ -1201,7 +1356,7 @@
                 <a:tabLst/>
                 <a:defRPr/>
               </a:pPr>
-              <a:t>12</a:t>
+              <a:t>11</a:t>
             </a:fld>
             <a:endParaRPr kumimoji="0" lang="he-IL" sz="1200" b="0" i="0" u="none" strike="noStrike" kern="1200" cap="none" spc="0" normalizeH="0" baseline="0" noProof="0" dirty="0">
               <a:ln>
@@ -4622,7 +4777,7 @@
         <p:spPr>
           <a:xfrm>
             <a:off x="1842525" y="3993907"/>
-            <a:ext cx="8309499" cy="947375"/>
+            <a:ext cx="8309499" cy="964367"/>
           </a:xfrm>
           <a:prstGeom prst="rect">
             <a:avLst/>
@@ -4666,7 +4821,27 @@
                 <a:latin typeface="Calibri"/>
                 <a:cs typeface="Arial"/>
               </a:rPr>
-              <a:t>Academic instructor – Dr. Rader Ben-Av</a:t>
+              <a:t>Academic instructor – Dr. </a:t>
+            </a:r>
+            <a:r>
+              <a:rPr lang="en-US" sz="2800" kern="0" dirty="0" smtClean="0">
+                <a:solidFill>
+                  <a:srgbClr val="FFFFFF"/>
+                </a:solidFill>
+                <a:latin typeface="Calibri"/>
+                <a:cs typeface="Arial"/>
+              </a:rPr>
+              <a:t>Radel </a:t>
+            </a:r>
+            <a:r>
+              <a:rPr lang="en-US" sz="2800" kern="0" dirty="0" smtClean="0">
+                <a:solidFill>
+                  <a:srgbClr val="FFFFFF"/>
+                </a:solidFill>
+                <a:latin typeface="Calibri"/>
+                <a:cs typeface="Arial"/>
+              </a:rPr>
+              <a:t>Ben-Av</a:t>
             </a:r>
             <a:endParaRPr lang="he-IL" sz="2800" kern="0" dirty="0" smtClean="0">
               <a:solidFill>
@@ -5749,805 +5924,6 @@
         </p:nvSpPr>
         <p:spPr>
           <a:xfrm>
-            <a:off x="4196276" y="442494"/>
-            <a:ext cx="7757426" cy="1091954"/>
-          </a:xfrm>
-          <a:prstGeom prst="rect">
-            <a:avLst/>
-          </a:prstGeom>
-        </p:spPr>
-        <p:txBody>
-          <a:bodyPr/>
-          <a:lstStyle>
-            <a:lvl1pPr algn="l" rtl="0" eaLnBrk="0" fontAlgn="base" hangingPunct="0">
-              <a:spcBef>
-                <a:spcPct val="0"/>
-              </a:spcBef>
-              <a:spcAft>
-                <a:spcPct val="0"/>
-              </a:spcAft>
-              <a:defRPr sz="3600" b="1">
-                <a:solidFill>
-                  <a:srgbClr val="CCECFF"/>
-                </a:solidFill>
-                <a:latin typeface="+mj-lt"/>
-                <a:ea typeface="+mj-ea"/>
-                <a:cs typeface="+mj-cs"/>
-              </a:defRPr>
-            </a:lvl1pPr>
-            <a:lvl2pPr algn="l" rtl="0" eaLnBrk="0" fontAlgn="base" hangingPunct="0">
-              <a:spcBef>
-                <a:spcPct val="0"/>
-              </a:spcBef>
-              <a:spcAft>
-                <a:spcPct val="0"/>
-              </a:spcAft>
-              <a:defRPr sz="3600" b="1">
-                <a:solidFill>
-                  <a:srgbClr val="CCECFF"/>
-                </a:solidFill>
-                <a:latin typeface="Calibri" pitchFamily="34" charset="0"/>
-                <a:cs typeface="Arial" pitchFamily="34" charset="0"/>
-              </a:defRPr>
-            </a:lvl2pPr>
-            <a:lvl3pPr algn="l" rtl="0" eaLnBrk="0" fontAlgn="base" hangingPunct="0">
-              <a:spcBef>
-                <a:spcPct val="0"/>
-              </a:spcBef>
-              <a:spcAft>
-                <a:spcPct val="0"/>
-              </a:spcAft>
-              <a:defRPr sz="3600" b="1">
-                <a:solidFill>
-                  <a:srgbClr val="CCECFF"/>
-                </a:solidFill>
-                <a:latin typeface="Calibri" pitchFamily="34" charset="0"/>
-                <a:cs typeface="Arial" pitchFamily="34" charset="0"/>
-              </a:defRPr>
-            </a:lvl3pPr>
-            <a:lvl4pPr algn="l" rtl="0" eaLnBrk="0" fontAlgn="base" hangingPunct="0">
-              <a:spcBef>
-                <a:spcPct val="0"/>
-              </a:spcBef>
-              <a:spcAft>
-                <a:spcPct val="0"/>
-              </a:spcAft>
-              <a:defRPr sz="3600" b="1">
-                <a:solidFill>
-                  <a:srgbClr val="CCECFF"/>
-                </a:solidFill>
-                <a:latin typeface="Calibri" pitchFamily="34" charset="0"/>
-                <a:cs typeface="Arial" pitchFamily="34" charset="0"/>
-              </a:defRPr>
-            </a:lvl4pPr>
-            <a:lvl5pPr algn="l" rtl="0" eaLnBrk="0" fontAlgn="base" hangingPunct="0">
-              <a:spcBef>
-                <a:spcPct val="0"/>
-              </a:spcBef>
-              <a:spcAft>
-                <a:spcPct val="0"/>
-              </a:spcAft>
-              <a:defRPr sz="3600" b="1">
-                <a:solidFill>
-                  <a:srgbClr val="CCECFF"/>
-                </a:solidFill>
-                <a:latin typeface="Calibri" pitchFamily="34" charset="0"/>
-                <a:cs typeface="Arial" pitchFamily="34" charset="0"/>
-              </a:defRPr>
-            </a:lvl5pPr>
-            <a:lvl6pPr marL="457200" algn="l" rtl="0" fontAlgn="base">
-              <a:spcBef>
-                <a:spcPct val="0"/>
-              </a:spcBef>
-              <a:spcAft>
-                <a:spcPct val="0"/>
-              </a:spcAft>
-              <a:defRPr sz="3600" b="1">
-                <a:solidFill>
-                  <a:srgbClr val="CCECFF"/>
-                </a:solidFill>
-                <a:latin typeface="Calibri" pitchFamily="34" charset="0"/>
-                <a:cs typeface="Arial" pitchFamily="34" charset="0"/>
-              </a:defRPr>
-            </a:lvl6pPr>
-            <a:lvl7pPr marL="914400" algn="l" rtl="0" fontAlgn="base">
-              <a:spcBef>
-                <a:spcPct val="0"/>
-              </a:spcBef>
-              <a:spcAft>
-                <a:spcPct val="0"/>
-              </a:spcAft>
-              <a:defRPr sz="3600" b="1">
-                <a:solidFill>
-                  <a:srgbClr val="CCECFF"/>
-                </a:solidFill>
-                <a:latin typeface="Calibri" pitchFamily="34" charset="0"/>
-                <a:cs typeface="Arial" pitchFamily="34" charset="0"/>
-              </a:defRPr>
-            </a:lvl7pPr>
-            <a:lvl8pPr marL="1371600" algn="l" rtl="0" fontAlgn="base">
-              <a:spcBef>
-                <a:spcPct val="0"/>
-              </a:spcBef>
-              <a:spcAft>
-                <a:spcPct val="0"/>
-              </a:spcAft>
-              <a:defRPr sz="3600" b="1">
-                <a:solidFill>
-                  <a:srgbClr val="CCECFF"/>
-                </a:solidFill>
-                <a:latin typeface="Calibri" pitchFamily="34" charset="0"/>
-                <a:cs typeface="Arial" pitchFamily="34" charset="0"/>
-              </a:defRPr>
-            </a:lvl8pPr>
-            <a:lvl9pPr marL="1828800" algn="l" rtl="0" fontAlgn="base">
-              <a:spcBef>
-                <a:spcPct val="0"/>
-              </a:spcBef>
-              <a:spcAft>
-                <a:spcPct val="0"/>
-              </a:spcAft>
-              <a:defRPr sz="3600" b="1">
-                <a:solidFill>
-                  <a:srgbClr val="CCECFF"/>
-                </a:solidFill>
-                <a:latin typeface="Calibri" pitchFamily="34" charset="0"/>
-                <a:cs typeface="Arial" pitchFamily="34" charset="0"/>
-              </a:defRPr>
-            </a:lvl9pPr>
-          </a:lstStyle>
-          <a:p>
-            <a:pPr>
-              <a:lnSpc>
-                <a:spcPts val="2267"/>
-              </a:lnSpc>
-            </a:pPr>
-            <a:endParaRPr lang="en-US" sz="4000" kern="0" dirty="0">
-              <a:solidFill>
-                <a:schemeClr val="tx2"/>
-              </a:solidFill>
-            </a:endParaRPr>
-          </a:p>
-          <a:p>
-            <a:pPr marL="0" marR="0" lvl="0" indent="0" algn="r" defTabSz="914400" rtl="1" eaLnBrk="0" fontAlgn="base" latinLnBrk="0" hangingPunct="0">
-              <a:lnSpc>
-                <a:spcPct val="100000"/>
-              </a:lnSpc>
-              <a:spcBef>
-                <a:spcPct val="0"/>
-              </a:spcBef>
-              <a:spcAft>
-                <a:spcPct val="0"/>
-              </a:spcAft>
-              <a:buClrTx/>
-              <a:buSzTx/>
-              <a:buFontTx/>
-              <a:buNone/>
-              <a:tabLst/>
-              <a:defRPr/>
-            </a:pPr>
-            <a:r>
-              <a:rPr lang="he-IL" u="sng" kern="0" dirty="0" smtClean="0">
-                <a:solidFill>
-                  <a:schemeClr val="tx1"/>
-                </a:solidFill>
-                <a:latin typeface="Segoe UI Semibold" panose="020B0702040204020203" pitchFamily="34" charset="0"/>
-                <a:cs typeface="Segoe UI Semibold" panose="020B0702040204020203" pitchFamily="34" charset="0"/>
-              </a:rPr>
-              <a:t>סיכום ההדגמה</a:t>
-            </a:r>
-            <a:endParaRPr kumimoji="0" lang="he-IL" i="0" u="sng" strike="noStrike" kern="0" cap="none" spc="0" normalizeH="0" baseline="0" noProof="0" dirty="0">
-              <a:ln>
-                <a:noFill/>
-              </a:ln>
-              <a:solidFill>
-                <a:schemeClr val="tx1"/>
-              </a:solidFill>
-              <a:effectLst/>
-              <a:uLnTx/>
-              <a:uFillTx/>
-              <a:latin typeface="Segoe UI Semibold" panose="020B0702040204020203" pitchFamily="34" charset="0"/>
-              <a:cs typeface="Segoe UI Semibold" panose="020B0702040204020203" pitchFamily="34" charset="0"/>
-            </a:endParaRPr>
-          </a:p>
-        </p:txBody>
-      </p:sp>
-      <p:sp>
-        <p:nvSpPr>
-          <p:cNvPr id="2" name="TextBox 1"/>
-          <p:cNvSpPr txBox="1"/>
-          <p:nvPr/>
-        </p:nvSpPr>
-        <p:spPr>
-          <a:xfrm>
-            <a:off x="238298" y="1724759"/>
-            <a:ext cx="11715405" cy="4524315"/>
-          </a:xfrm>
-          <a:prstGeom prst="rect">
-            <a:avLst/>
-          </a:prstGeom>
-          <a:noFill/>
-        </p:spPr>
-        <p:txBody>
-          <a:bodyPr wrap="square" rtlCol="0">
-            <a:spAutoFit/>
-          </a:bodyPr>
-          <a:lstStyle/>
-          <a:p>
-            <a:pPr marL="342900" indent="-342900" algn="r" rtl="1">
-              <a:buFont typeface="Arial" panose="020B0604020202020204" pitchFamily="34" charset="0"/>
-              <a:buChar char="•"/>
-            </a:pPr>
-            <a:r>
-              <a:rPr lang="he-IL" sz="2400" kern="0" dirty="0" smtClean="0">
-                <a:latin typeface="Segoe UI Light" panose="020B0502040204020203" pitchFamily="34" charset="0"/>
-                <a:cs typeface="Segoe UI Light" panose="020B0502040204020203" pitchFamily="34" charset="0"/>
-              </a:rPr>
-              <a:t>הראינו דגימה של האקדח</a:t>
-            </a:r>
-          </a:p>
-          <a:p>
-            <a:pPr marL="342900" indent="-342900" algn="r" rtl="1">
-              <a:buFont typeface="Arial" panose="020B0604020202020204" pitchFamily="34" charset="0"/>
-              <a:buChar char="•"/>
-            </a:pPr>
-            <a:r>
-              <a:rPr lang="he-IL" sz="2400" kern="0" dirty="0" smtClean="0">
-                <a:latin typeface="Segoe UI Light" panose="020B0502040204020203" pitchFamily="34" charset="0"/>
-                <a:cs typeface="Segoe UI Light" panose="020B0502040204020203" pitchFamily="34" charset="0"/>
-              </a:rPr>
-              <a:t>הראינו חיבור של אנטנת ה</a:t>
-            </a:r>
-            <a:r>
-              <a:rPr lang="en-US" sz="2400" kern="0" dirty="0" smtClean="0">
-                <a:latin typeface="Segoe UI Light" panose="020B0502040204020203" pitchFamily="34" charset="0"/>
-                <a:cs typeface="Segoe UI Light" panose="020B0502040204020203" pitchFamily="34" charset="0"/>
-              </a:rPr>
-              <a:t>Wi-Fi</a:t>
-            </a:r>
-            <a:r>
-              <a:rPr lang="he-IL" sz="2400" kern="0" dirty="0" smtClean="0">
-                <a:latin typeface="Segoe UI Light" panose="020B0502040204020203" pitchFamily="34" charset="0"/>
-                <a:cs typeface="Segoe UI Light" panose="020B0502040204020203" pitchFamily="34" charset="0"/>
-              </a:rPr>
-              <a:t> לבקר ה</a:t>
-            </a:r>
-            <a:r>
-              <a:rPr lang="en-US" sz="2400" kern="0" dirty="0" err="1" smtClean="0">
-                <a:latin typeface="Segoe UI Light" panose="020B0502040204020203" pitchFamily="34" charset="0"/>
-                <a:cs typeface="Segoe UI Light" panose="020B0502040204020203" pitchFamily="34" charset="0"/>
-              </a:rPr>
-              <a:t>CompuLab</a:t>
-            </a:r>
-            <a:r>
-              <a:rPr lang="he-IL" sz="2400" kern="0" dirty="0" smtClean="0">
-                <a:latin typeface="Segoe UI Light" panose="020B0502040204020203" pitchFamily="34" charset="0"/>
-                <a:cs typeface="Segoe UI Light" panose="020B0502040204020203" pitchFamily="34" charset="0"/>
-              </a:rPr>
-              <a:t> באקדח</a:t>
-            </a:r>
-          </a:p>
-          <a:p>
-            <a:pPr marL="342900" indent="-342900" algn="r" rtl="1">
-              <a:buFont typeface="Arial" panose="020B0604020202020204" pitchFamily="34" charset="0"/>
-              <a:buChar char="•"/>
-            </a:pPr>
-            <a:r>
-              <a:rPr lang="he-IL" sz="2400" kern="0" dirty="0" smtClean="0">
-                <a:latin typeface="Segoe UI Light" panose="020B0502040204020203" pitchFamily="34" charset="0"/>
-                <a:cs typeface="Segoe UI Light" panose="020B0502040204020203" pitchFamily="34" charset="0"/>
-              </a:rPr>
-              <a:t>הראינו הפעלה של מערכת השו"ב עם הפונקציונאליות הקיימת עד כה</a:t>
-            </a:r>
-            <a:r>
-              <a:rPr lang="en-US" sz="2400" kern="0" dirty="0" smtClean="0">
-                <a:latin typeface="Segoe UI Light" panose="020B0502040204020203" pitchFamily="34" charset="0"/>
-                <a:cs typeface="Segoe UI Light" panose="020B0502040204020203" pitchFamily="34" charset="0"/>
-              </a:rPr>
-              <a:t> </a:t>
-            </a:r>
-            <a:endParaRPr lang="he-IL" sz="2400" kern="0" dirty="0" smtClean="0">
-              <a:latin typeface="Segoe UI Light" panose="020B0502040204020203" pitchFamily="34" charset="0"/>
-              <a:cs typeface="Segoe UI Light" panose="020B0502040204020203" pitchFamily="34" charset="0"/>
-            </a:endParaRPr>
-          </a:p>
-          <a:p>
-            <a:pPr marL="342900" indent="-342900" algn="r" rtl="1">
-              <a:buFont typeface="Arial" panose="020B0604020202020204" pitchFamily="34" charset="0"/>
-              <a:buChar char="•"/>
-            </a:pPr>
-            <a:r>
-              <a:rPr lang="he-IL" sz="2400" kern="0" dirty="0" smtClean="0">
-                <a:latin typeface="Segoe UI Light" panose="020B0502040204020203" pitchFamily="34" charset="0"/>
-                <a:cs typeface="Segoe UI Light" panose="020B0502040204020203" pitchFamily="34" charset="0"/>
-              </a:rPr>
-              <a:t>הראינו הפעלה של </a:t>
-            </a:r>
-            <a:r>
-              <a:rPr lang="en-US" sz="2400" kern="0" dirty="0" err="1" smtClean="0">
-                <a:latin typeface="Segoe UI Light" panose="020B0502040204020203" pitchFamily="34" charset="0"/>
-                <a:cs typeface="Segoe UI Light" panose="020B0502040204020203" pitchFamily="34" charset="0"/>
-              </a:rPr>
-              <a:t>HotSpot</a:t>
-            </a:r>
-            <a:endParaRPr lang="he-IL" sz="2400" kern="0" dirty="0">
-              <a:latin typeface="Segoe UI Light" panose="020B0502040204020203" pitchFamily="34" charset="0"/>
-              <a:cs typeface="Segoe UI Light" panose="020B0502040204020203" pitchFamily="34" charset="0"/>
-            </a:endParaRPr>
-          </a:p>
-          <a:p>
-            <a:pPr marL="342900" indent="-342900" algn="r" rtl="1">
-              <a:buFont typeface="Arial" panose="020B0604020202020204" pitchFamily="34" charset="0"/>
-              <a:buChar char="•"/>
-            </a:pPr>
-            <a:r>
-              <a:rPr lang="he-IL" sz="2400" kern="0" dirty="0" smtClean="0">
-                <a:latin typeface="Segoe UI Light" panose="020B0502040204020203" pitchFamily="34" charset="0"/>
-                <a:cs typeface="Segoe UI Light" panose="020B0502040204020203" pitchFamily="34" charset="0"/>
-              </a:rPr>
-              <a:t>חיבור של סמארטפון עם אפליקצית הדמו שפיתחנו</a:t>
-            </a:r>
-          </a:p>
-          <a:p>
-            <a:pPr marL="342900" indent="-342900" algn="r" rtl="1">
-              <a:buFont typeface="Arial" panose="020B0604020202020204" pitchFamily="34" charset="0"/>
-              <a:buChar char="•"/>
-            </a:pPr>
-            <a:r>
-              <a:rPr lang="he-IL" sz="2400" kern="0" dirty="0" smtClean="0">
-                <a:latin typeface="Segoe UI Light" panose="020B0502040204020203" pitchFamily="34" charset="0"/>
-                <a:cs typeface="Segoe UI Light" panose="020B0502040204020203" pitchFamily="34" charset="0"/>
-              </a:rPr>
-              <a:t>שליפת נתונים באמצעות הדפדפן</a:t>
-            </a:r>
-          </a:p>
-          <a:p>
-            <a:pPr marL="342900" indent="-342900" algn="r" rtl="1">
-              <a:buFont typeface="Arial" panose="020B0604020202020204" pitchFamily="34" charset="0"/>
-              <a:buChar char="•"/>
-            </a:pPr>
-            <a:endParaRPr lang="he-IL" sz="2400" kern="0" dirty="0" smtClean="0">
-              <a:latin typeface="Segoe UI Light" panose="020B0502040204020203" pitchFamily="34" charset="0"/>
-              <a:cs typeface="Segoe UI Light" panose="020B0502040204020203" pitchFamily="34" charset="0"/>
-            </a:endParaRPr>
-          </a:p>
-          <a:p>
-            <a:pPr marL="342900" indent="-342900" algn="r" rtl="1">
-              <a:buFont typeface="Arial" panose="020B0604020202020204" pitchFamily="34" charset="0"/>
-              <a:buChar char="•"/>
-            </a:pPr>
-            <a:r>
-              <a:rPr lang="he-IL" sz="2400" kern="0" dirty="0" smtClean="0">
-                <a:latin typeface="Segoe UI Light" panose="020B0502040204020203" pitchFamily="34" charset="0"/>
-                <a:cs typeface="Segoe UI Light" panose="020B0502040204020203" pitchFamily="34" charset="0"/>
-              </a:rPr>
-              <a:t>הראינו את צד השרת המרכזי הקיים עד כה</a:t>
-            </a:r>
-          </a:p>
-          <a:p>
-            <a:pPr marL="342900" indent="-342900" algn="r" rtl="1">
-              <a:buFont typeface="Arial" panose="020B0604020202020204" pitchFamily="34" charset="0"/>
-              <a:buChar char="•"/>
-            </a:pPr>
-            <a:r>
-              <a:rPr lang="he-IL" sz="2400" kern="0" dirty="0" smtClean="0">
-                <a:latin typeface="Segoe UI Light" panose="020B0502040204020203" pitchFamily="34" charset="0"/>
-                <a:cs typeface="Segoe UI Light" panose="020B0502040204020203" pitchFamily="34" charset="0"/>
-              </a:rPr>
-              <a:t>הראינו שליחת נתונים ע"י </a:t>
-            </a:r>
-            <a:r>
-              <a:rPr lang="en-US" sz="2400" kern="0" dirty="0" smtClean="0">
-                <a:latin typeface="Segoe UI Light" panose="020B0502040204020203" pitchFamily="34" charset="0"/>
-                <a:cs typeface="Segoe UI Light" panose="020B0502040204020203" pitchFamily="34" charset="0"/>
-              </a:rPr>
-              <a:t>Client</a:t>
-            </a:r>
-            <a:r>
-              <a:rPr lang="he-IL" sz="2400" kern="0" dirty="0" smtClean="0">
-                <a:latin typeface="Segoe UI Light" panose="020B0502040204020203" pitchFamily="34" charset="0"/>
-                <a:cs typeface="Segoe UI Light" panose="020B0502040204020203" pitchFamily="34" charset="0"/>
-              </a:rPr>
-              <a:t> שפיתחנו לצורכי פיתוח ובדיקות</a:t>
-            </a:r>
-          </a:p>
-          <a:p>
-            <a:pPr marL="342900" indent="-342900" algn="r" rtl="1">
-              <a:buFont typeface="Arial" panose="020B0604020202020204" pitchFamily="34" charset="0"/>
-              <a:buChar char="•"/>
-            </a:pPr>
-            <a:r>
-              <a:rPr lang="he-IL" sz="2400" kern="0" dirty="0" smtClean="0">
-                <a:latin typeface="Segoe UI Light" panose="020B0502040204020203" pitchFamily="34" charset="0"/>
-                <a:cs typeface="Segoe UI Light" panose="020B0502040204020203" pitchFamily="34" charset="0"/>
-              </a:rPr>
-              <a:t>הראינו הכנסה של נתונים למסד הנתונים המרכזי</a:t>
-            </a:r>
-          </a:p>
-          <a:p>
-            <a:pPr marL="342900" indent="-342900" algn="r" rtl="1">
-              <a:buFont typeface="Arial" panose="020B0604020202020204" pitchFamily="34" charset="0"/>
-              <a:buChar char="•"/>
-            </a:pPr>
-            <a:endParaRPr lang="he-IL" sz="2400" kern="0" dirty="0" smtClean="0">
-              <a:latin typeface="Segoe UI Light" panose="020B0502040204020203" pitchFamily="34" charset="0"/>
-              <a:cs typeface="Segoe UI Light" panose="020B0502040204020203" pitchFamily="34" charset="0"/>
-            </a:endParaRPr>
-          </a:p>
-          <a:p>
-            <a:pPr marL="342900" indent="-342900" algn="r" rtl="1">
-              <a:buFont typeface="Arial" panose="020B0604020202020204" pitchFamily="34" charset="0"/>
-              <a:buChar char="•"/>
-            </a:pPr>
-            <a:endParaRPr lang="he-IL" sz="2400" kern="0" dirty="0">
-              <a:latin typeface="Segoe UI Light" panose="020B0502040204020203" pitchFamily="34" charset="0"/>
-              <a:cs typeface="Segoe UI Light" panose="020B0502040204020203" pitchFamily="34" charset="0"/>
-            </a:endParaRPr>
-          </a:p>
-        </p:txBody>
-      </p:sp>
-    </p:spTree>
-    <p:extLst>
-      <p:ext uri="{BB962C8B-B14F-4D97-AF65-F5344CB8AC3E}">
-        <p14:creationId xmlns:p14="http://schemas.microsoft.com/office/powerpoint/2010/main" val="824214340"/>
-      </p:ext>
-    </p:extLst>
-  </p:cSld>
-  <p:clrMapOvr>
-    <a:masterClrMapping/>
-  </p:clrMapOvr>
-  <p:timing>
-    <p:tnLst>
-      <p:par>
-        <p:cTn id="1" dur="indefinite" restart="never" nodeType="tmRoot"/>
-      </p:par>
-    </p:tnLst>
-  </p:timing>
-</p:sld>
-</file>
-
-<file path=ppt/slides/slide11.xml><?xml version="1.0" encoding="utf-8"?>
-<p:sld xmlns:a="http://schemas.openxmlformats.org/drawingml/2006/main" xmlns:r="http://schemas.openxmlformats.org/officeDocument/2006/relationships" xmlns:p="http://schemas.openxmlformats.org/presentationml/2006/main">
-  <p:cSld>
-    <p:spTree>
-      <p:nvGrpSpPr>
-        <p:cNvPr id="1" name=""/>
-        <p:cNvGrpSpPr/>
-        <p:nvPr/>
-      </p:nvGrpSpPr>
-      <p:grpSpPr>
-        <a:xfrm>
-          <a:off x="0" y="0"/>
-          <a:ext cx="0" cy="0"/>
-          <a:chOff x="0" y="0"/>
-          <a:chExt cx="0" cy="0"/>
-        </a:xfrm>
-      </p:grpSpPr>
-      <p:pic>
-        <p:nvPicPr>
-          <p:cNvPr id="5" name="Picture 4"/>
-          <p:cNvPicPr>
-            <a:picLocks noChangeAspect="1"/>
-          </p:cNvPicPr>
-          <p:nvPr/>
-        </p:nvPicPr>
-        <p:blipFill rotWithShape="1">
-          <a:blip r:embed="rId2" cstate="screen">
-            <a:extLst>
-              <a:ext uri="{28A0092B-C50C-407E-A947-70E740481C1C}">
-                <a14:useLocalDpi xmlns:a14="http://schemas.microsoft.com/office/drawing/2010/main"/>
-              </a:ext>
-            </a:extLst>
-          </a:blip>
-          <a:srcRect/>
-          <a:stretch/>
-        </p:blipFill>
-        <p:spPr>
-          <a:xfrm>
-            <a:off x="-1" y="0"/>
-            <a:ext cx="12192001" cy="6858000"/>
-          </a:xfrm>
-          <a:prstGeom prst="rect">
-            <a:avLst/>
-          </a:prstGeom>
-        </p:spPr>
-      </p:pic>
-      <p:sp>
-        <p:nvSpPr>
-          <p:cNvPr id="7" name="Rectangle 6"/>
-          <p:cNvSpPr/>
-          <p:nvPr/>
-        </p:nvSpPr>
-        <p:spPr>
-          <a:xfrm>
-            <a:off x="97654" y="566344"/>
-            <a:ext cx="12004442" cy="5839247"/>
-          </a:xfrm>
-          <a:prstGeom prst="rect">
-            <a:avLst/>
-          </a:prstGeom>
-          <a:solidFill>
-            <a:schemeClr val="bg1">
-              <a:alpha val="63000"/>
-            </a:schemeClr>
-          </a:solidFill>
-          <a:ln>
-            <a:noFill/>
-          </a:ln>
-        </p:spPr>
-        <p:style>
-          <a:lnRef idx="2">
-            <a:schemeClr val="accent1">
-              <a:shade val="50000"/>
-            </a:schemeClr>
-          </a:lnRef>
-          <a:fillRef idx="1">
-            <a:schemeClr val="accent1"/>
-          </a:fillRef>
-          <a:effectRef idx="0">
-            <a:schemeClr val="accent1"/>
-          </a:effectRef>
-          <a:fontRef idx="minor">
-            <a:schemeClr val="lt1"/>
-          </a:fontRef>
-        </p:style>
-        <p:txBody>
-          <a:bodyPr rot="0" spcFirstLastPara="0" vertOverflow="overflow" horzOverflow="overflow" vert="horz" wrap="square" lIns="91440" tIns="45720" rIns="91440" bIns="45720" numCol="1" spcCol="0" rtlCol="0" fromWordArt="0" anchor="ctr" anchorCtr="0" forceAA="0" compatLnSpc="1">
-            <a:prstTxWarp prst="textNoShape">
-              <a:avLst/>
-            </a:prstTxWarp>
-            <a:noAutofit/>
-          </a:bodyPr>
-          <a:lstStyle/>
-          <a:p>
-            <a:pPr marL="0" marR="0" lvl="0" indent="0" algn="ctr" defTabSz="914400" rtl="0" eaLnBrk="1" fontAlgn="auto" latinLnBrk="0" hangingPunct="1">
-              <a:lnSpc>
-                <a:spcPct val="100000"/>
-              </a:lnSpc>
-              <a:spcBef>
-                <a:spcPts val="0"/>
-              </a:spcBef>
-              <a:spcAft>
-                <a:spcPts val="0"/>
-              </a:spcAft>
-              <a:buClrTx/>
-              <a:buSzTx/>
-              <a:buFontTx/>
-              <a:buNone/>
-              <a:tabLst/>
-              <a:defRPr/>
-            </a:pPr>
-            <a:endParaRPr kumimoji="0" lang="en-US" sz="1800" b="0" i="0" u="none" strike="noStrike" kern="1200" cap="none" spc="0" normalizeH="0" baseline="0" noProof="0">
-              <a:ln>
-                <a:noFill/>
-              </a:ln>
-              <a:solidFill>
-                <a:srgbClr val="FFFFFF"/>
-              </a:solidFill>
-              <a:effectLst/>
-              <a:uLnTx/>
-              <a:uFillTx/>
-              <a:latin typeface="Calibri"/>
-              <a:ea typeface="+mn-ea"/>
-              <a:cs typeface="Arial"/>
-            </a:endParaRPr>
-          </a:p>
-        </p:txBody>
-      </p:sp>
-      <p:sp>
-        <p:nvSpPr>
-          <p:cNvPr id="4" name="Title 1"/>
-          <p:cNvSpPr txBox="1">
-            <a:spLocks/>
-          </p:cNvSpPr>
-          <p:nvPr/>
-        </p:nvSpPr>
-        <p:spPr>
-          <a:xfrm>
-            <a:off x="238298" y="1183386"/>
-            <a:ext cx="11715404" cy="4242054"/>
-          </a:xfrm>
-          <a:prstGeom prst="rect">
-            <a:avLst/>
-          </a:prstGeom>
-        </p:spPr>
-        <p:txBody>
-          <a:bodyPr/>
-          <a:lstStyle>
-            <a:lvl1pPr algn="l" rtl="0" eaLnBrk="0" fontAlgn="base" hangingPunct="0">
-              <a:spcBef>
-                <a:spcPct val="0"/>
-              </a:spcBef>
-              <a:spcAft>
-                <a:spcPct val="0"/>
-              </a:spcAft>
-              <a:defRPr sz="3600" b="1">
-                <a:solidFill>
-                  <a:srgbClr val="CCECFF"/>
-                </a:solidFill>
-                <a:latin typeface="+mj-lt"/>
-                <a:ea typeface="+mj-ea"/>
-                <a:cs typeface="+mj-cs"/>
-              </a:defRPr>
-            </a:lvl1pPr>
-            <a:lvl2pPr algn="l" rtl="0" eaLnBrk="0" fontAlgn="base" hangingPunct="0">
-              <a:spcBef>
-                <a:spcPct val="0"/>
-              </a:spcBef>
-              <a:spcAft>
-                <a:spcPct val="0"/>
-              </a:spcAft>
-              <a:defRPr sz="3600" b="1">
-                <a:solidFill>
-                  <a:srgbClr val="CCECFF"/>
-                </a:solidFill>
-                <a:latin typeface="Calibri" pitchFamily="34" charset="0"/>
-                <a:cs typeface="Arial" pitchFamily="34" charset="0"/>
-              </a:defRPr>
-            </a:lvl2pPr>
-            <a:lvl3pPr algn="l" rtl="0" eaLnBrk="0" fontAlgn="base" hangingPunct="0">
-              <a:spcBef>
-                <a:spcPct val="0"/>
-              </a:spcBef>
-              <a:spcAft>
-                <a:spcPct val="0"/>
-              </a:spcAft>
-              <a:defRPr sz="3600" b="1">
-                <a:solidFill>
-                  <a:srgbClr val="CCECFF"/>
-                </a:solidFill>
-                <a:latin typeface="Calibri" pitchFamily="34" charset="0"/>
-                <a:cs typeface="Arial" pitchFamily="34" charset="0"/>
-              </a:defRPr>
-            </a:lvl3pPr>
-            <a:lvl4pPr algn="l" rtl="0" eaLnBrk="0" fontAlgn="base" hangingPunct="0">
-              <a:spcBef>
-                <a:spcPct val="0"/>
-              </a:spcBef>
-              <a:spcAft>
-                <a:spcPct val="0"/>
-              </a:spcAft>
-              <a:defRPr sz="3600" b="1">
-                <a:solidFill>
-                  <a:srgbClr val="CCECFF"/>
-                </a:solidFill>
-                <a:latin typeface="Calibri" pitchFamily="34" charset="0"/>
-                <a:cs typeface="Arial" pitchFamily="34" charset="0"/>
-              </a:defRPr>
-            </a:lvl4pPr>
-            <a:lvl5pPr algn="l" rtl="0" eaLnBrk="0" fontAlgn="base" hangingPunct="0">
-              <a:spcBef>
-                <a:spcPct val="0"/>
-              </a:spcBef>
-              <a:spcAft>
-                <a:spcPct val="0"/>
-              </a:spcAft>
-              <a:defRPr sz="3600" b="1">
-                <a:solidFill>
-                  <a:srgbClr val="CCECFF"/>
-                </a:solidFill>
-                <a:latin typeface="Calibri" pitchFamily="34" charset="0"/>
-                <a:cs typeface="Arial" pitchFamily="34" charset="0"/>
-              </a:defRPr>
-            </a:lvl5pPr>
-            <a:lvl6pPr marL="457200" algn="l" rtl="0" fontAlgn="base">
-              <a:spcBef>
-                <a:spcPct val="0"/>
-              </a:spcBef>
-              <a:spcAft>
-                <a:spcPct val="0"/>
-              </a:spcAft>
-              <a:defRPr sz="3600" b="1">
-                <a:solidFill>
-                  <a:srgbClr val="CCECFF"/>
-                </a:solidFill>
-                <a:latin typeface="Calibri" pitchFamily="34" charset="0"/>
-                <a:cs typeface="Arial" pitchFamily="34" charset="0"/>
-              </a:defRPr>
-            </a:lvl6pPr>
-            <a:lvl7pPr marL="914400" algn="l" rtl="0" fontAlgn="base">
-              <a:spcBef>
-                <a:spcPct val="0"/>
-              </a:spcBef>
-              <a:spcAft>
-                <a:spcPct val="0"/>
-              </a:spcAft>
-              <a:defRPr sz="3600" b="1">
-                <a:solidFill>
-                  <a:srgbClr val="CCECFF"/>
-                </a:solidFill>
-                <a:latin typeface="Calibri" pitchFamily="34" charset="0"/>
-                <a:cs typeface="Arial" pitchFamily="34" charset="0"/>
-              </a:defRPr>
-            </a:lvl7pPr>
-            <a:lvl8pPr marL="1371600" algn="l" rtl="0" fontAlgn="base">
-              <a:spcBef>
-                <a:spcPct val="0"/>
-              </a:spcBef>
-              <a:spcAft>
-                <a:spcPct val="0"/>
-              </a:spcAft>
-              <a:defRPr sz="3600" b="1">
-                <a:solidFill>
-                  <a:srgbClr val="CCECFF"/>
-                </a:solidFill>
-                <a:latin typeface="Calibri" pitchFamily="34" charset="0"/>
-                <a:cs typeface="Arial" pitchFamily="34" charset="0"/>
-              </a:defRPr>
-            </a:lvl8pPr>
-            <a:lvl9pPr marL="1828800" algn="l" rtl="0" fontAlgn="base">
-              <a:spcBef>
-                <a:spcPct val="0"/>
-              </a:spcBef>
-              <a:spcAft>
-                <a:spcPct val="0"/>
-              </a:spcAft>
-              <a:defRPr sz="3600" b="1">
-                <a:solidFill>
-                  <a:srgbClr val="CCECFF"/>
-                </a:solidFill>
-                <a:latin typeface="Calibri" pitchFamily="34" charset="0"/>
-                <a:cs typeface="Arial" pitchFamily="34" charset="0"/>
-              </a:defRPr>
-            </a:lvl9pPr>
-          </a:lstStyle>
-          <a:p>
-            <a:pPr>
-              <a:lnSpc>
-                <a:spcPts val="2267"/>
-              </a:lnSpc>
-            </a:pPr>
-            <a:endParaRPr lang="en-US" sz="4000" kern="0" dirty="0">
-              <a:solidFill>
-                <a:schemeClr val="tx2"/>
-              </a:solidFill>
-            </a:endParaRPr>
-          </a:p>
-          <a:p>
-            <a:pPr marL="0" marR="0" lvl="0" indent="0" algn="r" defTabSz="914400" rtl="1" eaLnBrk="0" fontAlgn="base" latinLnBrk="0" hangingPunct="0">
-              <a:lnSpc>
-                <a:spcPct val="100000"/>
-              </a:lnSpc>
-              <a:spcBef>
-                <a:spcPct val="0"/>
-              </a:spcBef>
-              <a:spcAft>
-                <a:spcPct val="0"/>
-              </a:spcAft>
-              <a:buClrTx/>
-              <a:buSzTx/>
-              <a:buFontTx/>
-              <a:buNone/>
-              <a:tabLst/>
-              <a:defRPr/>
-            </a:pPr>
-            <a:endParaRPr kumimoji="0" lang="he-IL" sz="1800" b="0" i="0" u="none" strike="noStrike" kern="0" cap="none" spc="0" normalizeH="0" baseline="0" noProof="0" dirty="0">
-              <a:ln>
-                <a:noFill/>
-              </a:ln>
-              <a:solidFill>
-                <a:srgbClr val="000000"/>
-              </a:solidFill>
-              <a:effectLst/>
-              <a:uLnTx/>
-              <a:uFillTx/>
-              <a:latin typeface="Calibri"/>
-              <a:ea typeface="+mj-ea"/>
-              <a:cs typeface="Arial"/>
-            </a:endParaRPr>
-          </a:p>
-        </p:txBody>
-      </p:sp>
-      <p:sp>
-        <p:nvSpPr>
-          <p:cNvPr id="9" name="Title 1"/>
-          <p:cNvSpPr txBox="1">
-            <a:spLocks/>
-          </p:cNvSpPr>
-          <p:nvPr/>
-        </p:nvSpPr>
-        <p:spPr>
-          <a:xfrm>
             <a:off x="238298" y="840510"/>
             <a:ext cx="11715403" cy="5246254"/>
           </a:xfrm>
@@ -6819,7 +6195,7 @@
 </p:sld>
 </file>
 
-<file path=ppt/slides/slide12.xml><?xml version="1.0" encoding="utf-8"?>
+<file path=ppt/slides/slide11.xml><?xml version="1.0" encoding="utf-8"?>
 <p:sld xmlns:a="http://schemas.openxmlformats.org/drawingml/2006/main" xmlns:r="http://schemas.openxmlformats.org/officeDocument/2006/relationships" xmlns:p="http://schemas.openxmlformats.org/presentationml/2006/main">
   <p:cSld>
     <p:spTree>
@@ -7081,7 +6457,7 @@
         </p:blipFill>
         <p:spPr>
           <a:xfrm>
-            <a:off x="-1" y="0"/>
+            <a:off x="0" y="0"/>
             <a:ext cx="12192001" cy="6858000"/>
           </a:xfrm>
           <a:prstGeom prst="rect">
@@ -7098,7 +6474,7 @@
         <p:spPr>
           <a:xfrm>
             <a:off x="97654" y="566344"/>
-            <a:ext cx="11993732" cy="5839247"/>
+            <a:ext cx="12004442" cy="5839247"/>
           </a:xfrm>
           <a:prstGeom prst="rect">
             <a:avLst/>
@@ -7385,7 +6761,7 @@
         </p:nvSpPr>
         <p:spPr>
           <a:xfrm>
-            <a:off x="4196277" y="440772"/>
+            <a:off x="4196276" y="442494"/>
             <a:ext cx="7757426" cy="1091954"/>
           </a:xfrm>
           <a:prstGeom prst="rect">
@@ -7563,14 +6939,14 @@
               <a:defRPr/>
             </a:pPr>
             <a:r>
-              <a:rPr lang="he-IL" u="sng" kern="0" noProof="0" dirty="0" smtClean="0">
+              <a:rPr lang="he-IL" u="sng" kern="0" dirty="0" smtClean="0">
                 <a:solidFill>
                   <a:schemeClr val="tx1"/>
                 </a:solidFill>
                 <a:latin typeface="Segoe UI Semibold" panose="020B0702040204020203" pitchFamily="34" charset="0"/>
                 <a:cs typeface="Segoe UI Semibold" panose="020B0702040204020203" pitchFamily="34" charset="0"/>
               </a:rPr>
-              <a:t>מצב קיים</a:t>
+              <a:t>תיאור הבעיה</a:t>
             </a:r>
             <a:endParaRPr kumimoji="0" lang="he-IL" i="0" u="sng" strike="noStrike" kern="0" cap="none" spc="0" normalizeH="0" baseline="0" noProof="0" dirty="0">
               <a:ln>
@@ -7585,218 +6961,6 @@
               <a:latin typeface="Segoe UI Semibold" panose="020B0702040204020203" pitchFamily="34" charset="0"/>
               <a:cs typeface="Segoe UI Semibold" panose="020B0702040204020203" pitchFamily="34" charset="0"/>
             </a:endParaRPr>
-          </a:p>
-        </p:txBody>
-      </p:sp>
-      <p:sp>
-        <p:nvSpPr>
-          <p:cNvPr id="6" name="TextBox 5"/>
-          <p:cNvSpPr txBox="1"/>
-          <p:nvPr/>
-        </p:nvSpPr>
-        <p:spPr>
-          <a:xfrm>
-            <a:off x="238298" y="1882066"/>
-            <a:ext cx="11715404" cy="3785652"/>
-          </a:xfrm>
-          <a:prstGeom prst="rect">
-            <a:avLst/>
-          </a:prstGeom>
-          <a:noFill/>
-        </p:spPr>
-        <p:txBody>
-          <a:bodyPr wrap="square" rtlCol="0">
-            <a:spAutoFit/>
-          </a:bodyPr>
-          <a:lstStyle/>
-          <a:p>
-            <a:pPr marL="285750" indent="-285750" algn="r" rtl="1">
-              <a:buFont typeface="Arial" panose="020B0604020202020204" pitchFamily="34" charset="0"/>
-              <a:buChar char="•"/>
-            </a:pPr>
-            <a:r>
-              <a:rPr lang="he-IL" sz="2400" kern="0" dirty="0" smtClean="0">
-                <a:latin typeface="Segoe UI Light" panose="020B0502040204020203" pitchFamily="34" charset="0"/>
-                <a:cs typeface="Segoe UI Light" panose="020B0502040204020203" pitchFamily="34" charset="0"/>
-              </a:rPr>
-              <a:t>החברה פיתחה אקדח לייזר המכונה </a:t>
-            </a:r>
-            <a:r>
-              <a:rPr lang="en-US" sz="2400" kern="0" dirty="0" smtClean="0">
-                <a:latin typeface="Segoe UI Light" panose="020B0502040204020203" pitchFamily="34" charset="0"/>
-                <a:cs typeface="Segoe UI Light" panose="020B0502040204020203" pitchFamily="34" charset="0"/>
-              </a:rPr>
-              <a:t>G-Scan</a:t>
-            </a:r>
-            <a:endParaRPr lang="he-IL" sz="2400" kern="0" dirty="0">
-              <a:latin typeface="Segoe UI Light" panose="020B0502040204020203" pitchFamily="34" charset="0"/>
-              <a:cs typeface="Segoe UI Light" panose="020B0502040204020203" pitchFamily="34" charset="0"/>
-            </a:endParaRPr>
-          </a:p>
-          <a:p>
-            <a:pPr marL="285750" indent="-285750" algn="r" rtl="1">
-              <a:buFont typeface="Arial" panose="020B0604020202020204" pitchFamily="34" charset="0"/>
-              <a:buChar char="•"/>
-            </a:pPr>
-            <a:r>
-              <a:rPr lang="he-IL" sz="2400" dirty="0" smtClean="0">
-                <a:latin typeface="Segoe UI Light" panose="020B0502040204020203" pitchFamily="34" charset="0"/>
-                <a:cs typeface="Segoe UI Light" panose="020B0502040204020203" pitchFamily="34" charset="0"/>
-              </a:rPr>
-              <a:t>האקדח</a:t>
-            </a:r>
-            <a:r>
-              <a:rPr lang="he-IL" sz="2400" dirty="0" smtClean="0"/>
-              <a:t> </a:t>
-            </a:r>
-            <a:r>
-              <a:rPr lang="he-IL" sz="2400" kern="0" dirty="0">
-                <a:latin typeface="Segoe UI Light" panose="020B0502040204020203" pitchFamily="34" charset="0"/>
-                <a:cs typeface="Segoe UI Light" panose="020B0502040204020203" pitchFamily="34" charset="0"/>
-              </a:rPr>
-              <a:t>המאפשר </a:t>
-            </a:r>
-            <a:r>
-              <a:rPr lang="he-IL" sz="2400" kern="0" dirty="0" smtClean="0">
-                <a:latin typeface="Segoe UI Light" panose="020B0502040204020203" pitchFamily="34" charset="0"/>
-                <a:cs typeface="Segoe UI Light" panose="020B0502040204020203" pitchFamily="34" charset="0"/>
-              </a:rPr>
-              <a:t>לזירה, זיהוי וסיווג </a:t>
-            </a:r>
-            <a:r>
-              <a:rPr lang="he-IL" sz="2400" kern="0" dirty="0">
-                <a:latin typeface="Segoe UI Light" panose="020B0502040204020203" pitchFamily="34" charset="0"/>
-                <a:cs typeface="Segoe UI Light" panose="020B0502040204020203" pitchFamily="34" charset="0"/>
-              </a:rPr>
-              <a:t>של </a:t>
-            </a:r>
-            <a:r>
-              <a:rPr lang="he-IL" sz="2400" kern="0" dirty="0" smtClean="0">
-                <a:latin typeface="Segoe UI Light" panose="020B0502040204020203" pitchFamily="34" charset="0"/>
-                <a:cs typeface="Segoe UI Light" panose="020B0502040204020203" pitchFamily="34" charset="0"/>
-              </a:rPr>
-              <a:t>החומרים:</a:t>
-            </a:r>
-          </a:p>
-          <a:p>
-            <a:pPr marL="742950" lvl="1" indent="-285750" algn="r" rtl="1">
-              <a:buFont typeface="Arial" panose="020B0604020202020204" pitchFamily="34" charset="0"/>
-              <a:buChar char="•"/>
-            </a:pPr>
-            <a:r>
-              <a:rPr lang="he-IL" sz="2400" kern="0" dirty="0" smtClean="0">
-                <a:latin typeface="Segoe UI Light" panose="020B0502040204020203" pitchFamily="34" charset="0"/>
-                <a:cs typeface="Segoe UI Light" panose="020B0502040204020203" pitchFamily="34" charset="0"/>
-              </a:rPr>
-              <a:t>חומרי נפץ</a:t>
-            </a:r>
-          </a:p>
-          <a:p>
-            <a:pPr marL="742950" lvl="1" indent="-285750" algn="r" rtl="1">
-              <a:buFont typeface="Arial" panose="020B0604020202020204" pitchFamily="34" charset="0"/>
-              <a:buChar char="•"/>
-            </a:pPr>
-            <a:r>
-              <a:rPr lang="he-IL" sz="2400" kern="0" dirty="0" smtClean="0">
-                <a:latin typeface="Segoe UI Light" panose="020B0502040204020203" pitchFamily="34" charset="0"/>
-                <a:cs typeface="Segoe UI Light" panose="020B0502040204020203" pitchFamily="34" charset="0"/>
-              </a:rPr>
-              <a:t>סמים</a:t>
-            </a:r>
-            <a:endParaRPr lang="he-IL" sz="2400" kern="0" dirty="0">
-              <a:latin typeface="Segoe UI Light" panose="020B0502040204020203" pitchFamily="34" charset="0"/>
-              <a:cs typeface="Segoe UI Light" panose="020B0502040204020203" pitchFamily="34" charset="0"/>
-            </a:endParaRPr>
-          </a:p>
-          <a:p>
-            <a:pPr marL="742950" lvl="1" indent="-285750" algn="r" rtl="1">
-              <a:buFont typeface="Arial" panose="020B0604020202020204" pitchFamily="34" charset="0"/>
-              <a:buChar char="•"/>
-            </a:pPr>
-            <a:r>
-              <a:rPr lang="he-IL" sz="2400" kern="0" dirty="0" smtClean="0">
-                <a:latin typeface="Segoe UI Light" panose="020B0502040204020203" pitchFamily="34" charset="0"/>
-                <a:cs typeface="Segoe UI Light" panose="020B0502040204020203" pitchFamily="34" charset="0"/>
-              </a:rPr>
-              <a:t>רעלים</a:t>
-            </a:r>
-          </a:p>
-          <a:p>
-            <a:pPr marL="742950" lvl="1" indent="-285750" algn="r" rtl="1">
-              <a:buFont typeface="Arial" panose="020B0604020202020204" pitchFamily="34" charset="0"/>
-              <a:buChar char="•"/>
-            </a:pPr>
-            <a:r>
-              <a:rPr lang="he-IL" sz="2400" kern="0" dirty="0" smtClean="0">
-                <a:latin typeface="Segoe UI Light" panose="020B0502040204020203" pitchFamily="34" charset="0"/>
-                <a:cs typeface="Segoe UI Light" panose="020B0502040204020203" pitchFamily="34" charset="0"/>
-              </a:rPr>
-              <a:t>תרופות אסורות</a:t>
-            </a:r>
-          </a:p>
-          <a:p>
-            <a:pPr marL="742950" lvl="1" indent="-285750" algn="r" rtl="1">
-              <a:buFont typeface="Arial" panose="020B0604020202020204" pitchFamily="34" charset="0"/>
-              <a:buChar char="•"/>
-            </a:pPr>
-            <a:r>
-              <a:rPr lang="he-IL" sz="2400" kern="0" dirty="0" smtClean="0">
-                <a:latin typeface="Segoe UI Light" panose="020B0502040204020203" pitchFamily="34" charset="0"/>
-                <a:cs typeface="Segoe UI Light" panose="020B0502040204020203" pitchFamily="34" charset="0"/>
-              </a:rPr>
-              <a:t>זיופי אלכוהול</a:t>
-            </a:r>
-          </a:p>
-          <a:p>
-            <a:pPr lvl="1" algn="r" rtl="1"/>
-            <a:endParaRPr lang="he-IL" sz="2400" dirty="0" smtClean="0"/>
-          </a:p>
-          <a:p>
-            <a:pPr marL="285750" indent="-285750" algn="r" rtl="1">
-              <a:buFont typeface="Arial" panose="020B0604020202020204" pitchFamily="34" charset="0"/>
-              <a:buChar char="•"/>
-            </a:pPr>
-            <a:r>
-              <a:rPr lang="he-IL" sz="2400" kern="0" dirty="0" smtClean="0">
-                <a:latin typeface="Segoe UI Light" panose="020B0502040204020203" pitchFamily="34" charset="0"/>
-                <a:cs typeface="Segoe UI Light" panose="020B0502040204020203" pitchFamily="34" charset="0"/>
-              </a:rPr>
-              <a:t>האקדח מזהה את החומרים ע"י קרן לייזר ייחודית אשר פותחה במעבדות</a:t>
-            </a:r>
-            <a:r>
-              <a:rPr lang="en-US" sz="2400" kern="0" dirty="0" smtClean="0">
-                <a:latin typeface="Segoe UI Light" panose="020B0502040204020203" pitchFamily="34" charset="0"/>
-                <a:cs typeface="Segoe UI Light" panose="020B0502040204020203" pitchFamily="34" charset="0"/>
-              </a:rPr>
-              <a:t/>
-            </a:r>
-            <a:br>
-              <a:rPr lang="en-US" sz="2400" kern="0" dirty="0" smtClean="0">
-                <a:latin typeface="Segoe UI Light" panose="020B0502040204020203" pitchFamily="34" charset="0"/>
-                <a:cs typeface="Segoe UI Light" panose="020B0502040204020203" pitchFamily="34" charset="0"/>
-              </a:rPr>
-            </a:br>
-            <a:r>
-              <a:rPr lang="he-IL" sz="2400" kern="0" dirty="0" smtClean="0">
-                <a:latin typeface="Segoe UI Light" panose="020B0502040204020203" pitchFamily="34" charset="0"/>
-                <a:cs typeface="Segoe UI Light" panose="020B0502040204020203" pitchFamily="34" charset="0"/>
-              </a:rPr>
-              <a:t>החברה, אשר האור החוזר </a:t>
-            </a:r>
-            <a:r>
-              <a:rPr lang="he-IL" sz="2400" kern="0" dirty="0" smtClean="0">
-                <a:latin typeface="Segoe UI Light" panose="020B0502040204020203" pitchFamily="34" charset="0"/>
-                <a:cs typeface="Segoe UI Light" panose="020B0502040204020203" pitchFamily="34" charset="0"/>
-              </a:rPr>
-              <a:t>ממנה </a:t>
-            </a:r>
-            <a:r>
-              <a:rPr lang="he-IL" sz="2400" kern="0" dirty="0" smtClean="0">
-                <a:latin typeface="Segoe UI Light" panose="020B0502040204020203" pitchFamily="34" charset="0"/>
-                <a:cs typeface="Segoe UI Light" panose="020B0502040204020203" pitchFamily="34" charset="0"/>
-              </a:rPr>
-              <a:t>לאחר לזירת חומרים הינו ייחודי לכל חומר.</a:t>
-            </a:r>
           </a:p>
         </p:txBody>
       </p:sp>
@@ -7821,7 +6985,7 @@
         </p:blipFill>
         <p:spPr bwMode="auto">
           <a:xfrm>
-            <a:off x="-764609" y="1575308"/>
+            <a:off x="-764607" y="1575308"/>
             <a:ext cx="5196840" cy="3458210"/>
           </a:xfrm>
           <a:prstGeom prst="rect">
@@ -7833,10 +6997,143 @@
           </a:ln>
         </p:spPr>
       </p:pic>
+      <p:sp>
+        <p:nvSpPr>
+          <p:cNvPr id="2" name="TextBox 1"/>
+          <p:cNvSpPr txBox="1"/>
+          <p:nvPr/>
+        </p:nvSpPr>
+        <p:spPr>
+          <a:xfrm>
+            <a:off x="3089430" y="1724759"/>
+            <a:ext cx="8864274" cy="4524315"/>
+          </a:xfrm>
+          <a:prstGeom prst="rect">
+            <a:avLst/>
+          </a:prstGeom>
+          <a:noFill/>
+        </p:spPr>
+        <p:txBody>
+          <a:bodyPr wrap="square" rtlCol="0">
+            <a:spAutoFit/>
+          </a:bodyPr>
+          <a:lstStyle/>
+          <a:p>
+            <a:pPr marL="342900" indent="-342900" algn="r" rtl="1">
+              <a:buFont typeface="Arial" panose="020B0604020202020204" pitchFamily="34" charset="0"/>
+              <a:buChar char="•"/>
+            </a:pPr>
+            <a:r>
+              <a:rPr lang="he-IL" sz="2400" kern="0" dirty="0" smtClean="0">
+                <a:latin typeface="Segoe UI Light" panose="020B0502040204020203" pitchFamily="34" charset="0"/>
+                <a:cs typeface="Segoe UI Light" panose="020B0502040204020203" pitchFamily="34" charset="0"/>
+              </a:rPr>
+              <a:t>כיום </a:t>
+            </a:r>
+            <a:r>
+              <a:rPr lang="he-IL" sz="2400" kern="0" dirty="0">
+                <a:latin typeface="Segoe UI Light" panose="020B0502040204020203" pitchFamily="34" charset="0"/>
+                <a:cs typeface="Segoe UI Light" panose="020B0502040204020203" pitchFamily="34" charset="0"/>
+              </a:rPr>
+              <a:t>החברה מספקת אקדח לייזר המאפשר לזירה על חומרים חשודים וזיהוים על בסיס מסד נתונים פנימי באקדח אשר מעודכן ידנית. </a:t>
+            </a:r>
+            <a:endParaRPr lang="he-IL" sz="2400" kern="0" dirty="0" smtClean="0">
+              <a:latin typeface="Segoe UI Light" panose="020B0502040204020203" pitchFamily="34" charset="0"/>
+              <a:cs typeface="Segoe UI Light" panose="020B0502040204020203" pitchFamily="34" charset="0"/>
+            </a:endParaRPr>
+          </a:p>
+          <a:p>
+            <a:pPr algn="r" rtl="1"/>
+            <a:endParaRPr lang="he-IL" sz="2400" kern="0" dirty="0" smtClean="0">
+              <a:latin typeface="Segoe UI Light" panose="020B0502040204020203" pitchFamily="34" charset="0"/>
+              <a:cs typeface="Segoe UI Light" panose="020B0502040204020203" pitchFamily="34" charset="0"/>
+            </a:endParaRPr>
+          </a:p>
+          <a:p>
+            <a:pPr marL="342900" indent="-342900" algn="r" rtl="1">
+              <a:buFont typeface="Arial" panose="020B0604020202020204" pitchFamily="34" charset="0"/>
+              <a:buChar char="•"/>
+            </a:pPr>
+            <a:r>
+              <a:rPr lang="he-IL" sz="2400" kern="0" dirty="0" smtClean="0">
+                <a:latin typeface="Segoe UI Light" panose="020B0502040204020203" pitchFamily="34" charset="0"/>
+                <a:cs typeface="Segoe UI Light" panose="020B0502040204020203" pitchFamily="34" charset="0"/>
+              </a:rPr>
+              <a:t>כל </a:t>
+            </a:r>
+            <a:r>
+              <a:rPr lang="he-IL" sz="2400" kern="0" dirty="0">
+                <a:latin typeface="Segoe UI Light" panose="020B0502040204020203" pitchFamily="34" charset="0"/>
+                <a:cs typeface="Segoe UI Light" panose="020B0502040204020203" pitchFamily="34" charset="0"/>
+              </a:rPr>
+              <a:t>חומר אשר מזוהה ע"י האקדח מתועד לוקאלית בזיכרון האקדח לקובץ </a:t>
+            </a:r>
+            <a:r>
+              <a:rPr lang="en-US" sz="2400" kern="0" dirty="0">
+                <a:latin typeface="Segoe UI Light" panose="020B0502040204020203" pitchFamily="34" charset="0"/>
+                <a:cs typeface="Segoe UI Light" panose="020B0502040204020203" pitchFamily="34" charset="0"/>
+              </a:rPr>
+              <a:t>log</a:t>
+            </a:r>
+            <a:r>
+              <a:rPr lang="he-IL" sz="2400" kern="0" dirty="0">
+                <a:latin typeface="Segoe UI Light" panose="020B0502040204020203" pitchFamily="34" charset="0"/>
+                <a:cs typeface="Segoe UI Light" panose="020B0502040204020203" pitchFamily="34" charset="0"/>
+              </a:rPr>
+              <a:t> אשר מכיל פרטים על החומר שזוהה, את חתימת החומר ואת פרטי האדם שהחזיק </a:t>
+            </a:r>
+            <a:r>
+              <a:rPr lang="he-IL" sz="2400" kern="0" dirty="0" smtClean="0">
+                <a:latin typeface="Segoe UI Light" panose="020B0502040204020203" pitchFamily="34" charset="0"/>
+                <a:cs typeface="Segoe UI Light" panose="020B0502040204020203" pitchFamily="34" charset="0"/>
+              </a:rPr>
+              <a:t>בחומר.</a:t>
+            </a:r>
+          </a:p>
+          <a:p>
+            <a:pPr algn="r" rtl="1"/>
+            <a:endParaRPr lang="he-IL" sz="2400" kern="0" dirty="0">
+              <a:latin typeface="Segoe UI Light" panose="020B0502040204020203" pitchFamily="34" charset="0"/>
+              <a:cs typeface="Segoe UI Light" panose="020B0502040204020203" pitchFamily="34" charset="0"/>
+            </a:endParaRPr>
+          </a:p>
+          <a:p>
+            <a:pPr marL="342900" indent="-342900" algn="r" rtl="1">
+              <a:buFont typeface="Arial" panose="020B0604020202020204" pitchFamily="34" charset="0"/>
+              <a:buChar char="•"/>
+            </a:pPr>
+            <a:r>
+              <a:rPr lang="he-IL" sz="2400" kern="0" dirty="0" smtClean="0">
+                <a:latin typeface="Segoe UI Light" panose="020B0502040204020203" pitchFamily="34" charset="0"/>
+                <a:cs typeface="Segoe UI Light" panose="020B0502040204020203" pitchFamily="34" charset="0"/>
+              </a:rPr>
+              <a:t>המוצר </a:t>
+            </a:r>
+            <a:r>
+              <a:rPr lang="he-IL" sz="2400" kern="0" dirty="0">
+                <a:latin typeface="Segoe UI Light" panose="020B0502040204020203" pitchFamily="34" charset="0"/>
+                <a:cs typeface="Segoe UI Light" panose="020B0502040204020203" pitchFamily="34" charset="0"/>
+              </a:rPr>
+              <a:t>הקיים דורש ניתוח נתונים ותחזוקה ידנית אשר אינה מאפשרת שימוש במידע ממספר אקדחים או מידע קודם, מכיוון שהמידע אינו נאגר כלל במסד נתונים חיצוני </a:t>
+            </a:r>
+            <a:r>
+              <a:rPr lang="he-IL" sz="2400" kern="0" dirty="0" smtClean="0">
+                <a:latin typeface="Segoe UI Light" panose="020B0502040204020203" pitchFamily="34" charset="0"/>
+                <a:cs typeface="Segoe UI Light" panose="020B0502040204020203" pitchFamily="34" charset="0"/>
+              </a:rPr>
+              <a:t>ואינו ממצא את הפוטנציאל שבו.</a:t>
+            </a:r>
+            <a:endParaRPr lang="en-US" sz="2400" kern="0" dirty="0">
+              <a:latin typeface="Segoe UI Light" panose="020B0502040204020203" pitchFamily="34" charset="0"/>
+              <a:cs typeface="Segoe UI Light" panose="020B0502040204020203" pitchFamily="34" charset="0"/>
+            </a:endParaRPr>
+          </a:p>
+        </p:txBody>
+      </p:sp>
     </p:spTree>
     <p:extLst>
       <p:ext uri="{BB962C8B-B14F-4D97-AF65-F5344CB8AC3E}">
-        <p14:creationId xmlns:p14="http://schemas.microsoft.com/office/powerpoint/2010/main" val="1629862147"/>
+        <p14:creationId xmlns:p14="http://schemas.microsoft.com/office/powerpoint/2010/main" val="3702739002"/>
       </p:ext>
     </p:extLst>
   </p:cSld>
@@ -8380,7 +7677,7 @@
                 <a:latin typeface="Segoe UI Semibold" panose="020B0702040204020203" pitchFamily="34" charset="0"/>
                 <a:cs typeface="Segoe UI Semibold" panose="020B0702040204020203" pitchFamily="34" charset="0"/>
               </a:rPr>
-              <a:t>תיאור הבעיה</a:t>
+              <a:t>תיאור הפתרון המוצע</a:t>
             </a:r>
             <a:endParaRPr kumimoji="0" lang="he-IL" i="0" u="sng" strike="noStrike" kern="0" cap="none" spc="0" normalizeH="0" baseline="0" noProof="0" dirty="0">
               <a:ln>
@@ -8398,39 +7695,6 @@
           </a:p>
         </p:txBody>
       </p:sp>
-      <p:pic>
-        <p:nvPicPr>
-          <p:cNvPr id="13" name="Picture 12" descr="C:\Users\Dell\AppData\Local\Microsoft\Windows\INetCacheContent.Word\ASH0043.png"/>
-          <p:cNvPicPr/>
-          <p:nvPr/>
-        </p:nvPicPr>
-        <p:blipFill>
-          <a:blip r:embed="rId3" cstate="print">
-            <a:extLst>
-              <a:ext uri="{28A0092B-C50C-407E-A947-70E740481C1C}">
-                <a14:useLocalDpi xmlns:a14="http://schemas.microsoft.com/office/drawing/2010/main"/>
-              </a:ext>
-            </a:extLst>
-          </a:blip>
-          <a:srcRect/>
-          <a:stretch>
-            <a:fillRect/>
-          </a:stretch>
-        </p:blipFill>
-        <p:spPr bwMode="auto">
-          <a:xfrm>
-            <a:off x="-764607" y="1575308"/>
-            <a:ext cx="5196840" cy="3458210"/>
-          </a:xfrm>
-          <a:prstGeom prst="rect">
-            <a:avLst/>
-          </a:prstGeom>
-          <a:noFill/>
-          <a:ln>
-            <a:noFill/>
-          </a:ln>
-        </p:spPr>
-      </p:pic>
       <p:sp>
         <p:nvSpPr>
           <p:cNvPr id="2" name="TextBox 1"/>
@@ -8439,8 +7703,8 @@
         </p:nvSpPr>
         <p:spPr>
           <a:xfrm>
-            <a:off x="3089430" y="1724759"/>
-            <a:ext cx="8864274" cy="4524315"/>
+            <a:off x="238298" y="1724759"/>
+            <a:ext cx="11715405" cy="4154984"/>
           </a:xfrm>
           <a:prstGeom prst="rect">
             <a:avLst/>
@@ -8462,19 +7726,22 @@
                 <a:latin typeface="Segoe UI Light" panose="020B0502040204020203" pitchFamily="34" charset="0"/>
                 <a:cs typeface="Segoe UI Light" panose="020B0502040204020203" pitchFamily="34" charset="0"/>
               </a:rPr>
-              <a:t>כיום </a:t>
-            </a:r>
-            <a:r>
-              <a:rPr lang="he-IL" sz="2400" kern="0" dirty="0">
+              <a:t>נספק לכל יחידה בשטח מחשב שליטה נייד ועמיד, אשר יפעיל את מערכת השו"ב וישדר רשת אלחוטית (</a:t>
+            </a:r>
+            <a:r>
+              <a:rPr lang="en-US" sz="2400" kern="0" dirty="0" smtClean="0">
                 <a:latin typeface="Segoe UI Light" panose="020B0502040204020203" pitchFamily="34" charset="0"/>
                 <a:cs typeface="Segoe UI Light" panose="020B0502040204020203" pitchFamily="34" charset="0"/>
               </a:rPr>
-              <a:t>החברה מספקת אקדח לייזר המאפשר לזירה על חומרים חשודים וזיהוים על בסיס מסד נתונים פנימי באקדח אשר מעודכן ידנית. </a:t>
-            </a:r>
-            <a:endParaRPr lang="he-IL" sz="2400" kern="0" dirty="0" smtClean="0">
-              <a:latin typeface="Segoe UI Light" panose="020B0502040204020203" pitchFamily="34" charset="0"/>
-              <a:cs typeface="Segoe UI Light" panose="020B0502040204020203" pitchFamily="34" charset="0"/>
-            </a:endParaRPr>
+              <a:t>HotSpot</a:t>
+            </a:r>
+            <a:r>
+              <a:rPr lang="he-IL" sz="2400" kern="0" dirty="0" smtClean="0">
+                <a:latin typeface="Segoe UI Light" panose="020B0502040204020203" pitchFamily="34" charset="0"/>
+                <a:cs typeface="Segoe UI Light" panose="020B0502040204020203" pitchFamily="34" charset="0"/>
+              </a:rPr>
+              <a:t>).</a:t>
+            </a:r>
           </a:p>
           <a:p>
             <a:pPr algn="r" rtl="1"/>
@@ -8493,35 +7760,100 @@
                 <a:latin typeface="Segoe UI Light" panose="020B0502040204020203" pitchFamily="34" charset="0"/>
                 <a:cs typeface="Segoe UI Light" panose="020B0502040204020203" pitchFamily="34" charset="0"/>
               </a:rPr>
-              <a:t>כל </a:t>
+              <a:t>נבנה מערכת שו"ב אשר תותקן על מחשב השטח, תציג </a:t>
             </a:r>
             <a:r>
               <a:rPr lang="he-IL" sz="2400" kern="0" dirty="0">
                 <a:latin typeface="Segoe UI Light" panose="020B0502040204020203" pitchFamily="34" charset="0"/>
                 <a:cs typeface="Segoe UI Light" panose="020B0502040204020203" pitchFamily="34" charset="0"/>
               </a:rPr>
-              <a:t>חומר אשר מזוהה ע"י האקדח מתועד לוקאלית בזיכרון האקדח לקובץ </a:t>
-            </a:r>
-            <a:r>
-              <a:rPr lang="en-US" sz="2400" kern="0" dirty="0">
+              <a:t>ממשק משתמש </a:t>
+            </a:r>
+            <a:r>
+              <a:rPr lang="he-IL" sz="2400" kern="0" dirty="0" smtClean="0">
                 <a:latin typeface="Segoe UI Light" panose="020B0502040204020203" pitchFamily="34" charset="0"/>
                 <a:cs typeface="Segoe UI Light" panose="020B0502040204020203" pitchFamily="34" charset="0"/>
               </a:rPr>
-              <a:t>log</a:t>
+              <a:t>גרפי, </a:t>
             </a:r>
             <a:r>
               <a:rPr lang="he-IL" sz="2400" kern="0" dirty="0">
                 <a:latin typeface="Segoe UI Light" panose="020B0502040204020203" pitchFamily="34" charset="0"/>
                 <a:cs typeface="Segoe UI Light" panose="020B0502040204020203" pitchFamily="34" charset="0"/>
               </a:rPr>
-              <a:t> אשר מכיל פרטים על החומר שזוהה, את חתימת החומר ואת פרטי האדם שהחזיק </a:t>
+              <a:t>ידידותי ואינטואיטבי, מבוסס </a:t>
             </a:r>
             <a:r>
               <a:rPr lang="he-IL" sz="2400" kern="0" dirty="0" smtClean="0">
                 <a:latin typeface="Segoe UI Light" panose="020B0502040204020203" pitchFamily="34" charset="0"/>
                 <a:cs typeface="Segoe UI Light" panose="020B0502040204020203" pitchFamily="34" charset="0"/>
               </a:rPr>
-              <a:t>בחומר.</a:t>
+              <a:t>מפה.</a:t>
+            </a:r>
+          </a:p>
+          <a:p>
+            <a:pPr marL="342900" indent="-342900" algn="r" rtl="1">
+              <a:buFont typeface="Arial" panose="020B0604020202020204" pitchFamily="34" charset="0"/>
+              <a:buChar char="•"/>
+            </a:pPr>
+            <a:endParaRPr lang="he-IL" sz="2400" kern="0" dirty="0">
+              <a:latin typeface="Segoe UI Light" panose="020B0502040204020203" pitchFamily="34" charset="0"/>
+              <a:cs typeface="Segoe UI Light" panose="020B0502040204020203" pitchFamily="34" charset="0"/>
+            </a:endParaRPr>
+          </a:p>
+          <a:p>
+            <a:pPr marL="342900" indent="-342900" algn="r" rtl="1">
+              <a:buFont typeface="Arial" panose="020B0604020202020204" pitchFamily="34" charset="0"/>
+              <a:buChar char="•"/>
+            </a:pPr>
+            <a:r>
+              <a:rPr lang="he-IL" sz="2400" kern="0" dirty="0" smtClean="0">
+                <a:latin typeface="Segoe UI Light" panose="020B0502040204020203" pitchFamily="34" charset="0"/>
+                <a:cs typeface="Segoe UI Light" panose="020B0502040204020203" pitchFamily="34" charset="0"/>
+              </a:rPr>
+              <a:t>המערכת תציג </a:t>
+            </a:r>
+            <a:r>
+              <a:rPr lang="he-IL" sz="2400" kern="0" dirty="0">
+                <a:latin typeface="Segoe UI Light" panose="020B0502040204020203" pitchFamily="34" charset="0"/>
+                <a:cs typeface="Segoe UI Light" panose="020B0502040204020203" pitchFamily="34" charset="0"/>
+              </a:rPr>
+              <a:t>את המידע הנשלף בזמן אמת מן האקדחים, </a:t>
+            </a:r>
+            <a:r>
+              <a:rPr lang="he-IL" sz="2400" kern="0" dirty="0" smtClean="0">
+                <a:latin typeface="Segoe UI Light" panose="020B0502040204020203" pitchFamily="34" charset="0"/>
+                <a:cs typeface="Segoe UI Light" panose="020B0502040204020203" pitchFamily="34" charset="0"/>
+              </a:rPr>
+              <a:t>תבצע </a:t>
+            </a:r>
+            <a:r>
+              <a:rPr lang="he-IL" sz="2400" kern="0" dirty="0">
+                <a:latin typeface="Segoe UI Light" panose="020B0502040204020203" pitchFamily="34" charset="0"/>
+                <a:cs typeface="Segoe UI Light" panose="020B0502040204020203" pitchFamily="34" charset="0"/>
+              </a:rPr>
+              <a:t>ניתוח </a:t>
+            </a:r>
+            <a:r>
+              <a:rPr lang="he-IL" sz="2400" kern="0" dirty="0" smtClean="0">
+                <a:latin typeface="Segoe UI Light" panose="020B0502040204020203" pitchFamily="34" charset="0"/>
+                <a:cs typeface="Segoe UI Light" panose="020B0502040204020203" pitchFamily="34" charset="0"/>
+              </a:rPr>
+              <a:t>ותתריע </a:t>
+            </a:r>
+            <a:r>
+              <a:rPr lang="he-IL" sz="2400" kern="0" dirty="0">
+                <a:latin typeface="Segoe UI Light" panose="020B0502040204020203" pitchFamily="34" charset="0"/>
+                <a:cs typeface="Segoe UI Light" panose="020B0502040204020203" pitchFamily="34" charset="0"/>
+              </a:rPr>
+              <a:t>על איומים רלוונטים בזמן אמת</a:t>
+            </a:r>
+            <a:r>
+              <a:rPr lang="he-IL" sz="2400" kern="0" dirty="0" smtClean="0">
+                <a:latin typeface="Segoe UI Light" panose="020B0502040204020203" pitchFamily="34" charset="0"/>
+                <a:cs typeface="Segoe UI Light" panose="020B0502040204020203" pitchFamily="34" charset="0"/>
+              </a:rPr>
+              <a:t>.</a:t>
             </a:r>
           </a:p>
           <a:p>
@@ -8541,21 +7873,7 @@
                 <a:latin typeface="Segoe UI Light" panose="020B0502040204020203" pitchFamily="34" charset="0"/>
                 <a:cs typeface="Segoe UI Light" panose="020B0502040204020203" pitchFamily="34" charset="0"/>
               </a:rPr>
-              <a:t>המוצר </a:t>
-            </a:r>
-            <a:r>
-              <a:rPr lang="he-IL" sz="2400" kern="0" dirty="0">
-                <a:latin typeface="Segoe UI Light" panose="020B0502040204020203" pitchFamily="34" charset="0"/>
-                <a:cs typeface="Segoe UI Light" panose="020B0502040204020203" pitchFamily="34" charset="0"/>
-              </a:rPr>
-              <a:t>הקיים דורש ניתוח נתונים ותחזוקה ידנית אשר אינה מאפשרת שימוש במידע ממספר אקדחים או מידע קודם, מכיוון שהמידע אינו נאגר כלל במסד נתונים חיצוני </a:t>
-            </a:r>
-            <a:r>
-              <a:rPr lang="he-IL" sz="2400" kern="0" dirty="0" smtClean="0">
-                <a:latin typeface="Segoe UI Light" panose="020B0502040204020203" pitchFamily="34" charset="0"/>
-                <a:cs typeface="Segoe UI Light" panose="020B0502040204020203" pitchFamily="34" charset="0"/>
-              </a:rPr>
-              <a:t>ואינו ממצא את הפוטנציאל שבו.</a:t>
+              <a:t>נוסיף לאקדח ממשק תקשורת אלחוטית אשר באמצעותו ניתן יהיה לתקשר עימו ולשלוף ממנו מידע.</a:t>
             </a:r>
             <a:endParaRPr lang="en-US" sz="2400" kern="0" dirty="0">
               <a:latin typeface="Segoe UI Light" panose="020B0502040204020203" pitchFamily="34" charset="0"/>
@@ -8567,7 +7885,7 @@
     </p:spTree>
     <p:extLst>
       <p:ext uri="{BB962C8B-B14F-4D97-AF65-F5344CB8AC3E}">
-        <p14:creationId xmlns:p14="http://schemas.microsoft.com/office/powerpoint/2010/main" val="3702739002"/>
+        <p14:creationId xmlns:p14="http://schemas.microsoft.com/office/powerpoint/2010/main" val="1562633884"/>
       </p:ext>
     </p:extLst>
   </p:cSld>
@@ -8610,7 +7928,7 @@
           <p:nvPr/>
         </p:nvPicPr>
         <p:blipFill rotWithShape="1">
-          <a:blip r:embed="rId2" cstate="screen">
+          <a:blip r:embed="rId3" cstate="screen">
             <a:extLst>
               <a:ext uri="{28A0092B-C50C-407E-A947-70E740481C1C}">
                 <a14:useLocalDpi xmlns:a14="http://schemas.microsoft.com/office/drawing/2010/main"/>
@@ -8622,7 +7940,7 @@
         </p:blipFill>
         <p:spPr>
           <a:xfrm>
-            <a:off x="0" y="0"/>
+            <a:off x="-1" y="0"/>
             <a:ext cx="12192001" cy="6858000"/>
           </a:xfrm>
           <a:prstGeom prst="rect">
@@ -9138,7 +8456,7 @@
         <p:spPr>
           <a:xfrm>
             <a:off x="238298" y="1724759"/>
-            <a:ext cx="11715405" cy="4154984"/>
+            <a:ext cx="11715405" cy="4524315"/>
           </a:xfrm>
           <a:prstGeom prst="rect">
             <a:avLst/>
@@ -9160,26 +8478,12 @@
                 <a:latin typeface="Segoe UI Light" panose="020B0502040204020203" pitchFamily="34" charset="0"/>
                 <a:cs typeface="Segoe UI Light" panose="020B0502040204020203" pitchFamily="34" charset="0"/>
               </a:rPr>
-              <a:t>נספק לכל יחידה בשטח מחשב שליטה נייד ועמיד, אשר יפעיל את מערכת השו"ב וישדר רשת אלחוטית (</a:t>
-            </a:r>
-            <a:r>
-              <a:rPr lang="en-US" sz="2400" kern="0" dirty="0" err="1" smtClean="0">
-                <a:latin typeface="Segoe UI Light" panose="020B0502040204020203" pitchFamily="34" charset="0"/>
-                <a:cs typeface="Segoe UI Light" panose="020B0502040204020203" pitchFamily="34" charset="0"/>
-              </a:rPr>
-              <a:t>HotSpot</a:t>
-            </a:r>
-            <a:r>
-              <a:rPr lang="he-IL" sz="2400" kern="0" dirty="0" smtClean="0">
-                <a:latin typeface="Segoe UI Light" panose="020B0502040204020203" pitchFamily="34" charset="0"/>
-                <a:cs typeface="Segoe UI Light" panose="020B0502040204020203" pitchFamily="34" charset="0"/>
-              </a:rPr>
-              <a:t>).</a:t>
+              <a:t>נקים שרת מרכזי אשר יאזין לבקשות מערכות השו"ב, ינהל מסד נתונים מרכזי שישמור, יתעד ויספק את המידע המבוקש ע"פ דרישה.</a:t>
             </a:r>
           </a:p>
           <a:p>
             <a:pPr algn="r" rtl="1"/>
-            <a:endParaRPr lang="he-IL" sz="2400" kern="0" dirty="0" smtClean="0">
+            <a:endParaRPr lang="he-IL" sz="2400" kern="0" dirty="0">
               <a:latin typeface="Segoe UI Light" panose="020B0502040204020203" pitchFamily="34" charset="0"/>
               <a:cs typeface="Segoe UI Light" panose="020B0502040204020203" pitchFamily="34" charset="0"/>
             </a:endParaRPr>
@@ -9194,35 +8498,28 @@
                 <a:latin typeface="Segoe UI Light" panose="020B0502040204020203" pitchFamily="34" charset="0"/>
                 <a:cs typeface="Segoe UI Light" panose="020B0502040204020203" pitchFamily="34" charset="0"/>
               </a:rPr>
-              <a:t>נבנה מערכת שו"ב אשר תותקן על מחשב השטח, תציג </a:t>
-            </a:r>
-            <a:r>
-              <a:rPr lang="he-IL" sz="2400" kern="0" dirty="0">
+              <a:t>נוסיף למחשב השטח משיב מיקום חיצוני אשר באמצעותו, מערכת השו"ב תוסיף לכל זיהוי אשר נשלף מן האקדח חתימת מיקום (</a:t>
+            </a:r>
+            <a:r>
+              <a:rPr lang="en-US" sz="2400" kern="0" dirty="0" smtClean="0">
                 <a:latin typeface="Segoe UI Light" panose="020B0502040204020203" pitchFamily="34" charset="0"/>
                 <a:cs typeface="Segoe UI Light" panose="020B0502040204020203" pitchFamily="34" charset="0"/>
               </a:rPr>
-              <a:t>ממשק משתמש </a:t>
+              <a:t>GPS</a:t>
             </a:r>
             <a:r>
               <a:rPr lang="he-IL" sz="2400" kern="0" dirty="0" smtClean="0">
                 <a:latin typeface="Segoe UI Light" panose="020B0502040204020203" pitchFamily="34" charset="0"/>
                 <a:cs typeface="Segoe UI Light" panose="020B0502040204020203" pitchFamily="34" charset="0"/>
               </a:rPr>
-              <a:t>גרפי, </a:t>
-            </a:r>
-            <a:r>
-              <a:rPr lang="he-IL" sz="2400" kern="0" dirty="0">
-                <a:latin typeface="Segoe UI Light" panose="020B0502040204020203" pitchFamily="34" charset="0"/>
-                <a:cs typeface="Segoe UI Light" panose="020B0502040204020203" pitchFamily="34" charset="0"/>
-              </a:rPr>
-              <a:t>ידידותי ואינטואיטבי, מבוסס </a:t>
+              <a:t>) שתשמש להצגת וניתוח המידע בהמשך</a:t>
             </a:r>
             <a:r>
               <a:rPr lang="he-IL" sz="2400" kern="0" dirty="0" smtClean="0">
                 <a:latin typeface="Segoe UI Light" panose="020B0502040204020203" pitchFamily="34" charset="0"/>
                 <a:cs typeface="Segoe UI Light" panose="020B0502040204020203" pitchFamily="34" charset="0"/>
               </a:rPr>
-              <a:t>מפה.</a:t>
+              <a:t>.</a:t>
             </a:r>
           </a:p>
           <a:p>
@@ -9241,57 +8538,67 @@
               <a:buChar char="•"/>
             </a:pPr>
             <a:r>
+              <a:rPr lang="he-IL" sz="2400" b="1" kern="0" dirty="0" smtClean="0">
+                <a:latin typeface="Segoe UI Light" panose="020B0502040204020203" pitchFamily="34" charset="0"/>
+                <a:cs typeface="Segoe UI Light" panose="020B0502040204020203" pitchFamily="34" charset="0"/>
+              </a:rPr>
+              <a:t>אלגוריתם ה</a:t>
+            </a:r>
+            <a:r>
+              <a:rPr lang="en-US" sz="2400" b="1" kern="0" dirty="0" smtClean="0">
+                <a:latin typeface="Segoe UI Light" panose="020B0502040204020203" pitchFamily="34" charset="0"/>
+                <a:cs typeface="Segoe UI Light" panose="020B0502040204020203" pitchFamily="34" charset="0"/>
+              </a:rPr>
+              <a:t>Material </a:t>
+            </a:r>
+            <a:r>
+              <a:rPr lang="en-US" sz="2400" b="1" kern="0" dirty="0">
+                <a:latin typeface="Segoe UI Light" panose="020B0502040204020203" pitchFamily="34" charset="0"/>
+                <a:cs typeface="Segoe UI Light" panose="020B0502040204020203" pitchFamily="34" charset="0"/>
+              </a:rPr>
+              <a:t>Coupling - </a:t>
+            </a:r>
+            <a:r>
               <a:rPr lang="he-IL" sz="2400" kern="0" dirty="0" smtClean="0">
                 <a:latin typeface="Segoe UI Light" panose="020B0502040204020203" pitchFamily="34" charset="0"/>
                 <a:cs typeface="Segoe UI Light" panose="020B0502040204020203" pitchFamily="34" charset="0"/>
               </a:rPr>
-              <a:t>המערכת תציג </a:t>
+              <a:t>: מימוש </a:t>
             </a:r>
             <a:r>
               <a:rPr lang="he-IL" sz="2400" kern="0" dirty="0">
                 <a:latin typeface="Segoe UI Light" panose="020B0502040204020203" pitchFamily="34" charset="0"/>
                 <a:cs typeface="Segoe UI Light" panose="020B0502040204020203" pitchFamily="34" charset="0"/>
               </a:rPr>
-              <a:t>את המידע הנשלף בזמן אמת מן האקדחים, </a:t>
+              <a:t>אלגוריתם אשר יתריע בזמן אמת על היתכנות שילוב של חומרים </a:t>
             </a:r>
             <a:r>
               <a:rPr lang="he-IL" sz="2400" kern="0" dirty="0" smtClean="0">
                 <a:latin typeface="Segoe UI Light" panose="020B0502040204020203" pitchFamily="34" charset="0"/>
                 <a:cs typeface="Segoe UI Light" panose="020B0502040204020203" pitchFamily="34" charset="0"/>
               </a:rPr>
-              <a:t>תבצע </a:t>
+              <a:t>מותרים, </a:t>
             </a:r>
             <a:r>
               <a:rPr lang="he-IL" sz="2400" kern="0" dirty="0">
                 <a:latin typeface="Segoe UI Light" panose="020B0502040204020203" pitchFamily="34" charset="0"/>
                 <a:cs typeface="Segoe UI Light" panose="020B0502040204020203" pitchFamily="34" charset="0"/>
               </a:rPr>
-              <a:t>ניתוח </a:t>
+              <a:t>אשר עלולים להביא ליצירת חומר </a:t>
             </a:r>
             <a:r>
               <a:rPr lang="he-IL" sz="2400" kern="0" dirty="0" smtClean="0">
                 <a:latin typeface="Segoe UI Light" panose="020B0502040204020203" pitchFamily="34" charset="0"/>
                 <a:cs typeface="Segoe UI Light" panose="020B0502040204020203" pitchFamily="34" charset="0"/>
               </a:rPr>
-              <a:t>ותתריע </a:t>
-            </a:r>
-            <a:r>
-              <a:rPr lang="he-IL" sz="2400" kern="0" dirty="0">
-                <a:latin typeface="Segoe UI Light" panose="020B0502040204020203" pitchFamily="34" charset="0"/>
-                <a:cs typeface="Segoe UI Light" panose="020B0502040204020203" pitchFamily="34" charset="0"/>
-              </a:rPr>
-              <a:t>על איומים רלוונטים בזמן אמת</a:t>
-            </a:r>
-            <a:r>
-              <a:rPr lang="he-IL" sz="2400" kern="0" dirty="0" smtClean="0">
-                <a:latin typeface="Segoe UI Light" panose="020B0502040204020203" pitchFamily="34" charset="0"/>
-                <a:cs typeface="Segoe UI Light" panose="020B0502040204020203" pitchFamily="34" charset="0"/>
-              </a:rPr>
-              <a:t>.</a:t>
-            </a:r>
-          </a:p>
-          <a:p>
-            <a:pPr algn="r" rtl="1"/>
+              <a:t>מסוכן אחר.</a:t>
+            </a:r>
+          </a:p>
+          <a:p>
+            <a:pPr marL="342900" indent="-342900" algn="r" rtl="1">
+              <a:buFont typeface="Arial" panose="020B0604020202020204" pitchFamily="34" charset="0"/>
+              <a:buChar char="•"/>
+            </a:pPr>
             <a:endParaRPr lang="he-IL" sz="2400" kern="0" dirty="0">
               <a:latin typeface="Segoe UI Light" panose="020B0502040204020203" pitchFamily="34" charset="0"/>
               <a:cs typeface="Segoe UI Light" panose="020B0502040204020203" pitchFamily="34" charset="0"/>
@@ -9303,650 +8610,74 @@
               <a:buChar char="•"/>
             </a:pPr>
             <a:r>
+              <a:rPr lang="he-IL" sz="2400" b="1" kern="0" dirty="0">
+                <a:latin typeface="Segoe UI Light" panose="020B0502040204020203" pitchFamily="34" charset="0"/>
+                <a:cs typeface="Segoe UI Light" panose="020B0502040204020203" pitchFamily="34" charset="0"/>
+              </a:rPr>
+              <a:t>אלגוריתם </a:t>
+            </a:r>
+            <a:r>
+              <a:rPr lang="he-IL" sz="2400" b="1" kern="0" dirty="0" smtClean="0">
+                <a:latin typeface="Segoe UI Light" panose="020B0502040204020203" pitchFamily="34" charset="0"/>
+                <a:cs typeface="Segoe UI Light" panose="020B0502040204020203" pitchFamily="34" charset="0"/>
+              </a:rPr>
+              <a:t>ה – </a:t>
+            </a:r>
+            <a:r>
+              <a:rPr lang="en-US" sz="2400" b="1" kern="0" dirty="0" err="1" smtClean="0">
+                <a:latin typeface="Segoe UI Light" panose="020B0502040204020203" pitchFamily="34" charset="0"/>
+                <a:cs typeface="Segoe UI Light" panose="020B0502040204020203" pitchFamily="34" charset="0"/>
+              </a:rPr>
+              <a:t>Narcotrafficking</a:t>
+            </a:r>
+            <a:r>
+              <a:rPr lang="he-IL" sz="2400" b="1" kern="0" dirty="0" smtClean="0">
+                <a:latin typeface="Segoe UI Light" panose="020B0502040204020203" pitchFamily="34" charset="0"/>
+                <a:cs typeface="Segoe UI Light" panose="020B0502040204020203" pitchFamily="34" charset="0"/>
+              </a:rPr>
+              <a:t>:</a:t>
+            </a:r>
+            <a:r>
               <a:rPr lang="he-IL" sz="2400" kern="0" dirty="0" smtClean="0">
                 <a:latin typeface="Segoe UI Light" panose="020B0502040204020203" pitchFamily="34" charset="0"/>
                 <a:cs typeface="Segoe UI Light" panose="020B0502040204020203" pitchFamily="34" charset="0"/>
               </a:rPr>
-              <a:t>נוסיף לאקדח ממשק תקשורת אלחוטית אשר באמצעותו ניתן יהיה לתקשר עימו ולשלוף ממנו מידע.</a:t>
-            </a:r>
-            <a:endParaRPr lang="en-US" sz="2400" kern="0" dirty="0">
-              <a:latin typeface="Segoe UI Light" panose="020B0502040204020203" pitchFamily="34" charset="0"/>
-              <a:cs typeface="Segoe UI Light" panose="020B0502040204020203" pitchFamily="34" charset="0"/>
-            </a:endParaRPr>
-          </a:p>
-        </p:txBody>
-      </p:sp>
-    </p:spTree>
-    <p:extLst>
-      <p:ext uri="{BB962C8B-B14F-4D97-AF65-F5344CB8AC3E}">
-        <p14:creationId xmlns:p14="http://schemas.microsoft.com/office/powerpoint/2010/main" val="1562633884"/>
-      </p:ext>
-    </p:extLst>
-  </p:cSld>
-  <p:clrMapOvr>
-    <a:masterClrMapping/>
-  </p:clrMapOvr>
-  <p:timing>
-    <p:tnLst>
-      <p:par>
-        <p:cTn id="1" dur="indefinite" restart="never" nodeType="tmRoot"/>
-      </p:par>
-    </p:tnLst>
-  </p:timing>
-</p:sld>
-</file>
-
-<file path=ppt/slides/slide5.xml><?xml version="1.0" encoding="utf-8"?>
-<p:sld xmlns:a="http://schemas.openxmlformats.org/drawingml/2006/main" xmlns:r="http://schemas.openxmlformats.org/officeDocument/2006/relationships" xmlns:p="http://schemas.openxmlformats.org/presentationml/2006/main">
-  <p:cSld>
-    <p:spTree>
-      <p:nvGrpSpPr>
-        <p:cNvPr id="1" name=""/>
-        <p:cNvGrpSpPr/>
-        <p:nvPr/>
-      </p:nvGrpSpPr>
-      <p:grpSpPr>
-        <a:xfrm>
-          <a:off x="0" y="0"/>
-          <a:ext cx="0" cy="0"/>
-          <a:chOff x="0" y="0"/>
-          <a:chExt cx="0" cy="0"/>
-        </a:xfrm>
-      </p:grpSpPr>
-      <p:pic>
-        <p:nvPicPr>
-          <p:cNvPr id="5" name="Picture 4"/>
-          <p:cNvPicPr>
-            <a:picLocks noChangeAspect="1"/>
-          </p:cNvPicPr>
-          <p:nvPr/>
-        </p:nvPicPr>
-        <p:blipFill rotWithShape="1">
-          <a:blip r:embed="rId2" cstate="screen">
-            <a:extLst>
-              <a:ext uri="{28A0092B-C50C-407E-A947-70E740481C1C}">
-                <a14:useLocalDpi xmlns:a14="http://schemas.microsoft.com/office/drawing/2010/main"/>
-              </a:ext>
-            </a:extLst>
-          </a:blip>
-          <a:srcRect/>
-          <a:stretch/>
-        </p:blipFill>
-        <p:spPr>
-          <a:xfrm>
-            <a:off x="-1" y="0"/>
-            <a:ext cx="12192001" cy="6858000"/>
-          </a:xfrm>
-          <a:prstGeom prst="rect">
-            <a:avLst/>
-          </a:prstGeom>
-        </p:spPr>
-      </p:pic>
-      <p:sp>
-        <p:nvSpPr>
-          <p:cNvPr id="7" name="Rectangle 6"/>
-          <p:cNvSpPr/>
-          <p:nvPr/>
-        </p:nvSpPr>
-        <p:spPr>
-          <a:xfrm>
-            <a:off x="97654" y="566344"/>
-            <a:ext cx="12004442" cy="5839247"/>
-          </a:xfrm>
-          <a:prstGeom prst="rect">
-            <a:avLst/>
-          </a:prstGeom>
-          <a:solidFill>
-            <a:schemeClr val="bg1">
-              <a:alpha val="63000"/>
-            </a:schemeClr>
-          </a:solidFill>
-          <a:ln>
-            <a:noFill/>
-          </a:ln>
-        </p:spPr>
-        <p:style>
-          <a:lnRef idx="2">
-            <a:schemeClr val="accent1">
-              <a:shade val="50000"/>
-            </a:schemeClr>
-          </a:lnRef>
-          <a:fillRef idx="1">
-            <a:schemeClr val="accent1"/>
-          </a:fillRef>
-          <a:effectRef idx="0">
-            <a:schemeClr val="accent1"/>
-          </a:effectRef>
-          <a:fontRef idx="minor">
-            <a:schemeClr val="lt1"/>
-          </a:fontRef>
-        </p:style>
-        <p:txBody>
-          <a:bodyPr rot="0" spcFirstLastPara="0" vertOverflow="overflow" horzOverflow="overflow" vert="horz" wrap="square" lIns="91440" tIns="45720" rIns="91440" bIns="45720" numCol="1" spcCol="0" rtlCol="0" fromWordArt="0" anchor="ctr" anchorCtr="0" forceAA="0" compatLnSpc="1">
-            <a:prstTxWarp prst="textNoShape">
-              <a:avLst/>
-            </a:prstTxWarp>
-            <a:noAutofit/>
-          </a:bodyPr>
-          <a:lstStyle/>
-          <a:p>
-            <a:pPr marL="0" marR="0" lvl="0" indent="0" algn="ctr" defTabSz="914400" rtl="0" eaLnBrk="1" fontAlgn="auto" latinLnBrk="0" hangingPunct="1">
-              <a:lnSpc>
-                <a:spcPct val="100000"/>
-              </a:lnSpc>
-              <a:spcBef>
-                <a:spcPts val="0"/>
-              </a:spcBef>
-              <a:spcAft>
-                <a:spcPts val="0"/>
-              </a:spcAft>
-              <a:buClrTx/>
-              <a:buSzTx/>
-              <a:buFontTx/>
-              <a:buNone/>
-              <a:tabLst/>
-              <a:defRPr/>
-            </a:pPr>
-            <a:endParaRPr kumimoji="0" lang="en-US" sz="1800" b="0" i="0" u="none" strike="noStrike" kern="1200" cap="none" spc="0" normalizeH="0" baseline="0" noProof="0">
-              <a:ln>
-                <a:noFill/>
-              </a:ln>
-              <a:solidFill>
-                <a:srgbClr val="FFFFFF"/>
-              </a:solidFill>
-              <a:effectLst/>
-              <a:uLnTx/>
-              <a:uFillTx/>
-              <a:latin typeface="Calibri"/>
-              <a:ea typeface="+mn-ea"/>
-              <a:cs typeface="Arial"/>
-            </a:endParaRPr>
-          </a:p>
-        </p:txBody>
-      </p:sp>
-      <p:sp>
-        <p:nvSpPr>
-          <p:cNvPr id="4" name="Title 1"/>
-          <p:cNvSpPr txBox="1">
-            <a:spLocks/>
-          </p:cNvSpPr>
-          <p:nvPr/>
-        </p:nvSpPr>
-        <p:spPr>
-          <a:xfrm>
-            <a:off x="238298" y="1183386"/>
-            <a:ext cx="11715404" cy="4242054"/>
-          </a:xfrm>
-          <a:prstGeom prst="rect">
-            <a:avLst/>
-          </a:prstGeom>
-        </p:spPr>
-        <p:txBody>
-          <a:bodyPr/>
-          <a:lstStyle>
-            <a:lvl1pPr algn="l" rtl="0" eaLnBrk="0" fontAlgn="base" hangingPunct="0">
-              <a:spcBef>
-                <a:spcPct val="0"/>
-              </a:spcBef>
-              <a:spcAft>
-                <a:spcPct val="0"/>
-              </a:spcAft>
-              <a:defRPr sz="3600" b="1">
-                <a:solidFill>
-                  <a:srgbClr val="CCECFF"/>
-                </a:solidFill>
-                <a:latin typeface="+mj-lt"/>
-                <a:ea typeface="+mj-ea"/>
-                <a:cs typeface="+mj-cs"/>
-              </a:defRPr>
-            </a:lvl1pPr>
-            <a:lvl2pPr algn="l" rtl="0" eaLnBrk="0" fontAlgn="base" hangingPunct="0">
-              <a:spcBef>
-                <a:spcPct val="0"/>
-              </a:spcBef>
-              <a:spcAft>
-                <a:spcPct val="0"/>
-              </a:spcAft>
-              <a:defRPr sz="3600" b="1">
-                <a:solidFill>
-                  <a:srgbClr val="CCECFF"/>
-                </a:solidFill>
-                <a:latin typeface="Calibri" pitchFamily="34" charset="0"/>
-                <a:cs typeface="Arial" pitchFamily="34" charset="0"/>
-              </a:defRPr>
-            </a:lvl2pPr>
-            <a:lvl3pPr algn="l" rtl="0" eaLnBrk="0" fontAlgn="base" hangingPunct="0">
-              <a:spcBef>
-                <a:spcPct val="0"/>
-              </a:spcBef>
-              <a:spcAft>
-                <a:spcPct val="0"/>
-              </a:spcAft>
-              <a:defRPr sz="3600" b="1">
-                <a:solidFill>
-                  <a:srgbClr val="CCECFF"/>
-                </a:solidFill>
-                <a:latin typeface="Calibri" pitchFamily="34" charset="0"/>
-                <a:cs typeface="Arial" pitchFamily="34" charset="0"/>
-              </a:defRPr>
-            </a:lvl3pPr>
-            <a:lvl4pPr algn="l" rtl="0" eaLnBrk="0" fontAlgn="base" hangingPunct="0">
-              <a:spcBef>
-                <a:spcPct val="0"/>
-              </a:spcBef>
-              <a:spcAft>
-                <a:spcPct val="0"/>
-              </a:spcAft>
-              <a:defRPr sz="3600" b="1">
-                <a:solidFill>
-                  <a:srgbClr val="CCECFF"/>
-                </a:solidFill>
-                <a:latin typeface="Calibri" pitchFamily="34" charset="0"/>
-                <a:cs typeface="Arial" pitchFamily="34" charset="0"/>
-              </a:defRPr>
-            </a:lvl4pPr>
-            <a:lvl5pPr algn="l" rtl="0" eaLnBrk="0" fontAlgn="base" hangingPunct="0">
-              <a:spcBef>
-                <a:spcPct val="0"/>
-              </a:spcBef>
-              <a:spcAft>
-                <a:spcPct val="0"/>
-              </a:spcAft>
-              <a:defRPr sz="3600" b="1">
-                <a:solidFill>
-                  <a:srgbClr val="CCECFF"/>
-                </a:solidFill>
-                <a:latin typeface="Calibri" pitchFamily="34" charset="0"/>
-                <a:cs typeface="Arial" pitchFamily="34" charset="0"/>
-              </a:defRPr>
-            </a:lvl5pPr>
-            <a:lvl6pPr marL="457200" algn="l" rtl="0" fontAlgn="base">
-              <a:spcBef>
-                <a:spcPct val="0"/>
-              </a:spcBef>
-              <a:spcAft>
-                <a:spcPct val="0"/>
-              </a:spcAft>
-              <a:defRPr sz="3600" b="1">
-                <a:solidFill>
-                  <a:srgbClr val="CCECFF"/>
-                </a:solidFill>
-                <a:latin typeface="Calibri" pitchFamily="34" charset="0"/>
-                <a:cs typeface="Arial" pitchFamily="34" charset="0"/>
-              </a:defRPr>
-            </a:lvl6pPr>
-            <a:lvl7pPr marL="914400" algn="l" rtl="0" fontAlgn="base">
-              <a:spcBef>
-                <a:spcPct val="0"/>
-              </a:spcBef>
-              <a:spcAft>
-                <a:spcPct val="0"/>
-              </a:spcAft>
-              <a:defRPr sz="3600" b="1">
-                <a:solidFill>
-                  <a:srgbClr val="CCECFF"/>
-                </a:solidFill>
-                <a:latin typeface="Calibri" pitchFamily="34" charset="0"/>
-                <a:cs typeface="Arial" pitchFamily="34" charset="0"/>
-              </a:defRPr>
-            </a:lvl7pPr>
-            <a:lvl8pPr marL="1371600" algn="l" rtl="0" fontAlgn="base">
-              <a:spcBef>
-                <a:spcPct val="0"/>
-              </a:spcBef>
-              <a:spcAft>
-                <a:spcPct val="0"/>
-              </a:spcAft>
-              <a:defRPr sz="3600" b="1">
-                <a:solidFill>
-                  <a:srgbClr val="CCECFF"/>
-                </a:solidFill>
-                <a:latin typeface="Calibri" pitchFamily="34" charset="0"/>
-                <a:cs typeface="Arial" pitchFamily="34" charset="0"/>
-              </a:defRPr>
-            </a:lvl8pPr>
-            <a:lvl9pPr marL="1828800" algn="l" rtl="0" fontAlgn="base">
-              <a:spcBef>
-                <a:spcPct val="0"/>
-              </a:spcBef>
-              <a:spcAft>
-                <a:spcPct val="0"/>
-              </a:spcAft>
-              <a:defRPr sz="3600" b="1">
-                <a:solidFill>
-                  <a:srgbClr val="CCECFF"/>
-                </a:solidFill>
-                <a:latin typeface="Calibri" pitchFamily="34" charset="0"/>
-                <a:cs typeface="Arial" pitchFamily="34" charset="0"/>
-              </a:defRPr>
-            </a:lvl9pPr>
-          </a:lstStyle>
-          <a:p>
-            <a:pPr>
-              <a:lnSpc>
-                <a:spcPts val="2267"/>
-              </a:lnSpc>
-            </a:pPr>
-            <a:endParaRPr lang="en-US" sz="4000" kern="0" dirty="0">
-              <a:solidFill>
-                <a:schemeClr val="tx2"/>
-              </a:solidFill>
-            </a:endParaRPr>
-          </a:p>
-          <a:p>
-            <a:pPr marL="0" marR="0" lvl="0" indent="0" algn="r" defTabSz="914400" rtl="1" eaLnBrk="0" fontAlgn="base" latinLnBrk="0" hangingPunct="0">
-              <a:lnSpc>
-                <a:spcPct val="100000"/>
-              </a:lnSpc>
-              <a:spcBef>
-                <a:spcPct val="0"/>
-              </a:spcBef>
-              <a:spcAft>
-                <a:spcPct val="0"/>
-              </a:spcAft>
-              <a:buClrTx/>
-              <a:buSzTx/>
-              <a:buFontTx/>
-              <a:buNone/>
-              <a:tabLst/>
-              <a:defRPr/>
-            </a:pPr>
-            <a:endParaRPr kumimoji="0" lang="he-IL" sz="1800" b="0" i="0" u="none" strike="noStrike" kern="0" cap="none" spc="0" normalizeH="0" baseline="0" noProof="0" dirty="0">
-              <a:ln>
-                <a:noFill/>
-              </a:ln>
-              <a:solidFill>
-                <a:srgbClr val="000000"/>
-              </a:solidFill>
-              <a:effectLst/>
-              <a:uLnTx/>
-              <a:uFillTx/>
-              <a:latin typeface="Calibri"/>
-              <a:ea typeface="+mj-ea"/>
-              <a:cs typeface="Arial"/>
-            </a:endParaRPr>
-          </a:p>
-        </p:txBody>
-      </p:sp>
-      <p:sp>
-        <p:nvSpPr>
-          <p:cNvPr id="9" name="Title 1"/>
-          <p:cNvSpPr txBox="1">
-            <a:spLocks/>
-          </p:cNvSpPr>
-          <p:nvPr/>
-        </p:nvSpPr>
-        <p:spPr>
-          <a:xfrm>
-            <a:off x="4196276" y="442494"/>
-            <a:ext cx="7757426" cy="1091954"/>
-          </a:xfrm>
-          <a:prstGeom prst="rect">
-            <a:avLst/>
-          </a:prstGeom>
-        </p:spPr>
-        <p:txBody>
-          <a:bodyPr/>
-          <a:lstStyle>
-            <a:lvl1pPr algn="l" rtl="0" eaLnBrk="0" fontAlgn="base" hangingPunct="0">
-              <a:spcBef>
-                <a:spcPct val="0"/>
-              </a:spcBef>
-              <a:spcAft>
-                <a:spcPct val="0"/>
-              </a:spcAft>
-              <a:defRPr sz="3600" b="1">
-                <a:solidFill>
-                  <a:srgbClr val="CCECFF"/>
-                </a:solidFill>
-                <a:latin typeface="+mj-lt"/>
-                <a:ea typeface="+mj-ea"/>
-                <a:cs typeface="+mj-cs"/>
-              </a:defRPr>
-            </a:lvl1pPr>
-            <a:lvl2pPr algn="l" rtl="0" eaLnBrk="0" fontAlgn="base" hangingPunct="0">
-              <a:spcBef>
-                <a:spcPct val="0"/>
-              </a:spcBef>
-              <a:spcAft>
-                <a:spcPct val="0"/>
-              </a:spcAft>
-              <a:defRPr sz="3600" b="1">
-                <a:solidFill>
-                  <a:srgbClr val="CCECFF"/>
-                </a:solidFill>
-                <a:latin typeface="Calibri" pitchFamily="34" charset="0"/>
-                <a:cs typeface="Arial" pitchFamily="34" charset="0"/>
-              </a:defRPr>
-            </a:lvl2pPr>
-            <a:lvl3pPr algn="l" rtl="0" eaLnBrk="0" fontAlgn="base" hangingPunct="0">
-              <a:spcBef>
-                <a:spcPct val="0"/>
-              </a:spcBef>
-              <a:spcAft>
-                <a:spcPct val="0"/>
-              </a:spcAft>
-              <a:defRPr sz="3600" b="1">
-                <a:solidFill>
-                  <a:srgbClr val="CCECFF"/>
-                </a:solidFill>
-                <a:latin typeface="Calibri" pitchFamily="34" charset="0"/>
-                <a:cs typeface="Arial" pitchFamily="34" charset="0"/>
-              </a:defRPr>
-            </a:lvl3pPr>
-            <a:lvl4pPr algn="l" rtl="0" eaLnBrk="0" fontAlgn="base" hangingPunct="0">
-              <a:spcBef>
-                <a:spcPct val="0"/>
-              </a:spcBef>
-              <a:spcAft>
-                <a:spcPct val="0"/>
-              </a:spcAft>
-              <a:defRPr sz="3600" b="1">
-                <a:solidFill>
-                  <a:srgbClr val="CCECFF"/>
-                </a:solidFill>
-                <a:latin typeface="Calibri" pitchFamily="34" charset="0"/>
-                <a:cs typeface="Arial" pitchFamily="34" charset="0"/>
-              </a:defRPr>
-            </a:lvl4pPr>
-            <a:lvl5pPr algn="l" rtl="0" eaLnBrk="0" fontAlgn="base" hangingPunct="0">
-              <a:spcBef>
-                <a:spcPct val="0"/>
-              </a:spcBef>
-              <a:spcAft>
-                <a:spcPct val="0"/>
-              </a:spcAft>
-              <a:defRPr sz="3600" b="1">
-                <a:solidFill>
-                  <a:srgbClr val="CCECFF"/>
-                </a:solidFill>
-                <a:latin typeface="Calibri" pitchFamily="34" charset="0"/>
-                <a:cs typeface="Arial" pitchFamily="34" charset="0"/>
-              </a:defRPr>
-            </a:lvl5pPr>
-            <a:lvl6pPr marL="457200" algn="l" rtl="0" fontAlgn="base">
-              <a:spcBef>
-                <a:spcPct val="0"/>
-              </a:spcBef>
-              <a:spcAft>
-                <a:spcPct val="0"/>
-              </a:spcAft>
-              <a:defRPr sz="3600" b="1">
-                <a:solidFill>
-                  <a:srgbClr val="CCECFF"/>
-                </a:solidFill>
-                <a:latin typeface="Calibri" pitchFamily="34" charset="0"/>
-                <a:cs typeface="Arial" pitchFamily="34" charset="0"/>
-              </a:defRPr>
-            </a:lvl6pPr>
-            <a:lvl7pPr marL="914400" algn="l" rtl="0" fontAlgn="base">
-              <a:spcBef>
-                <a:spcPct val="0"/>
-              </a:spcBef>
-              <a:spcAft>
-                <a:spcPct val="0"/>
-              </a:spcAft>
-              <a:defRPr sz="3600" b="1">
-                <a:solidFill>
-                  <a:srgbClr val="CCECFF"/>
-                </a:solidFill>
-                <a:latin typeface="Calibri" pitchFamily="34" charset="0"/>
-                <a:cs typeface="Arial" pitchFamily="34" charset="0"/>
-              </a:defRPr>
-            </a:lvl7pPr>
-            <a:lvl8pPr marL="1371600" algn="l" rtl="0" fontAlgn="base">
-              <a:spcBef>
-                <a:spcPct val="0"/>
-              </a:spcBef>
-              <a:spcAft>
-                <a:spcPct val="0"/>
-              </a:spcAft>
-              <a:defRPr sz="3600" b="1">
-                <a:solidFill>
-                  <a:srgbClr val="CCECFF"/>
-                </a:solidFill>
-                <a:latin typeface="Calibri" pitchFamily="34" charset="0"/>
-                <a:cs typeface="Arial" pitchFamily="34" charset="0"/>
-              </a:defRPr>
-            </a:lvl8pPr>
-            <a:lvl9pPr marL="1828800" algn="l" rtl="0" fontAlgn="base">
-              <a:spcBef>
-                <a:spcPct val="0"/>
-              </a:spcBef>
-              <a:spcAft>
-                <a:spcPct val="0"/>
-              </a:spcAft>
-              <a:defRPr sz="3600" b="1">
-                <a:solidFill>
-                  <a:srgbClr val="CCECFF"/>
-                </a:solidFill>
-                <a:latin typeface="Calibri" pitchFamily="34" charset="0"/>
-                <a:cs typeface="Arial" pitchFamily="34" charset="0"/>
-              </a:defRPr>
-            </a:lvl9pPr>
-          </a:lstStyle>
-          <a:p>
-            <a:pPr>
-              <a:lnSpc>
-                <a:spcPts val="2267"/>
-              </a:lnSpc>
-            </a:pPr>
-            <a:endParaRPr lang="en-US" sz="4000" kern="0" dirty="0">
-              <a:solidFill>
-                <a:schemeClr val="tx2"/>
-              </a:solidFill>
-            </a:endParaRPr>
-          </a:p>
-          <a:p>
-            <a:pPr marL="0" marR="0" lvl="0" indent="0" algn="r" defTabSz="914400" rtl="1" eaLnBrk="0" fontAlgn="base" latinLnBrk="0" hangingPunct="0">
-              <a:lnSpc>
-                <a:spcPct val="100000"/>
-              </a:lnSpc>
-              <a:spcBef>
-                <a:spcPct val="0"/>
-              </a:spcBef>
-              <a:spcAft>
-                <a:spcPct val="0"/>
-              </a:spcAft>
-              <a:buClrTx/>
-              <a:buSzTx/>
-              <a:buFontTx/>
-              <a:buNone/>
-              <a:tabLst/>
-              <a:defRPr/>
-            </a:pPr>
-            <a:r>
-              <a:rPr lang="he-IL" u="sng" kern="0" dirty="0" smtClean="0">
-                <a:solidFill>
-                  <a:schemeClr val="tx1"/>
-                </a:solidFill>
-                <a:latin typeface="Segoe UI Semibold" panose="020B0702040204020203" pitchFamily="34" charset="0"/>
-                <a:cs typeface="Segoe UI Semibold" panose="020B0702040204020203" pitchFamily="34" charset="0"/>
-              </a:rPr>
-              <a:t>תיאור הפתרון המוצע</a:t>
-            </a:r>
-            <a:endParaRPr kumimoji="0" lang="he-IL" i="0" u="sng" strike="noStrike" kern="0" cap="none" spc="0" normalizeH="0" baseline="0" noProof="0" dirty="0">
-              <a:ln>
-                <a:noFill/>
-              </a:ln>
-              <a:solidFill>
-                <a:schemeClr val="tx1"/>
-              </a:solidFill>
-              <a:effectLst/>
-              <a:uLnTx/>
-              <a:uFillTx/>
-              <a:latin typeface="Segoe UI Semibold" panose="020B0702040204020203" pitchFamily="34" charset="0"/>
-              <a:cs typeface="Segoe UI Semibold" panose="020B0702040204020203" pitchFamily="34" charset="0"/>
-            </a:endParaRPr>
-          </a:p>
-        </p:txBody>
-      </p:sp>
-      <p:sp>
-        <p:nvSpPr>
-          <p:cNvPr id="2" name="TextBox 1"/>
-          <p:cNvSpPr txBox="1"/>
-          <p:nvPr/>
-        </p:nvSpPr>
-        <p:spPr>
-          <a:xfrm>
-            <a:off x="238298" y="1724759"/>
-            <a:ext cx="11715405" cy="1938992"/>
-          </a:xfrm>
-          <a:prstGeom prst="rect">
-            <a:avLst/>
-          </a:prstGeom>
-          <a:noFill/>
-        </p:spPr>
-        <p:txBody>
-          <a:bodyPr wrap="square" rtlCol="0">
-            <a:spAutoFit/>
-          </a:bodyPr>
-          <a:lstStyle/>
-          <a:p>
-            <a:pPr marL="342900" indent="-342900" algn="r" rtl="1">
-              <a:buFont typeface="Arial" panose="020B0604020202020204" pitchFamily="34" charset="0"/>
-              <a:buChar char="•"/>
-            </a:pPr>
+              <a:t> מימוש </a:t>
+            </a:r>
+            <a:r>
+              <a:rPr lang="he-IL" sz="2400" kern="0" dirty="0">
+                <a:latin typeface="Segoe UI Light" panose="020B0502040204020203" pitchFamily="34" charset="0"/>
+                <a:cs typeface="Segoe UI Light" panose="020B0502040204020203" pitchFamily="34" charset="0"/>
+              </a:rPr>
+              <a:t>אלגוריתם אשר "יקבץ" קבוצות של חומרים ע"פ </a:t>
+            </a:r>
             <a:r>
               <a:rPr lang="he-IL" sz="2400" kern="0" dirty="0" smtClean="0">
                 <a:latin typeface="Segoe UI Light" panose="020B0502040204020203" pitchFamily="34" charset="0"/>
                 <a:cs typeface="Segoe UI Light" panose="020B0502040204020203" pitchFamily="34" charset="0"/>
               </a:rPr>
-              <a:t>נקים שרת מרכזי אשר יאזין לבקשות מערכות השו"ב, ינהל מסד נתונים מרכזי שישמור, יתעד ויספק את המידע המבוקש ע"פ דרישה.</a:t>
-            </a:r>
-          </a:p>
-          <a:p>
-            <a:pPr algn="r" rtl="1"/>
-            <a:endParaRPr lang="he-IL" sz="2400" kern="0" dirty="0">
-              <a:latin typeface="Segoe UI Light" panose="020B0502040204020203" pitchFamily="34" charset="0"/>
-              <a:cs typeface="Segoe UI Light" panose="020B0502040204020203" pitchFamily="34" charset="0"/>
-            </a:endParaRPr>
-          </a:p>
-          <a:p>
-            <a:pPr marL="342900" indent="-342900" algn="r" rtl="1">
-              <a:buFont typeface="Arial" panose="020B0604020202020204" pitchFamily="34" charset="0"/>
-              <a:buChar char="•"/>
-            </a:pPr>
+              <a:t>תכונות </a:t>
+            </a:r>
+            <a:r>
+              <a:rPr lang="he-IL" sz="2400" kern="0" dirty="0">
+                <a:latin typeface="Segoe UI Light" panose="020B0502040204020203" pitchFamily="34" charset="0"/>
+                <a:cs typeface="Segoe UI Light" panose="020B0502040204020203" pitchFamily="34" charset="0"/>
+              </a:rPr>
+              <a:t>החומר (סוג, זמן, חתימת ראמן וכד</a:t>
+            </a:r>
             <a:r>
               <a:rPr lang="he-IL" sz="2400" kern="0" dirty="0" smtClean="0">
                 <a:latin typeface="Segoe UI Light" panose="020B0502040204020203" pitchFamily="34" charset="0"/>
                 <a:cs typeface="Segoe UI Light" panose="020B0502040204020203" pitchFamily="34" charset="0"/>
               </a:rPr>
-              <a:t>נוסיף למחשב השטח משיב מיקום חיצוני אשר באמצעותו, מערכת השו"ב תוסיף לכל זיהוי אשר נשלף מן האקדח חתימת מיקום (</a:t>
-            </a:r>
-            <a:r>
-              <a:rPr lang="en-US" sz="2400" kern="0" dirty="0" smtClean="0">
+              <a:t>'), </a:t>
+            </a:r>
+            <a:r>
+              <a:rPr lang="he-IL" sz="2400" kern="0" dirty="0">
                 <a:latin typeface="Segoe UI Light" panose="020B0502040204020203" pitchFamily="34" charset="0"/>
                 <a:cs typeface="Segoe UI Light" panose="020B0502040204020203" pitchFamily="34" charset="0"/>
               </a:rPr>
-              <a:t>GPS</a:t>
-            </a:r>
-            <a:r>
-              <a:rPr lang="he-IL" sz="2400" kern="0" dirty="0" smtClean="0">
-                <a:latin typeface="Segoe UI Light" panose="020B0502040204020203" pitchFamily="34" charset="0"/>
-                <a:cs typeface="Segoe UI Light" panose="020B0502040204020203" pitchFamily="34" charset="0"/>
-              </a:rPr>
-              <a:t>) שתשמש להצגת וניתוח המידע בהמשך.</a:t>
+              <a:t>וישמש לזיהוי תבנית ההתפשטות או ירמז על מקור החומר.</a:t>
             </a:r>
           </a:p>
         </p:txBody>
@@ -9971,7 +8702,7 @@
 </p:sld>
 </file>
 
-<file path=ppt/slides/slide6.xml><?xml version="1.0" encoding="utf-8"?>
+<file path=ppt/slides/slide5.xml><?xml version="1.0" encoding="utf-8"?>
 <p:sld xmlns:a="http://schemas.openxmlformats.org/drawingml/2006/main" xmlns:r="http://schemas.openxmlformats.org/officeDocument/2006/relationships" xmlns:p="http://schemas.openxmlformats.org/presentationml/2006/main">
   <p:cSld>
     <p:spTree>
@@ -10430,7 +9161,7 @@
 </p:sld>
 </file>
 
-<file path=ppt/slides/slide7.xml><?xml version="1.0" encoding="utf-8"?>
+<file path=ppt/slides/slide6.xml><?xml version="1.0" encoding="utf-8"?>
 <p:sld xmlns:a="http://schemas.openxmlformats.org/drawingml/2006/main" xmlns:r="http://schemas.openxmlformats.org/officeDocument/2006/relationships" xmlns:p="http://schemas.openxmlformats.org/presentationml/2006/main">
   <p:cSld>
     <p:spTree>
@@ -10984,7 +9715,7 @@
         <p:spPr>
           <a:xfrm>
             <a:off x="238298" y="1724759"/>
-            <a:ext cx="11715405" cy="4524315"/>
+            <a:ext cx="11715405" cy="3785652"/>
           </a:xfrm>
           <a:prstGeom prst="rect">
             <a:avLst/>
@@ -11043,44 +9774,6 @@
               </a:rPr>
               <a:t>Visual-C#</a:t>
             </a:r>
-            <a:r>
-              <a:rPr lang="he-IL" sz="2400" kern="0" dirty="0" smtClean="0">
-                <a:latin typeface="Segoe UI Light" panose="020B0502040204020203" pitchFamily="34" charset="0"/>
-                <a:cs typeface="Segoe UI Light" panose="020B0502040204020203" pitchFamily="34" charset="0"/>
-              </a:rPr>
-              <a:t> </a:t>
-            </a:r>
-            <a:r>
-              <a:rPr lang="en-US" sz="2400" kern="0" dirty="0" smtClean="0">
-                <a:latin typeface="Segoe UI Light" panose="020B0502040204020203" pitchFamily="34" charset="0"/>
-                <a:cs typeface="Segoe UI Light" panose="020B0502040204020203" pitchFamily="34" charset="0"/>
-              </a:rPr>
-              <a:t> </a:t>
-            </a:r>
-            <a:r>
-              <a:rPr lang="en-US" sz="2400" kern="0" dirty="0" smtClean="0">
-                <a:latin typeface="Segoe UI Light" panose="020B0502040204020203" pitchFamily="34" charset="0"/>
-                <a:cs typeface="Segoe UI Light" panose="020B0502040204020203" pitchFamily="34" charset="0"/>
-                <a:sym typeface="Wingdings" panose="05000000000000000000" pitchFamily="2" charset="2"/>
-              </a:rPr>
-              <a:t></a:t>
-            </a:r>
-            <a:r>
-              <a:rPr lang="he-IL" sz="2400" kern="0" dirty="0" smtClean="0">
-                <a:latin typeface="Segoe UI Light" panose="020B0502040204020203" pitchFamily="34" charset="0"/>
-                <a:cs typeface="Segoe UI Light" panose="020B0502040204020203" pitchFamily="34" charset="0"/>
-                <a:hlinkClick r:id="rId4" action="ppaction://hlinksldjump"/>
-              </a:rPr>
-              <a:t>תיכון </a:t>
-            </a:r>
-            <a:r>
-              <a:rPr lang="en-US" sz="2400" kern="0" dirty="0" smtClean="0">
-                <a:latin typeface="Segoe UI Light" panose="020B0502040204020203" pitchFamily="34" charset="0"/>
-                <a:cs typeface="Segoe UI Light" panose="020B0502040204020203" pitchFamily="34" charset="0"/>
-                <a:hlinkClick r:id="rId4" action="ppaction://hlinksldjump"/>
-              </a:rPr>
-              <a:t>GUI Events</a:t>
-            </a:r>
             <a:endParaRPr lang="he-IL" sz="2400" kern="0" dirty="0" smtClean="0">
               <a:latin typeface="Segoe UI Light" panose="020B0502040204020203" pitchFamily="34" charset="0"/>
               <a:cs typeface="Segoe UI Light" panose="020B0502040204020203" pitchFamily="34" charset="0"/>
@@ -11164,6 +9857,13 @@
               </a:rPr>
             </a:br>
             <a:r>
+              <a:rPr lang="he-IL" sz="2400" kern="0" dirty="0" smtClean="0">
+                <a:latin typeface="Segoe UI Light" panose="020B0502040204020203" pitchFamily="34" charset="0"/>
+                <a:cs typeface="Segoe UI Light" panose="020B0502040204020203" pitchFamily="34" charset="0"/>
+              </a:rPr>
+              <a:t>(</a:t>
+            </a:r>
+            <a:r>
               <a:rPr lang="en-US" sz="2400" kern="0" dirty="0" smtClean="0">
                 <a:latin typeface="Segoe UI Light" panose="020B0502040204020203" pitchFamily="34" charset="0"/>
                 <a:cs typeface="Segoe UI Light" panose="020B0502040204020203" pitchFamily="34" charset="0"/>
@@ -11175,7 +9875,14 @@
                 <a:latin typeface="Segoe UI Light" panose="020B0502040204020203" pitchFamily="34" charset="0"/>
                 <a:cs typeface="Segoe UI Light" panose="020B0502040204020203" pitchFamily="34" charset="0"/>
               </a:rPr>
-              <a:t> אינה מספקת </a:t>
+              <a:t> </a:t>
+            </a:r>
+            <a:r>
+              <a:rPr lang="he-IL" sz="2400" kern="0" dirty="0" smtClean="0">
+                <a:latin typeface="Segoe UI Light" panose="020B0502040204020203" pitchFamily="34" charset="0"/>
+                <a:cs typeface="Segoe UI Light" panose="020B0502040204020203" pitchFamily="34" charset="0"/>
+              </a:rPr>
+              <a:t>אינה מספקת </a:t>
             </a:r>
             <a:r>
               <a:rPr lang="en-US" sz="2400" kern="0" dirty="0" smtClean="0">
@@ -11196,8 +9903,26 @@
                 <a:latin typeface="Segoe UI Light" panose="020B0502040204020203" pitchFamily="34" charset="0"/>
                 <a:cs typeface="Segoe UI Light" panose="020B0502040204020203" pitchFamily="34" charset="0"/>
               </a:rPr>
-              <a:t>.NET</a:t>
-            </a:r>
+              <a:t>.</a:t>
+            </a:r>
+            <a:r>
+              <a:rPr lang="en-US" sz="2400" kern="0" dirty="0" smtClean="0">
+                <a:latin typeface="Segoe UI Light" panose="020B0502040204020203" pitchFamily="34" charset="0"/>
+                <a:cs typeface="Segoe UI Light" panose="020B0502040204020203" pitchFamily="34" charset="0"/>
+              </a:rPr>
+              <a:t>NET</a:t>
+            </a:r>
+            <a:r>
+              <a:rPr lang="he-IL" sz="2400" kern="0" dirty="0" smtClean="0">
+                <a:latin typeface="Segoe UI Light" panose="020B0502040204020203" pitchFamily="34" charset="0"/>
+                <a:cs typeface="Segoe UI Light" panose="020B0502040204020203" pitchFamily="34" charset="0"/>
+              </a:rPr>
+              <a:t>)</a:t>
+            </a:r>
+            <a:endParaRPr lang="en-US" sz="2400" kern="0" dirty="0" smtClean="0">
+              <a:latin typeface="Segoe UI Light" panose="020B0502040204020203" pitchFamily="34" charset="0"/>
+              <a:cs typeface="Segoe UI Light" panose="020B0502040204020203" pitchFamily="34" charset="0"/>
+            </a:endParaRPr>
           </a:p>
           <a:p>
             <a:pPr marL="342900" indent="-342900" algn="r" rtl="1">
@@ -11250,7 +9975,7 @@
               <a:t> ע"י שימוש בתשתית </a:t>
             </a:r>
             <a:r>
-              <a:rPr lang="en-US" sz="2400" kern="0" dirty="0" err="1" smtClean="0">
+              <a:rPr lang="en-US" sz="2400" kern="0" dirty="0" smtClean="0">
                 <a:latin typeface="Segoe UI Light" panose="020B0502040204020203" pitchFamily="34" charset="0"/>
                 <a:cs typeface="Segoe UI Light" panose="020B0502040204020203" pitchFamily="34" charset="0"/>
               </a:rPr>
@@ -11284,7 +10009,7 @@
               <a:t>חקרנו את הצרכים להפעלת ממשק התקשורת האלחוטית דרך החומרה המיוחדת של האקדח (</a:t>
             </a:r>
             <a:r>
-              <a:rPr lang="en-US" sz="2400" kern="0" dirty="0" err="1" smtClean="0">
+              <a:rPr lang="en-US" sz="2400" kern="0" dirty="0" smtClean="0">
                 <a:latin typeface="Segoe UI Light" panose="020B0502040204020203" pitchFamily="34" charset="0"/>
                 <a:cs typeface="Segoe UI Light" panose="020B0502040204020203" pitchFamily="34" charset="0"/>
               </a:rPr>
@@ -11323,67 +10048,752 @@
                 <a:latin typeface="Segoe UI Light" panose="020B0502040204020203" pitchFamily="34" charset="0"/>
                 <a:cs typeface="Segoe UI Light" panose="020B0502040204020203" pitchFamily="34" charset="0"/>
               </a:rPr>
-              <a:t> דרך חומרת האקדח הייחודית</a:t>
+              <a:t> דרך חומרת האקדח </a:t>
+            </a:r>
+            <a:r>
+              <a:rPr lang="he-IL" sz="2400" kern="0" dirty="0" smtClean="0">
+                <a:latin typeface="Segoe UI Light" panose="020B0502040204020203" pitchFamily="34" charset="0"/>
+                <a:cs typeface="Segoe UI Light" panose="020B0502040204020203" pitchFamily="34" charset="0"/>
+              </a:rPr>
+              <a:t>הייחודית</a:t>
             </a:r>
             <a:endParaRPr lang="he-IL" sz="2400" kern="0" dirty="0">
               <a:latin typeface="Segoe UI Light" panose="020B0502040204020203" pitchFamily="34" charset="0"/>
               <a:cs typeface="Segoe UI Light" panose="020B0502040204020203" pitchFamily="34" charset="0"/>
             </a:endParaRPr>
           </a:p>
+        </p:txBody>
+      </p:sp>
+    </p:spTree>
+    <p:extLst>
+      <p:ext uri="{BB962C8B-B14F-4D97-AF65-F5344CB8AC3E}">
+        <p14:creationId xmlns:p14="http://schemas.microsoft.com/office/powerpoint/2010/main" val="1276184822"/>
+      </p:ext>
+    </p:extLst>
+  </p:cSld>
+  <p:clrMapOvr>
+    <a:masterClrMapping/>
+  </p:clrMapOvr>
+  <p:timing>
+    <p:tnLst>
+      <p:par>
+        <p:cTn id="1" dur="indefinite" restart="never" nodeType="tmRoot"/>
+      </p:par>
+    </p:tnLst>
+  </p:timing>
+</p:sld>
+</file>
+
+<file path=ppt/slides/slide7.xml><?xml version="1.0" encoding="utf-8"?>
+<p:sld xmlns:a="http://schemas.openxmlformats.org/drawingml/2006/main" xmlns:r="http://schemas.openxmlformats.org/officeDocument/2006/relationships" xmlns:p="http://schemas.openxmlformats.org/presentationml/2006/main">
+  <p:cSld>
+    <p:spTree>
+      <p:nvGrpSpPr>
+        <p:cNvPr id="1" name=""/>
+        <p:cNvGrpSpPr/>
+        <p:nvPr/>
+      </p:nvGrpSpPr>
+      <p:grpSpPr>
+        <a:xfrm>
+          <a:off x="0" y="0"/>
+          <a:ext cx="0" cy="0"/>
+          <a:chOff x="0" y="0"/>
+          <a:chExt cx="0" cy="0"/>
+        </a:xfrm>
+      </p:grpSpPr>
+      <p:pic>
+        <p:nvPicPr>
+          <p:cNvPr id="5" name="Picture 4"/>
+          <p:cNvPicPr>
+            <a:picLocks noChangeAspect="1"/>
+          </p:cNvPicPr>
+          <p:nvPr/>
+        </p:nvPicPr>
+        <p:blipFill rotWithShape="1">
+          <a:blip r:embed="rId2" cstate="screen">
+            <a:extLst>
+              <a:ext uri="{28A0092B-C50C-407E-A947-70E740481C1C}">
+                <a14:useLocalDpi xmlns:a14="http://schemas.microsoft.com/office/drawing/2010/main"/>
+              </a:ext>
+            </a:extLst>
+          </a:blip>
+          <a:srcRect/>
+          <a:stretch/>
+        </p:blipFill>
+        <p:spPr>
+          <a:xfrm>
+            <a:off x="-1" y="0"/>
+            <a:ext cx="12192001" cy="6858000"/>
+          </a:xfrm>
+          <a:prstGeom prst="rect">
+            <a:avLst/>
+          </a:prstGeom>
+        </p:spPr>
+      </p:pic>
+      <p:sp>
+        <p:nvSpPr>
+          <p:cNvPr id="7" name="Rectangle 6"/>
+          <p:cNvSpPr/>
+          <p:nvPr/>
+        </p:nvSpPr>
+        <p:spPr>
+          <a:xfrm>
+            <a:off x="97654" y="566344"/>
+            <a:ext cx="12004442" cy="5839247"/>
+          </a:xfrm>
+          <a:prstGeom prst="rect">
+            <a:avLst/>
+          </a:prstGeom>
+          <a:solidFill>
+            <a:schemeClr val="bg1">
+              <a:alpha val="63000"/>
+            </a:schemeClr>
+          </a:solidFill>
+          <a:ln>
+            <a:noFill/>
+          </a:ln>
+        </p:spPr>
+        <p:style>
+          <a:lnRef idx="2">
+            <a:schemeClr val="accent1">
+              <a:shade val="50000"/>
+            </a:schemeClr>
+          </a:lnRef>
+          <a:fillRef idx="1">
+            <a:schemeClr val="accent1"/>
+          </a:fillRef>
+          <a:effectRef idx="0">
+            <a:schemeClr val="accent1"/>
+          </a:effectRef>
+          <a:fontRef idx="minor">
+            <a:schemeClr val="lt1"/>
+          </a:fontRef>
+        </p:style>
+        <p:txBody>
+          <a:bodyPr rot="0" spcFirstLastPara="0" vertOverflow="overflow" horzOverflow="overflow" vert="horz" wrap="square" lIns="91440" tIns="45720" rIns="91440" bIns="45720" numCol="1" spcCol="0" rtlCol="0" fromWordArt="0" anchor="ctr" anchorCtr="0" forceAA="0" compatLnSpc="1">
+            <a:prstTxWarp prst="textNoShape">
+              <a:avLst/>
+            </a:prstTxWarp>
+            <a:noAutofit/>
+          </a:bodyPr>
+          <a:lstStyle/>
+          <a:p>
+            <a:pPr marL="0" marR="0" lvl="0" indent="0" algn="ctr" defTabSz="914400" rtl="0" eaLnBrk="1" fontAlgn="auto" latinLnBrk="0" hangingPunct="1">
+              <a:lnSpc>
+                <a:spcPct val="100000"/>
+              </a:lnSpc>
+              <a:spcBef>
+                <a:spcPts val="0"/>
+              </a:spcBef>
+              <a:spcAft>
+                <a:spcPts val="0"/>
+              </a:spcAft>
+              <a:buClrTx/>
+              <a:buSzTx/>
+              <a:buFontTx/>
+              <a:buNone/>
+              <a:tabLst/>
+              <a:defRPr/>
+            </a:pPr>
+            <a:endParaRPr kumimoji="0" lang="en-US" sz="1800" b="0" i="0" u="none" strike="noStrike" kern="1200" cap="none" spc="0" normalizeH="0" baseline="0" noProof="0">
+              <a:ln>
+                <a:noFill/>
+              </a:ln>
+              <a:solidFill>
+                <a:srgbClr val="FFFFFF"/>
+              </a:solidFill>
+              <a:effectLst/>
+              <a:uLnTx/>
+              <a:uFillTx/>
+              <a:latin typeface="Calibri"/>
+              <a:ea typeface="+mn-ea"/>
+              <a:cs typeface="Arial"/>
+            </a:endParaRPr>
+          </a:p>
+        </p:txBody>
+      </p:sp>
+      <p:sp>
+        <p:nvSpPr>
+          <p:cNvPr id="4" name="Title 1"/>
+          <p:cNvSpPr txBox="1">
+            <a:spLocks/>
+          </p:cNvSpPr>
+          <p:nvPr/>
+        </p:nvSpPr>
+        <p:spPr>
+          <a:xfrm>
+            <a:off x="238298" y="1183386"/>
+            <a:ext cx="11715404" cy="4242054"/>
+          </a:xfrm>
+          <a:prstGeom prst="rect">
+            <a:avLst/>
+          </a:prstGeom>
+        </p:spPr>
+        <p:txBody>
+          <a:bodyPr/>
+          <a:lstStyle>
+            <a:lvl1pPr algn="l" rtl="0" eaLnBrk="0" fontAlgn="base" hangingPunct="0">
+              <a:spcBef>
+                <a:spcPct val="0"/>
+              </a:spcBef>
+              <a:spcAft>
+                <a:spcPct val="0"/>
+              </a:spcAft>
+              <a:defRPr sz="3600" b="1">
+                <a:solidFill>
+                  <a:srgbClr val="CCECFF"/>
+                </a:solidFill>
+                <a:latin typeface="+mj-lt"/>
+                <a:ea typeface="+mj-ea"/>
+                <a:cs typeface="+mj-cs"/>
+              </a:defRPr>
+            </a:lvl1pPr>
+            <a:lvl2pPr algn="l" rtl="0" eaLnBrk="0" fontAlgn="base" hangingPunct="0">
+              <a:spcBef>
+                <a:spcPct val="0"/>
+              </a:spcBef>
+              <a:spcAft>
+                <a:spcPct val="0"/>
+              </a:spcAft>
+              <a:defRPr sz="3600" b="1">
+                <a:solidFill>
+                  <a:srgbClr val="CCECFF"/>
+                </a:solidFill>
+                <a:latin typeface="Calibri" pitchFamily="34" charset="0"/>
+                <a:cs typeface="Arial" pitchFamily="34" charset="0"/>
+              </a:defRPr>
+            </a:lvl2pPr>
+            <a:lvl3pPr algn="l" rtl="0" eaLnBrk="0" fontAlgn="base" hangingPunct="0">
+              <a:spcBef>
+                <a:spcPct val="0"/>
+              </a:spcBef>
+              <a:spcAft>
+                <a:spcPct val="0"/>
+              </a:spcAft>
+              <a:defRPr sz="3600" b="1">
+                <a:solidFill>
+                  <a:srgbClr val="CCECFF"/>
+                </a:solidFill>
+                <a:latin typeface="Calibri" pitchFamily="34" charset="0"/>
+                <a:cs typeface="Arial" pitchFamily="34" charset="0"/>
+              </a:defRPr>
+            </a:lvl3pPr>
+            <a:lvl4pPr algn="l" rtl="0" eaLnBrk="0" fontAlgn="base" hangingPunct="0">
+              <a:spcBef>
+                <a:spcPct val="0"/>
+              </a:spcBef>
+              <a:spcAft>
+                <a:spcPct val="0"/>
+              </a:spcAft>
+              <a:defRPr sz="3600" b="1">
+                <a:solidFill>
+                  <a:srgbClr val="CCECFF"/>
+                </a:solidFill>
+                <a:latin typeface="Calibri" pitchFamily="34" charset="0"/>
+                <a:cs typeface="Arial" pitchFamily="34" charset="0"/>
+              </a:defRPr>
+            </a:lvl4pPr>
+            <a:lvl5pPr algn="l" rtl="0" eaLnBrk="0" fontAlgn="base" hangingPunct="0">
+              <a:spcBef>
+                <a:spcPct val="0"/>
+              </a:spcBef>
+              <a:spcAft>
+                <a:spcPct val="0"/>
+              </a:spcAft>
+              <a:defRPr sz="3600" b="1">
+                <a:solidFill>
+                  <a:srgbClr val="CCECFF"/>
+                </a:solidFill>
+                <a:latin typeface="Calibri" pitchFamily="34" charset="0"/>
+                <a:cs typeface="Arial" pitchFamily="34" charset="0"/>
+              </a:defRPr>
+            </a:lvl5pPr>
+            <a:lvl6pPr marL="457200" algn="l" rtl="0" fontAlgn="base">
+              <a:spcBef>
+                <a:spcPct val="0"/>
+              </a:spcBef>
+              <a:spcAft>
+                <a:spcPct val="0"/>
+              </a:spcAft>
+              <a:defRPr sz="3600" b="1">
+                <a:solidFill>
+                  <a:srgbClr val="CCECFF"/>
+                </a:solidFill>
+                <a:latin typeface="Calibri" pitchFamily="34" charset="0"/>
+                <a:cs typeface="Arial" pitchFamily="34" charset="0"/>
+              </a:defRPr>
+            </a:lvl6pPr>
+            <a:lvl7pPr marL="914400" algn="l" rtl="0" fontAlgn="base">
+              <a:spcBef>
+                <a:spcPct val="0"/>
+              </a:spcBef>
+              <a:spcAft>
+                <a:spcPct val="0"/>
+              </a:spcAft>
+              <a:defRPr sz="3600" b="1">
+                <a:solidFill>
+                  <a:srgbClr val="CCECFF"/>
+                </a:solidFill>
+                <a:latin typeface="Calibri" pitchFamily="34" charset="0"/>
+                <a:cs typeface="Arial" pitchFamily="34" charset="0"/>
+              </a:defRPr>
+            </a:lvl7pPr>
+            <a:lvl8pPr marL="1371600" algn="l" rtl="0" fontAlgn="base">
+              <a:spcBef>
+                <a:spcPct val="0"/>
+              </a:spcBef>
+              <a:spcAft>
+                <a:spcPct val="0"/>
+              </a:spcAft>
+              <a:defRPr sz="3600" b="1">
+                <a:solidFill>
+                  <a:srgbClr val="CCECFF"/>
+                </a:solidFill>
+                <a:latin typeface="Calibri" pitchFamily="34" charset="0"/>
+                <a:cs typeface="Arial" pitchFamily="34" charset="0"/>
+              </a:defRPr>
+            </a:lvl8pPr>
+            <a:lvl9pPr marL="1828800" algn="l" rtl="0" fontAlgn="base">
+              <a:spcBef>
+                <a:spcPct val="0"/>
+              </a:spcBef>
+              <a:spcAft>
+                <a:spcPct val="0"/>
+              </a:spcAft>
+              <a:defRPr sz="3600" b="1">
+                <a:solidFill>
+                  <a:srgbClr val="CCECFF"/>
+                </a:solidFill>
+                <a:latin typeface="Calibri" pitchFamily="34" charset="0"/>
+                <a:cs typeface="Arial" pitchFamily="34" charset="0"/>
+              </a:defRPr>
+            </a:lvl9pPr>
+          </a:lstStyle>
+          <a:p>
+            <a:pPr>
+              <a:lnSpc>
+                <a:spcPts val="2267"/>
+              </a:lnSpc>
+            </a:pPr>
+            <a:endParaRPr lang="en-US" sz="4000" kern="0" dirty="0">
+              <a:solidFill>
+                <a:schemeClr val="tx2"/>
+              </a:solidFill>
+            </a:endParaRPr>
+          </a:p>
+          <a:p>
+            <a:pPr marL="0" marR="0" lvl="0" indent="0" algn="r" defTabSz="914400" rtl="1" eaLnBrk="0" fontAlgn="base" latinLnBrk="0" hangingPunct="0">
+              <a:lnSpc>
+                <a:spcPct val="100000"/>
+              </a:lnSpc>
+              <a:spcBef>
+                <a:spcPct val="0"/>
+              </a:spcBef>
+              <a:spcAft>
+                <a:spcPct val="0"/>
+              </a:spcAft>
+              <a:buClrTx/>
+              <a:buSzTx/>
+              <a:buFontTx/>
+              <a:buNone/>
+              <a:tabLst/>
+              <a:defRPr/>
+            </a:pPr>
+            <a:endParaRPr kumimoji="0" lang="he-IL" sz="1800" b="0" i="0" u="none" strike="noStrike" kern="0" cap="none" spc="0" normalizeH="0" baseline="0" noProof="0" dirty="0">
+              <a:ln>
+                <a:noFill/>
+              </a:ln>
+              <a:solidFill>
+                <a:srgbClr val="000000"/>
+              </a:solidFill>
+              <a:effectLst/>
+              <a:uLnTx/>
+              <a:uFillTx/>
+              <a:latin typeface="Calibri"/>
+              <a:ea typeface="+mj-ea"/>
+              <a:cs typeface="Arial"/>
+            </a:endParaRPr>
+          </a:p>
+        </p:txBody>
+      </p:sp>
+      <p:sp>
+        <p:nvSpPr>
+          <p:cNvPr id="9" name="Title 1"/>
+          <p:cNvSpPr txBox="1">
+            <a:spLocks/>
+          </p:cNvSpPr>
+          <p:nvPr/>
+        </p:nvSpPr>
+        <p:spPr>
+          <a:xfrm>
+            <a:off x="4196276" y="442494"/>
+            <a:ext cx="7757426" cy="1091954"/>
+          </a:xfrm>
+          <a:prstGeom prst="rect">
+            <a:avLst/>
+          </a:prstGeom>
+        </p:spPr>
+        <p:txBody>
+          <a:bodyPr/>
+          <a:lstStyle>
+            <a:lvl1pPr algn="l" rtl="0" eaLnBrk="0" fontAlgn="base" hangingPunct="0">
+              <a:spcBef>
+                <a:spcPct val="0"/>
+              </a:spcBef>
+              <a:spcAft>
+                <a:spcPct val="0"/>
+              </a:spcAft>
+              <a:defRPr sz="3600" b="1">
+                <a:solidFill>
+                  <a:srgbClr val="CCECFF"/>
+                </a:solidFill>
+                <a:latin typeface="+mj-lt"/>
+                <a:ea typeface="+mj-ea"/>
+                <a:cs typeface="+mj-cs"/>
+              </a:defRPr>
+            </a:lvl1pPr>
+            <a:lvl2pPr algn="l" rtl="0" eaLnBrk="0" fontAlgn="base" hangingPunct="0">
+              <a:spcBef>
+                <a:spcPct val="0"/>
+              </a:spcBef>
+              <a:spcAft>
+                <a:spcPct val="0"/>
+              </a:spcAft>
+              <a:defRPr sz="3600" b="1">
+                <a:solidFill>
+                  <a:srgbClr val="CCECFF"/>
+                </a:solidFill>
+                <a:latin typeface="Calibri" pitchFamily="34" charset="0"/>
+                <a:cs typeface="Arial" pitchFamily="34" charset="0"/>
+              </a:defRPr>
+            </a:lvl2pPr>
+            <a:lvl3pPr algn="l" rtl="0" eaLnBrk="0" fontAlgn="base" hangingPunct="0">
+              <a:spcBef>
+                <a:spcPct val="0"/>
+              </a:spcBef>
+              <a:spcAft>
+                <a:spcPct val="0"/>
+              </a:spcAft>
+              <a:defRPr sz="3600" b="1">
+                <a:solidFill>
+                  <a:srgbClr val="CCECFF"/>
+                </a:solidFill>
+                <a:latin typeface="Calibri" pitchFamily="34" charset="0"/>
+                <a:cs typeface="Arial" pitchFamily="34" charset="0"/>
+              </a:defRPr>
+            </a:lvl3pPr>
+            <a:lvl4pPr algn="l" rtl="0" eaLnBrk="0" fontAlgn="base" hangingPunct="0">
+              <a:spcBef>
+                <a:spcPct val="0"/>
+              </a:spcBef>
+              <a:spcAft>
+                <a:spcPct val="0"/>
+              </a:spcAft>
+              <a:defRPr sz="3600" b="1">
+                <a:solidFill>
+                  <a:srgbClr val="CCECFF"/>
+                </a:solidFill>
+                <a:latin typeface="Calibri" pitchFamily="34" charset="0"/>
+                <a:cs typeface="Arial" pitchFamily="34" charset="0"/>
+              </a:defRPr>
+            </a:lvl4pPr>
+            <a:lvl5pPr algn="l" rtl="0" eaLnBrk="0" fontAlgn="base" hangingPunct="0">
+              <a:spcBef>
+                <a:spcPct val="0"/>
+              </a:spcBef>
+              <a:spcAft>
+                <a:spcPct val="0"/>
+              </a:spcAft>
+              <a:defRPr sz="3600" b="1">
+                <a:solidFill>
+                  <a:srgbClr val="CCECFF"/>
+                </a:solidFill>
+                <a:latin typeface="Calibri" pitchFamily="34" charset="0"/>
+                <a:cs typeface="Arial" pitchFamily="34" charset="0"/>
+              </a:defRPr>
+            </a:lvl5pPr>
+            <a:lvl6pPr marL="457200" algn="l" rtl="0" fontAlgn="base">
+              <a:spcBef>
+                <a:spcPct val="0"/>
+              </a:spcBef>
+              <a:spcAft>
+                <a:spcPct val="0"/>
+              </a:spcAft>
+              <a:defRPr sz="3600" b="1">
+                <a:solidFill>
+                  <a:srgbClr val="CCECFF"/>
+                </a:solidFill>
+                <a:latin typeface="Calibri" pitchFamily="34" charset="0"/>
+                <a:cs typeface="Arial" pitchFamily="34" charset="0"/>
+              </a:defRPr>
+            </a:lvl6pPr>
+            <a:lvl7pPr marL="914400" algn="l" rtl="0" fontAlgn="base">
+              <a:spcBef>
+                <a:spcPct val="0"/>
+              </a:spcBef>
+              <a:spcAft>
+                <a:spcPct val="0"/>
+              </a:spcAft>
+              <a:defRPr sz="3600" b="1">
+                <a:solidFill>
+                  <a:srgbClr val="CCECFF"/>
+                </a:solidFill>
+                <a:latin typeface="Calibri" pitchFamily="34" charset="0"/>
+                <a:cs typeface="Arial" pitchFamily="34" charset="0"/>
+              </a:defRPr>
+            </a:lvl7pPr>
+            <a:lvl8pPr marL="1371600" algn="l" rtl="0" fontAlgn="base">
+              <a:spcBef>
+                <a:spcPct val="0"/>
+              </a:spcBef>
+              <a:spcAft>
+                <a:spcPct val="0"/>
+              </a:spcAft>
+              <a:defRPr sz="3600" b="1">
+                <a:solidFill>
+                  <a:srgbClr val="CCECFF"/>
+                </a:solidFill>
+                <a:latin typeface="Calibri" pitchFamily="34" charset="0"/>
+                <a:cs typeface="Arial" pitchFamily="34" charset="0"/>
+              </a:defRPr>
+            </a:lvl8pPr>
+            <a:lvl9pPr marL="1828800" algn="l" rtl="0" fontAlgn="base">
+              <a:spcBef>
+                <a:spcPct val="0"/>
+              </a:spcBef>
+              <a:spcAft>
+                <a:spcPct val="0"/>
+              </a:spcAft>
+              <a:defRPr sz="3600" b="1">
+                <a:solidFill>
+                  <a:srgbClr val="CCECFF"/>
+                </a:solidFill>
+                <a:latin typeface="Calibri" pitchFamily="34" charset="0"/>
+                <a:cs typeface="Arial" pitchFamily="34" charset="0"/>
+              </a:defRPr>
+            </a:lvl9pPr>
+          </a:lstStyle>
+          <a:p>
+            <a:pPr>
+              <a:lnSpc>
+                <a:spcPts val="2267"/>
+              </a:lnSpc>
+            </a:pPr>
+            <a:endParaRPr lang="en-US" sz="4000" kern="0" dirty="0">
+              <a:solidFill>
+                <a:schemeClr val="tx2"/>
+              </a:solidFill>
+            </a:endParaRPr>
+          </a:p>
+          <a:p>
+            <a:pPr marL="0" marR="0" lvl="0" indent="0" algn="r" defTabSz="914400" rtl="1" eaLnBrk="0" fontAlgn="base" latinLnBrk="0" hangingPunct="0">
+              <a:lnSpc>
+                <a:spcPct val="100000"/>
+              </a:lnSpc>
+              <a:spcBef>
+                <a:spcPct val="0"/>
+              </a:spcBef>
+              <a:spcAft>
+                <a:spcPct val="0"/>
+              </a:spcAft>
+              <a:buClrTx/>
+              <a:buSzTx/>
+              <a:buFontTx/>
+              <a:buNone/>
+              <a:tabLst/>
+              <a:defRPr/>
+            </a:pPr>
+            <a:r>
+              <a:rPr lang="he-IL" u="sng" kern="0" dirty="0" smtClean="0">
+                <a:solidFill>
+                  <a:schemeClr val="tx1"/>
+                </a:solidFill>
+                <a:latin typeface="Segoe UI Semibold" panose="020B0702040204020203" pitchFamily="34" charset="0"/>
+                <a:cs typeface="Segoe UI Semibold" panose="020B0702040204020203" pitchFamily="34" charset="0"/>
+              </a:rPr>
+              <a:t>מימוש הפרויקט</a:t>
+            </a:r>
+            <a:endParaRPr kumimoji="0" lang="he-IL" i="0" u="sng" strike="noStrike" kern="0" cap="none" spc="0" normalizeH="0" baseline="0" noProof="0" dirty="0">
+              <a:ln>
+                <a:noFill/>
+              </a:ln>
+              <a:solidFill>
+                <a:schemeClr val="tx1"/>
+              </a:solidFill>
+              <a:effectLst/>
+              <a:uLnTx/>
+              <a:uFillTx/>
+              <a:latin typeface="Segoe UI Semibold" panose="020B0702040204020203" pitchFamily="34" charset="0"/>
+              <a:cs typeface="Segoe UI Semibold" panose="020B0702040204020203" pitchFamily="34" charset="0"/>
+            </a:endParaRPr>
+          </a:p>
+        </p:txBody>
+      </p:sp>
+      <p:sp>
+        <p:nvSpPr>
+          <p:cNvPr id="2" name="TextBox 1"/>
+          <p:cNvSpPr txBox="1"/>
+          <p:nvPr/>
+        </p:nvSpPr>
+        <p:spPr>
+          <a:xfrm>
+            <a:off x="238298" y="1724759"/>
+            <a:ext cx="11715405" cy="3785652"/>
+          </a:xfrm>
+          <a:prstGeom prst="rect">
+            <a:avLst/>
+          </a:prstGeom>
+          <a:noFill/>
+        </p:spPr>
+        <p:txBody>
+          <a:bodyPr wrap="square" rtlCol="0">
+            <a:spAutoFit/>
+          </a:bodyPr>
+          <a:lstStyle/>
           <a:p>
             <a:pPr marL="342900" indent="-342900" algn="r" rtl="1">
               <a:buFont typeface="Arial" panose="020B0604020202020204" pitchFamily="34" charset="0"/>
               <a:buChar char="•"/>
             </a:pPr>
-            <a:endParaRPr lang="he-IL" sz="2400" kern="0" dirty="0" smtClean="0">
-              <a:latin typeface="Segoe UI Light" panose="020B0502040204020203" pitchFamily="34" charset="0"/>
-              <a:cs typeface="Segoe UI Light" panose="020B0502040204020203" pitchFamily="34" charset="0"/>
-            </a:endParaRPr>
+            <a:r>
+              <a:rPr lang="he-IL" sz="2400" kern="0" dirty="0">
+                <a:latin typeface="Segoe UI Light" panose="020B0502040204020203" pitchFamily="34" charset="0"/>
+                <a:cs typeface="Segoe UI Light" panose="020B0502040204020203" pitchFamily="34" charset="0"/>
+              </a:rPr>
+              <a:t>פיתחנו שרת קטן והוספנו אותו לאפליקצית האקדח, השרת מאזין לבקשות ומחזיר את המידע המאוחסן במסד הנתונים המקומי של </a:t>
+            </a:r>
+            <a:r>
+              <a:rPr lang="he-IL" sz="2400" kern="0" dirty="0" smtClean="0">
+                <a:latin typeface="Segoe UI Light" panose="020B0502040204020203" pitchFamily="34" charset="0"/>
+                <a:cs typeface="Segoe UI Light" panose="020B0502040204020203" pitchFamily="34" charset="0"/>
+              </a:rPr>
+              <a:t>האקדח</a:t>
+            </a:r>
           </a:p>
           <a:p>
             <a:pPr marL="342900" indent="-342900" algn="r" rtl="1">
               <a:buFont typeface="Arial" panose="020B0604020202020204" pitchFamily="34" charset="0"/>
               <a:buChar char="•"/>
             </a:pPr>
-            <a:r>
-              <a:rPr lang="he-IL" sz="2400" kern="0" dirty="0">
-                <a:latin typeface="Segoe UI Light" panose="020B0502040204020203" pitchFamily="34" charset="0"/>
-                <a:cs typeface="Segoe UI Light" panose="020B0502040204020203" pitchFamily="34" charset="0"/>
-              </a:rPr>
-              <a:t>נוסיף משיבי מיקום (</a:t>
-            </a:r>
-            <a:r>
-              <a:rPr lang="en-US" sz="2400" kern="0" dirty="0">
-                <a:latin typeface="Segoe UI Light" panose="020B0502040204020203" pitchFamily="34" charset="0"/>
-                <a:cs typeface="Segoe UI Light" panose="020B0502040204020203" pitchFamily="34" charset="0"/>
-              </a:rPr>
-              <a:t>GPS</a:t>
-            </a:r>
-            <a:r>
-              <a:rPr lang="he-IL" sz="2400" kern="0" dirty="0">
-                <a:latin typeface="Segoe UI Light" panose="020B0502040204020203" pitchFamily="34" charset="0"/>
-                <a:cs typeface="Segoe UI Light" panose="020B0502040204020203" pitchFamily="34" charset="0"/>
-              </a:rPr>
-              <a:t>) למחשבי השטח ונשלבם במערכות </a:t>
-            </a:r>
-            <a:r>
-              <a:rPr lang="he-IL" sz="2400" kern="0" dirty="0" smtClean="0">
-                <a:latin typeface="Segoe UI Light" panose="020B0502040204020203" pitchFamily="34" charset="0"/>
-                <a:cs typeface="Segoe UI Light" panose="020B0502040204020203" pitchFamily="34" charset="0"/>
-              </a:rPr>
-              <a:t>השו"ב</a:t>
-            </a:r>
             <a:endParaRPr lang="he-IL" sz="2400" kern="0" dirty="0">
               <a:latin typeface="Segoe UI Light" panose="020B0502040204020203" pitchFamily="34" charset="0"/>
               <a:cs typeface="Segoe UI Light" panose="020B0502040204020203" pitchFamily="34" charset="0"/>
             </a:endParaRPr>
           </a:p>
+          <a:p>
+            <a:pPr marL="342900" indent="-342900" algn="r" rtl="1">
+              <a:buFont typeface="Arial" panose="020B0604020202020204" pitchFamily="34" charset="0"/>
+              <a:buChar char="•"/>
+            </a:pPr>
+            <a:r>
+              <a:rPr lang="he-IL" sz="2400" kern="0" dirty="0" smtClean="0">
+                <a:latin typeface="Segoe UI Light" panose="020B0502040204020203" pitchFamily="34" charset="0"/>
+                <a:cs typeface="Segoe UI Light" panose="020B0502040204020203" pitchFamily="34" charset="0"/>
+              </a:rPr>
+              <a:t>פיתחנו אפליקצית דמו המדמה אקדח (</a:t>
+            </a:r>
+            <a:r>
+              <a:rPr lang="en-US" sz="2400" kern="0" dirty="0" smtClean="0">
+                <a:latin typeface="Segoe UI Light" panose="020B0502040204020203" pitchFamily="34" charset="0"/>
+                <a:cs typeface="Segoe UI Light" panose="020B0502040204020203" pitchFamily="34" charset="0"/>
+              </a:rPr>
+              <a:t>MOCK</a:t>
+            </a:r>
+            <a:r>
+              <a:rPr lang="he-IL" sz="2400" kern="0" dirty="0" smtClean="0">
+                <a:latin typeface="Segoe UI Light" panose="020B0502040204020203" pitchFamily="34" charset="0"/>
+                <a:cs typeface="Segoe UI Light" panose="020B0502040204020203" pitchFamily="34" charset="0"/>
+              </a:rPr>
+              <a:t>) למכשיר האנדרואיד שלנו לצורכי פיתוח ובדיקת מערכת השו"ב</a:t>
+            </a:r>
+          </a:p>
+          <a:p>
+            <a:pPr marL="342900" indent="-342900" algn="r" rtl="1">
+              <a:buFont typeface="Arial" panose="020B0604020202020204" pitchFamily="34" charset="0"/>
+              <a:buChar char="•"/>
+            </a:pPr>
+            <a:endParaRPr lang="he-IL" sz="2400" kern="0" dirty="0">
+              <a:latin typeface="Segoe UI Light" panose="020B0502040204020203" pitchFamily="34" charset="0"/>
+              <a:cs typeface="Segoe UI Light" panose="020B0502040204020203" pitchFamily="34" charset="0"/>
+            </a:endParaRPr>
+          </a:p>
+          <a:p>
+            <a:pPr marL="342900" indent="-342900" algn="r" rtl="1">
+              <a:buFont typeface="Arial" panose="020B0604020202020204" pitchFamily="34" charset="0"/>
+              <a:buChar char="•"/>
+            </a:pPr>
+            <a:r>
+              <a:rPr lang="he-IL" sz="2400" kern="0" dirty="0" smtClean="0">
+                <a:latin typeface="Segoe UI Light" panose="020B0502040204020203" pitchFamily="34" charset="0"/>
+                <a:cs typeface="Segoe UI Light" panose="020B0502040204020203" pitchFamily="34" charset="0"/>
+              </a:rPr>
+              <a:t>פיתחנו צד שרת ב-</a:t>
+            </a:r>
+            <a:r>
+              <a:rPr lang="en-US" sz="2400" kern="0" dirty="0" smtClean="0">
+                <a:latin typeface="Segoe UI Light" panose="020B0502040204020203" pitchFamily="34" charset="0"/>
+                <a:cs typeface="Segoe UI Light" panose="020B0502040204020203" pitchFamily="34" charset="0"/>
+              </a:rPr>
+              <a:t>Python</a:t>
+            </a:r>
+            <a:r>
+              <a:rPr lang="he-IL" sz="2400" kern="0" dirty="0" smtClean="0">
+                <a:latin typeface="Segoe UI Light" panose="020B0502040204020203" pitchFamily="34" charset="0"/>
+                <a:cs typeface="Segoe UI Light" panose="020B0502040204020203" pitchFamily="34" charset="0"/>
+              </a:rPr>
+              <a:t> שיהווה השרת המרכזי וינהל את מסד הנתונים המרכזי. </a:t>
+            </a:r>
+            <a:r>
+              <a:rPr lang="en-US" sz="2400" kern="0" dirty="0" smtClean="0">
+                <a:latin typeface="Segoe UI Light" panose="020B0502040204020203" pitchFamily="34" charset="0"/>
+                <a:cs typeface="Segoe UI Light" panose="020B0502040204020203" pitchFamily="34" charset="0"/>
+              </a:rPr>
+              <a:t/>
+            </a:r>
+            <a:br>
+              <a:rPr lang="en-US" sz="2400" kern="0" dirty="0" smtClean="0">
+                <a:latin typeface="Segoe UI Light" panose="020B0502040204020203" pitchFamily="34" charset="0"/>
+                <a:cs typeface="Segoe UI Light" panose="020B0502040204020203" pitchFamily="34" charset="0"/>
+              </a:rPr>
+            </a:br>
+            <a:r>
+              <a:rPr lang="he-IL" sz="2400" kern="0" dirty="0" smtClean="0">
+                <a:latin typeface="Segoe UI Light" panose="020B0502040204020203" pitchFamily="34" charset="0"/>
+                <a:cs typeface="Segoe UI Light" panose="020B0502040204020203" pitchFamily="34" charset="0"/>
+              </a:rPr>
+              <a:t>השרת יאזין לבקשות מערכות השו"ב, יעדכן ויחזיר מידע ע"פ דרישה</a:t>
+            </a:r>
+          </a:p>
+          <a:p>
+            <a:pPr algn="r" rtl="1"/>
+            <a:endParaRPr lang="he-IL" sz="2400" kern="0" dirty="0">
+              <a:latin typeface="Segoe UI Light" panose="020B0502040204020203" pitchFamily="34" charset="0"/>
+              <a:cs typeface="Segoe UI Light" panose="020B0502040204020203" pitchFamily="34" charset="0"/>
+            </a:endParaRPr>
+          </a:p>
+          <a:p>
+            <a:pPr marL="342900" indent="-342900" algn="r" rtl="1">
+              <a:buFont typeface="Arial" panose="020B0604020202020204" pitchFamily="34" charset="0"/>
+              <a:buChar char="•"/>
+            </a:pPr>
+            <a:r>
+              <a:rPr lang="he-IL" sz="2400" kern="0" dirty="0" smtClean="0">
+                <a:latin typeface="Segoe UI Light" panose="020B0502040204020203" pitchFamily="34" charset="0"/>
+                <a:cs typeface="Segoe UI Light" panose="020B0502040204020203" pitchFamily="34" charset="0"/>
+              </a:rPr>
+              <a:t>נממש את האלגוריתמים הנדרשים בהמשך</a:t>
+            </a:r>
+            <a:endParaRPr lang="he-IL" sz="2400" kern="0" dirty="0">
+              <a:latin typeface="Segoe UI Light" panose="020B0502040204020203" pitchFamily="34" charset="0"/>
+              <a:cs typeface="Segoe UI Light" panose="020B0502040204020203" pitchFamily="34" charset="0"/>
+            </a:endParaRPr>
+          </a:p>
         </p:txBody>
       </p:sp>
     </p:spTree>
     <p:extLst>
       <p:ext uri="{BB962C8B-B14F-4D97-AF65-F5344CB8AC3E}">
-        <p14:creationId xmlns:p14="http://schemas.microsoft.com/office/powerpoint/2010/main" val="1276184822"/>
+        <p14:creationId xmlns:p14="http://schemas.microsoft.com/office/powerpoint/2010/main" val="806502875"/>
       </p:ext>
     </p:extLst>
   </p:cSld>
@@ -11742,15 +11152,15 @@
         </p:nvSpPr>
         <p:spPr>
           <a:xfrm>
-            <a:off x="4196276" y="442494"/>
-            <a:ext cx="7757426" cy="1091954"/>
+            <a:off x="238298" y="840510"/>
+            <a:ext cx="11715403" cy="5246254"/>
           </a:xfrm>
           <a:prstGeom prst="rect">
             <a:avLst/>
           </a:prstGeom>
         </p:spPr>
         <p:txBody>
-          <a:bodyPr/>
+          <a:bodyPr anchor="ctr"/>
           <a:lstStyle>
             <a:lvl1pPr algn="l" rtl="0" eaLnBrk="0" fontAlgn="base" hangingPunct="0">
               <a:spcBef>
@@ -11895,14 +11305,14 @@
                 <a:spcPts val="2267"/>
               </a:lnSpc>
             </a:pPr>
-            <a:endParaRPr lang="en-US" sz="4000" kern="0" dirty="0">
+            <a:endParaRPr lang="en-US" sz="2800" kern="0" dirty="0">
               <a:solidFill>
                 <a:schemeClr val="tx2"/>
               </a:solidFill>
             </a:endParaRPr>
           </a:p>
           <a:p>
-            <a:pPr marL="0" marR="0" lvl="0" indent="0" algn="r" defTabSz="914400" rtl="1" eaLnBrk="0" fontAlgn="base" latinLnBrk="0" hangingPunct="0">
+            <a:pPr marL="0" marR="0" lvl="0" indent="0" algn="ctr" defTabSz="914400" rtl="1" eaLnBrk="0" fontAlgn="base" latinLnBrk="0" hangingPunct="0">
               <a:lnSpc>
                 <a:spcPct val="100000"/>
               </a:lnSpc>
@@ -11920,16 +11330,16 @@
               <a:defRPr/>
             </a:pPr>
             <a:r>
-              <a:rPr lang="he-IL" u="sng" kern="0" dirty="0" smtClean="0">
+              <a:rPr lang="he-IL" sz="7200" kern="0" dirty="0" smtClean="0">
                 <a:solidFill>
                   <a:schemeClr val="tx1"/>
                 </a:solidFill>
                 <a:latin typeface="Segoe UI Semibold" panose="020B0702040204020203" pitchFamily="34" charset="0"/>
                 <a:cs typeface="Segoe UI Semibold" panose="020B0702040204020203" pitchFamily="34" charset="0"/>
               </a:rPr>
-              <a:t>מימוש הפרויקט</a:t>
-            </a:r>
-            <a:endParaRPr kumimoji="0" lang="he-IL" i="0" u="sng" strike="noStrike" kern="0" cap="none" spc="0" normalizeH="0" baseline="0" noProof="0" dirty="0">
+              <a:t>סרטון הדגמה</a:t>
+            </a:r>
+            <a:endParaRPr kumimoji="0" lang="he-IL" sz="7200" i="0" strike="noStrike" kern="0" cap="none" spc="0" normalizeH="0" baseline="0" noProof="0" dirty="0">
               <a:ln>
                 <a:noFill/>
               </a:ln>
@@ -11945,222 +11355,10 @@
           </a:p>
         </p:txBody>
       </p:sp>
-      <p:sp>
-        <p:nvSpPr>
-          <p:cNvPr id="2" name="TextBox 1"/>
-          <p:cNvSpPr txBox="1"/>
-          <p:nvPr/>
-        </p:nvSpPr>
-        <p:spPr>
-          <a:xfrm>
-            <a:off x="238298" y="1724759"/>
-            <a:ext cx="11715405" cy="4524315"/>
-          </a:xfrm>
-          <a:prstGeom prst="rect">
-            <a:avLst/>
-          </a:prstGeom>
-          <a:noFill/>
-        </p:spPr>
-        <p:txBody>
-          <a:bodyPr wrap="square" rtlCol="0">
-            <a:spAutoFit/>
-          </a:bodyPr>
-          <a:lstStyle/>
-          <a:p>
-            <a:pPr marL="342900" indent="-342900" algn="r" rtl="1">
-              <a:buFont typeface="Arial" panose="020B0604020202020204" pitchFamily="34" charset="0"/>
-              <a:buChar char="•"/>
-            </a:pPr>
-            <a:r>
-              <a:rPr lang="he-IL" sz="2400" kern="0" dirty="0">
-                <a:latin typeface="Segoe UI Light" panose="020B0502040204020203" pitchFamily="34" charset="0"/>
-                <a:cs typeface="Segoe UI Light" panose="020B0502040204020203" pitchFamily="34" charset="0"/>
-              </a:rPr>
-              <a:t>פיתחנו שרת קטן והוספנו אותו לאפליקצית האקדח, השרת מאזין לבקשות ומחזיר את המידע המאוחסן במסד הנתונים המקומי של </a:t>
-            </a:r>
-            <a:r>
-              <a:rPr lang="he-IL" sz="2400" kern="0" dirty="0" smtClean="0">
-                <a:latin typeface="Segoe UI Light" panose="020B0502040204020203" pitchFamily="34" charset="0"/>
-                <a:cs typeface="Segoe UI Light" panose="020B0502040204020203" pitchFamily="34" charset="0"/>
-              </a:rPr>
-              <a:t>האקדח</a:t>
-            </a:r>
-          </a:p>
-          <a:p>
-            <a:pPr marL="342900" indent="-342900" algn="r" rtl="1">
-              <a:buFont typeface="Arial" panose="020B0604020202020204" pitchFamily="34" charset="0"/>
-              <a:buChar char="•"/>
-            </a:pPr>
-            <a:endParaRPr lang="he-IL" sz="2400" kern="0" dirty="0">
-              <a:latin typeface="Segoe UI Light" panose="020B0502040204020203" pitchFamily="34" charset="0"/>
-              <a:cs typeface="Segoe UI Light" panose="020B0502040204020203" pitchFamily="34" charset="0"/>
-            </a:endParaRPr>
-          </a:p>
-          <a:p>
-            <a:pPr marL="342900" indent="-342900" algn="r" rtl="1">
-              <a:buFont typeface="Arial" panose="020B0604020202020204" pitchFamily="34" charset="0"/>
-              <a:buChar char="•"/>
-            </a:pPr>
-            <a:r>
-              <a:rPr lang="he-IL" sz="2400" kern="0" dirty="0" smtClean="0">
-                <a:latin typeface="Segoe UI Light" panose="020B0502040204020203" pitchFamily="34" charset="0"/>
-                <a:cs typeface="Segoe UI Light" panose="020B0502040204020203" pitchFamily="34" charset="0"/>
-              </a:rPr>
-              <a:t>פיתחנו אפליקצית דמו המדמה אקדח (</a:t>
-            </a:r>
-            <a:r>
-              <a:rPr lang="en-US" sz="2400" kern="0" dirty="0" smtClean="0">
-                <a:latin typeface="Segoe UI Light" panose="020B0502040204020203" pitchFamily="34" charset="0"/>
-                <a:cs typeface="Segoe UI Light" panose="020B0502040204020203" pitchFamily="34" charset="0"/>
-              </a:rPr>
-              <a:t>MOCK</a:t>
-            </a:r>
-            <a:r>
-              <a:rPr lang="he-IL" sz="2400" kern="0" dirty="0" smtClean="0">
-                <a:latin typeface="Segoe UI Light" panose="020B0502040204020203" pitchFamily="34" charset="0"/>
-                <a:cs typeface="Segoe UI Light" panose="020B0502040204020203" pitchFamily="34" charset="0"/>
-              </a:rPr>
-              <a:t>) למכשיר האנדרואיד שלנו לצורכי פיתוח ובדיקת מערכת השו"ב</a:t>
-            </a:r>
-          </a:p>
-          <a:p>
-            <a:pPr marL="342900" indent="-342900" algn="r" rtl="1">
-              <a:buFont typeface="Arial" panose="020B0604020202020204" pitchFamily="34" charset="0"/>
-              <a:buChar char="•"/>
-            </a:pPr>
-            <a:endParaRPr lang="he-IL" sz="2400" kern="0" dirty="0">
-              <a:latin typeface="Segoe UI Light" panose="020B0502040204020203" pitchFamily="34" charset="0"/>
-              <a:cs typeface="Segoe UI Light" panose="020B0502040204020203" pitchFamily="34" charset="0"/>
-            </a:endParaRPr>
-          </a:p>
-          <a:p>
-            <a:pPr marL="342900" indent="-342900" algn="r" rtl="1">
-              <a:buFont typeface="Arial" panose="020B0604020202020204" pitchFamily="34" charset="0"/>
-              <a:buChar char="•"/>
-            </a:pPr>
-            <a:r>
-              <a:rPr lang="he-IL" sz="2400" kern="0" dirty="0" smtClean="0">
-                <a:latin typeface="Segoe UI Light" panose="020B0502040204020203" pitchFamily="34" charset="0"/>
-                <a:cs typeface="Segoe UI Light" panose="020B0502040204020203" pitchFamily="34" charset="0"/>
-              </a:rPr>
-              <a:t>פיתחנו צד שרת ב-</a:t>
-            </a:r>
-            <a:r>
-              <a:rPr lang="en-US" sz="2400" kern="0" dirty="0" smtClean="0">
-                <a:latin typeface="Segoe UI Light" panose="020B0502040204020203" pitchFamily="34" charset="0"/>
-                <a:cs typeface="Segoe UI Light" panose="020B0502040204020203" pitchFamily="34" charset="0"/>
-              </a:rPr>
-              <a:t>Python</a:t>
-            </a:r>
-            <a:r>
-              <a:rPr lang="he-IL" sz="2400" kern="0" dirty="0" smtClean="0">
-                <a:latin typeface="Segoe UI Light" panose="020B0502040204020203" pitchFamily="34" charset="0"/>
-                <a:cs typeface="Segoe UI Light" panose="020B0502040204020203" pitchFamily="34" charset="0"/>
-              </a:rPr>
-              <a:t> שיהווה השרת המרכזי וינהל את מסד הנתונים המרכזי. </a:t>
-            </a:r>
-            <a:r>
-              <a:rPr lang="en-US" sz="2400" kern="0" dirty="0" smtClean="0">
-                <a:latin typeface="Segoe UI Light" panose="020B0502040204020203" pitchFamily="34" charset="0"/>
-                <a:cs typeface="Segoe UI Light" panose="020B0502040204020203" pitchFamily="34" charset="0"/>
-              </a:rPr>
-              <a:t/>
-            </a:r>
-            <a:br>
-              <a:rPr lang="en-US" sz="2400" kern="0" dirty="0" smtClean="0">
-                <a:latin typeface="Segoe UI Light" panose="020B0502040204020203" pitchFamily="34" charset="0"/>
-                <a:cs typeface="Segoe UI Light" panose="020B0502040204020203" pitchFamily="34" charset="0"/>
-              </a:rPr>
-            </a:br>
-            <a:r>
-              <a:rPr lang="he-IL" sz="2400" kern="0" dirty="0" smtClean="0">
-                <a:latin typeface="Segoe UI Light" panose="020B0502040204020203" pitchFamily="34" charset="0"/>
-                <a:cs typeface="Segoe UI Light" panose="020B0502040204020203" pitchFamily="34" charset="0"/>
-              </a:rPr>
-              <a:t>השרת יאזין לבקשות מערכות השו"ב, יעדכן ויחזיר מידע ע"פ דרישה</a:t>
-            </a:r>
-          </a:p>
-          <a:p>
-            <a:pPr marL="342900" indent="-342900" algn="r" rtl="1">
-              <a:buFont typeface="Arial" panose="020B0604020202020204" pitchFamily="34" charset="0"/>
-              <a:buChar char="•"/>
-            </a:pPr>
-            <a:endParaRPr lang="he-IL" sz="2400" kern="0" dirty="0">
-              <a:latin typeface="Segoe UI Light" panose="020B0502040204020203" pitchFamily="34" charset="0"/>
-              <a:cs typeface="Segoe UI Light" panose="020B0502040204020203" pitchFamily="34" charset="0"/>
-            </a:endParaRPr>
-          </a:p>
-          <a:p>
-            <a:pPr marL="342900" indent="-342900" algn="r" rtl="1">
-              <a:buFont typeface="Arial" panose="020B0604020202020204" pitchFamily="34" charset="0"/>
-              <a:buChar char="•"/>
-            </a:pPr>
-            <a:r>
-              <a:rPr lang="he-IL" sz="2400" kern="0" dirty="0" smtClean="0">
-                <a:latin typeface="Segoe UI Light" panose="020B0502040204020203" pitchFamily="34" charset="0"/>
-                <a:cs typeface="Segoe UI Light" panose="020B0502040204020203" pitchFamily="34" charset="0"/>
-              </a:rPr>
-              <a:t>פיתחנו צד לקוח ב-</a:t>
-            </a:r>
-            <a:r>
-              <a:rPr lang="en-US" sz="2400" kern="0" dirty="0" smtClean="0">
-                <a:latin typeface="Segoe UI Light" panose="020B0502040204020203" pitchFamily="34" charset="0"/>
-                <a:cs typeface="Segoe UI Light" panose="020B0502040204020203" pitchFamily="34" charset="0"/>
-              </a:rPr>
-              <a:t>Python</a:t>
-            </a:r>
-            <a:r>
-              <a:rPr lang="he-IL" sz="2400" kern="0" dirty="0" smtClean="0">
-                <a:latin typeface="Segoe UI Light" panose="020B0502040204020203" pitchFamily="34" charset="0"/>
-                <a:cs typeface="Segoe UI Light" panose="020B0502040204020203" pitchFamily="34" charset="0"/>
-              </a:rPr>
-              <a:t> (</a:t>
-            </a:r>
-            <a:r>
-              <a:rPr lang="en-US" sz="2400" kern="0" dirty="0" smtClean="0">
-                <a:latin typeface="Segoe UI Light" panose="020B0502040204020203" pitchFamily="34" charset="0"/>
-                <a:cs typeface="Segoe UI Light" panose="020B0502040204020203" pitchFamily="34" charset="0"/>
-              </a:rPr>
-              <a:t>MOCK</a:t>
-            </a:r>
-            <a:r>
-              <a:rPr lang="he-IL" sz="2400" kern="0" dirty="0" smtClean="0">
-                <a:latin typeface="Segoe UI Light" panose="020B0502040204020203" pitchFamily="34" charset="0"/>
-                <a:cs typeface="Segoe UI Light" panose="020B0502040204020203" pitchFamily="34" charset="0"/>
-              </a:rPr>
-              <a:t>) לצורכי פיתוח ובדיקת השרת</a:t>
-            </a:r>
-          </a:p>
-          <a:p>
-            <a:pPr algn="r" rtl="1"/>
-            <a:endParaRPr lang="he-IL" sz="2400" kern="0" dirty="0">
-              <a:latin typeface="Segoe UI Light" panose="020B0502040204020203" pitchFamily="34" charset="0"/>
-              <a:cs typeface="Segoe UI Light" panose="020B0502040204020203" pitchFamily="34" charset="0"/>
-            </a:endParaRPr>
-          </a:p>
-          <a:p>
-            <a:pPr marL="342900" indent="-342900" algn="r" rtl="1">
-              <a:buFont typeface="Arial" panose="020B0604020202020204" pitchFamily="34" charset="0"/>
-              <a:buChar char="•"/>
-            </a:pPr>
-            <a:r>
-              <a:rPr lang="he-IL" sz="2400" kern="0" dirty="0" smtClean="0">
-                <a:latin typeface="Segoe UI Light" panose="020B0502040204020203" pitchFamily="34" charset="0"/>
-                <a:cs typeface="Segoe UI Light" panose="020B0502040204020203" pitchFamily="34" charset="0"/>
-              </a:rPr>
-              <a:t>נממש את האלגוריתמים הנדרשים בהמשך</a:t>
-            </a:r>
-            <a:endParaRPr lang="he-IL" sz="2400" kern="0" dirty="0">
-              <a:latin typeface="Segoe UI Light" panose="020B0502040204020203" pitchFamily="34" charset="0"/>
-              <a:cs typeface="Segoe UI Light" panose="020B0502040204020203" pitchFamily="34" charset="0"/>
-            </a:endParaRPr>
-          </a:p>
-        </p:txBody>
-      </p:sp>
     </p:spTree>
     <p:extLst>
       <p:ext uri="{BB962C8B-B14F-4D97-AF65-F5344CB8AC3E}">
-        <p14:creationId xmlns:p14="http://schemas.microsoft.com/office/powerpoint/2010/main" val="806502875"/>
+        <p14:creationId xmlns:p14="http://schemas.microsoft.com/office/powerpoint/2010/main" val="1969894861"/>
       </p:ext>
     </p:extLst>
   </p:cSld>
@@ -12203,7 +11401,7 @@
           <p:nvPr/>
         </p:nvPicPr>
         <p:blipFill rotWithShape="1">
-          <a:blip r:embed="rId2" cstate="screen">
+          <a:blip r:embed="rId3" cstate="screen">
             <a:extLst>
               <a:ext uri="{28A0092B-C50C-407E-A947-70E740481C1C}">
                 <a14:useLocalDpi xmlns:a14="http://schemas.microsoft.com/office/drawing/2010/main"/>
@@ -12519,15 +11717,15 @@
         </p:nvSpPr>
         <p:spPr>
           <a:xfrm>
-            <a:off x="238298" y="840510"/>
-            <a:ext cx="11715403" cy="5246254"/>
+            <a:off x="4196276" y="442494"/>
+            <a:ext cx="7757426" cy="1091954"/>
           </a:xfrm>
           <a:prstGeom prst="rect">
             <a:avLst/>
           </a:prstGeom>
         </p:spPr>
         <p:txBody>
-          <a:bodyPr anchor="ctr"/>
+          <a:bodyPr/>
           <a:lstStyle>
             <a:lvl1pPr algn="l" rtl="0" eaLnBrk="0" fontAlgn="base" hangingPunct="0">
               <a:spcBef>
@@ -12672,14 +11870,14 @@
                 <a:spcPts val="2267"/>
               </a:lnSpc>
             </a:pPr>
-            <a:endParaRPr lang="en-US" sz="2800" kern="0" dirty="0">
+            <a:endParaRPr lang="en-US" sz="4000" kern="0" dirty="0">
               <a:solidFill>
                 <a:schemeClr val="tx2"/>
               </a:solidFill>
             </a:endParaRPr>
           </a:p>
           <a:p>
-            <a:pPr marL="0" marR="0" lvl="0" indent="0" algn="ctr" defTabSz="914400" rtl="1" eaLnBrk="0" fontAlgn="base" latinLnBrk="0" hangingPunct="0">
+            <a:pPr marL="0" marR="0" lvl="0" indent="0" algn="r" defTabSz="914400" rtl="1" eaLnBrk="0" fontAlgn="base" latinLnBrk="0" hangingPunct="0">
               <a:lnSpc>
                 <a:spcPct val="100000"/>
               </a:lnSpc>
@@ -12697,16 +11895,16 @@
               <a:defRPr/>
             </a:pPr>
             <a:r>
-              <a:rPr lang="he-IL" sz="7200" kern="0" dirty="0" smtClean="0">
+              <a:rPr lang="he-IL" u="sng" kern="0" dirty="0" smtClean="0">
                 <a:solidFill>
                   <a:schemeClr val="tx1"/>
                 </a:solidFill>
                 <a:latin typeface="Segoe UI Semibold" panose="020B0702040204020203" pitchFamily="34" charset="0"/>
                 <a:cs typeface="Segoe UI Semibold" panose="020B0702040204020203" pitchFamily="34" charset="0"/>
               </a:rPr>
-              <a:t>סרטון הדגמה</a:t>
-            </a:r>
-            <a:endParaRPr kumimoji="0" lang="he-IL" sz="7200" i="0" strike="noStrike" kern="0" cap="none" spc="0" normalizeH="0" baseline="0" noProof="0" dirty="0">
+              <a:t>סיכום ההדגמה</a:t>
+            </a:r>
+            <a:endParaRPr kumimoji="0" lang="he-IL" i="0" u="sng" strike="noStrike" kern="0" cap="none" spc="0" normalizeH="0" baseline="0" noProof="0" dirty="0">
               <a:ln>
                 <a:noFill/>
               </a:ln>
@@ -12722,10 +11920,251 @@
           </a:p>
         </p:txBody>
       </p:sp>
+      <p:sp>
+        <p:nvSpPr>
+          <p:cNvPr id="2" name="TextBox 1"/>
+          <p:cNvSpPr txBox="1"/>
+          <p:nvPr/>
+        </p:nvSpPr>
+        <p:spPr>
+          <a:xfrm>
+            <a:off x="238298" y="1724759"/>
+            <a:ext cx="11715405" cy="4524315"/>
+          </a:xfrm>
+          <a:prstGeom prst="rect">
+            <a:avLst/>
+          </a:prstGeom>
+          <a:noFill/>
+        </p:spPr>
+        <p:txBody>
+          <a:bodyPr wrap="square" rtlCol="0">
+            <a:spAutoFit/>
+          </a:bodyPr>
+          <a:lstStyle/>
+          <a:p>
+            <a:pPr marL="342900" indent="-342900" algn="r" rtl="1">
+              <a:buFont typeface="Arial" panose="020B0604020202020204" pitchFamily="34" charset="0"/>
+              <a:buChar char="•"/>
+            </a:pPr>
+            <a:r>
+              <a:rPr lang="he-IL" sz="2400" kern="0" dirty="0" smtClean="0">
+                <a:latin typeface="Segoe UI Light" panose="020B0502040204020203" pitchFamily="34" charset="0"/>
+                <a:cs typeface="Segoe UI Light" panose="020B0502040204020203" pitchFamily="34" charset="0"/>
+              </a:rPr>
+              <a:t>הראינו דגימה של האקדח</a:t>
+            </a:r>
+          </a:p>
+          <a:p>
+            <a:pPr marL="342900" indent="-342900" algn="r" rtl="1">
+              <a:buFont typeface="Arial" panose="020B0604020202020204" pitchFamily="34" charset="0"/>
+              <a:buChar char="•"/>
+            </a:pPr>
+            <a:r>
+              <a:rPr lang="he-IL" sz="2400" kern="0" dirty="0" smtClean="0">
+                <a:latin typeface="Segoe UI Light" panose="020B0502040204020203" pitchFamily="34" charset="0"/>
+                <a:cs typeface="Segoe UI Light" panose="020B0502040204020203" pitchFamily="34" charset="0"/>
+              </a:rPr>
+              <a:t>הראינו חיבור של אנטנת ה</a:t>
+            </a:r>
+            <a:r>
+              <a:rPr lang="en-US" sz="2400" kern="0" dirty="0" smtClean="0">
+                <a:latin typeface="Segoe UI Light" panose="020B0502040204020203" pitchFamily="34" charset="0"/>
+                <a:cs typeface="Segoe UI Light" panose="020B0502040204020203" pitchFamily="34" charset="0"/>
+              </a:rPr>
+              <a:t>Wi-Fi</a:t>
+            </a:r>
+            <a:r>
+              <a:rPr lang="he-IL" sz="2400" kern="0" dirty="0" smtClean="0">
+                <a:latin typeface="Segoe UI Light" panose="020B0502040204020203" pitchFamily="34" charset="0"/>
+                <a:cs typeface="Segoe UI Light" panose="020B0502040204020203" pitchFamily="34" charset="0"/>
+              </a:rPr>
+              <a:t> לבקר ה</a:t>
+            </a:r>
+            <a:r>
+              <a:rPr lang="en-US" sz="2400" kern="0" dirty="0" smtClean="0">
+                <a:latin typeface="Segoe UI Light" panose="020B0502040204020203" pitchFamily="34" charset="0"/>
+                <a:cs typeface="Segoe UI Light" panose="020B0502040204020203" pitchFamily="34" charset="0"/>
+              </a:rPr>
+              <a:t>CompuLab</a:t>
+            </a:r>
+            <a:r>
+              <a:rPr lang="he-IL" sz="2400" kern="0" dirty="0" smtClean="0">
+                <a:latin typeface="Segoe UI Light" panose="020B0502040204020203" pitchFamily="34" charset="0"/>
+                <a:cs typeface="Segoe UI Light" panose="020B0502040204020203" pitchFamily="34" charset="0"/>
+              </a:rPr>
+              <a:t> באקדח</a:t>
+            </a:r>
+          </a:p>
+          <a:p>
+            <a:pPr marL="342900" indent="-342900" algn="r" rtl="1">
+              <a:buFont typeface="Arial" panose="020B0604020202020204" pitchFamily="34" charset="0"/>
+              <a:buChar char="•"/>
+            </a:pPr>
+            <a:r>
+              <a:rPr lang="he-IL" sz="2400" kern="0" dirty="0" smtClean="0">
+                <a:latin typeface="Segoe UI Light" panose="020B0502040204020203" pitchFamily="34" charset="0"/>
+                <a:cs typeface="Segoe UI Light" panose="020B0502040204020203" pitchFamily="34" charset="0"/>
+              </a:rPr>
+              <a:t>הראינו הפעלה של מערכת השו"ב עם הפונקציונאליות הקיימת עד כה</a:t>
+            </a:r>
+            <a:r>
+              <a:rPr lang="en-US" sz="2400" kern="0" dirty="0" smtClean="0">
+                <a:latin typeface="Segoe UI Light" panose="020B0502040204020203" pitchFamily="34" charset="0"/>
+                <a:cs typeface="Segoe UI Light" panose="020B0502040204020203" pitchFamily="34" charset="0"/>
+              </a:rPr>
+              <a:t> </a:t>
+            </a:r>
+            <a:endParaRPr lang="he-IL" sz="2400" kern="0" dirty="0" smtClean="0">
+              <a:latin typeface="Segoe UI Light" panose="020B0502040204020203" pitchFamily="34" charset="0"/>
+              <a:cs typeface="Segoe UI Light" panose="020B0502040204020203" pitchFamily="34" charset="0"/>
+            </a:endParaRPr>
+          </a:p>
+          <a:p>
+            <a:pPr marL="342900" indent="-342900" algn="r" rtl="1">
+              <a:buFont typeface="Arial" panose="020B0604020202020204" pitchFamily="34" charset="0"/>
+              <a:buChar char="•"/>
+            </a:pPr>
+            <a:r>
+              <a:rPr lang="he-IL" sz="2400" kern="0" dirty="0" smtClean="0">
+                <a:latin typeface="Segoe UI Light" panose="020B0502040204020203" pitchFamily="34" charset="0"/>
+                <a:cs typeface="Segoe UI Light" panose="020B0502040204020203" pitchFamily="34" charset="0"/>
+              </a:rPr>
+              <a:t>הראינו הפעלה של </a:t>
+            </a:r>
+            <a:r>
+              <a:rPr lang="en-US" sz="2400" kern="0" dirty="0" smtClean="0">
+                <a:latin typeface="Segoe UI Light" panose="020B0502040204020203" pitchFamily="34" charset="0"/>
+                <a:cs typeface="Segoe UI Light" panose="020B0502040204020203" pitchFamily="34" charset="0"/>
+              </a:rPr>
+              <a:t>HotSpot</a:t>
+            </a:r>
+            <a:endParaRPr lang="he-IL" sz="2400" kern="0" dirty="0">
+              <a:latin typeface="Segoe UI Light" panose="020B0502040204020203" pitchFamily="34" charset="0"/>
+              <a:cs typeface="Segoe UI Light" panose="020B0502040204020203" pitchFamily="34" charset="0"/>
+            </a:endParaRPr>
+          </a:p>
+          <a:p>
+            <a:pPr marL="342900" indent="-342900" algn="r" rtl="1">
+              <a:buFont typeface="Arial" panose="020B0604020202020204" pitchFamily="34" charset="0"/>
+              <a:buChar char="•"/>
+            </a:pPr>
+            <a:r>
+              <a:rPr lang="he-IL" sz="2400" kern="0" dirty="0" smtClean="0">
+                <a:latin typeface="Segoe UI Light" panose="020B0502040204020203" pitchFamily="34" charset="0"/>
+                <a:cs typeface="Segoe UI Light" panose="020B0502040204020203" pitchFamily="34" charset="0"/>
+              </a:rPr>
+              <a:t>חיבור של סמארטפון עם אפליקצית הדמו שפיתחנו</a:t>
+            </a:r>
+          </a:p>
+          <a:p>
+            <a:pPr marL="342900" indent="-342900" algn="r" rtl="1">
+              <a:buFont typeface="Arial" panose="020B0604020202020204" pitchFamily="34" charset="0"/>
+              <a:buChar char="•"/>
+            </a:pPr>
+            <a:r>
+              <a:rPr lang="he-IL" sz="2400" kern="0" dirty="0" smtClean="0">
+                <a:latin typeface="Segoe UI Light" panose="020B0502040204020203" pitchFamily="34" charset="0"/>
+                <a:cs typeface="Segoe UI Light" panose="020B0502040204020203" pitchFamily="34" charset="0"/>
+              </a:rPr>
+              <a:t>שליפת נתונים באמצעות </a:t>
+            </a:r>
+            <a:r>
+              <a:rPr lang="he-IL" sz="2400" kern="0" dirty="0" smtClean="0">
+                <a:latin typeface="Segoe UI Light" panose="020B0502040204020203" pitchFamily="34" charset="0"/>
+                <a:cs typeface="Segoe UI Light" panose="020B0502040204020203" pitchFamily="34" charset="0"/>
+              </a:rPr>
+              <a:t>הדפדפן</a:t>
+            </a:r>
+          </a:p>
+          <a:p>
+            <a:pPr marL="342900" indent="-342900" algn="r" rtl="1">
+              <a:buFont typeface="Arial" panose="020B0604020202020204" pitchFamily="34" charset="0"/>
+              <a:buChar char="•"/>
+            </a:pPr>
+            <a:endParaRPr lang="he-IL" sz="2400" kern="0" dirty="0" smtClean="0">
+              <a:latin typeface="Segoe UI Light" panose="020B0502040204020203" pitchFamily="34" charset="0"/>
+              <a:cs typeface="Segoe UI Light" panose="020B0502040204020203" pitchFamily="34" charset="0"/>
+            </a:endParaRPr>
+          </a:p>
+          <a:p>
+            <a:pPr marL="342900" indent="-342900" algn="r" rtl="1">
+              <a:buFont typeface="Arial" panose="020B0604020202020204" pitchFamily="34" charset="0"/>
+              <a:buChar char="•"/>
+            </a:pPr>
+            <a:r>
+              <a:rPr lang="he-IL" sz="2400" kern="0" dirty="0" smtClean="0">
+                <a:latin typeface="Segoe UI Light" panose="020B0502040204020203" pitchFamily="34" charset="0"/>
+                <a:cs typeface="Segoe UI Light" panose="020B0502040204020203" pitchFamily="34" charset="0"/>
+              </a:rPr>
+              <a:t>הראינו את צד השרת המרכזי הקיים עד כה</a:t>
+            </a:r>
+          </a:p>
+          <a:p>
+            <a:pPr marL="342900" indent="-342900" algn="r" rtl="1">
+              <a:buFont typeface="Arial" panose="020B0604020202020204" pitchFamily="34" charset="0"/>
+              <a:buChar char="•"/>
+            </a:pPr>
+            <a:r>
+              <a:rPr lang="he-IL" sz="2400" kern="0" dirty="0" smtClean="0">
+                <a:latin typeface="Segoe UI Light" panose="020B0502040204020203" pitchFamily="34" charset="0"/>
+                <a:cs typeface="Segoe UI Light" panose="020B0502040204020203" pitchFamily="34" charset="0"/>
+              </a:rPr>
+              <a:t>הראינו שליחת נתונים ע"י </a:t>
+            </a:r>
+            <a:r>
+              <a:rPr lang="en-US" sz="2400" kern="0" dirty="0" smtClean="0">
+                <a:latin typeface="Segoe UI Light" panose="020B0502040204020203" pitchFamily="34" charset="0"/>
+                <a:cs typeface="Segoe UI Light" panose="020B0502040204020203" pitchFamily="34" charset="0"/>
+              </a:rPr>
+              <a:t>Client</a:t>
+            </a:r>
+            <a:r>
+              <a:rPr lang="he-IL" sz="2400" kern="0" dirty="0" smtClean="0">
+                <a:latin typeface="Segoe UI Light" panose="020B0502040204020203" pitchFamily="34" charset="0"/>
+                <a:cs typeface="Segoe UI Light" panose="020B0502040204020203" pitchFamily="34" charset="0"/>
+              </a:rPr>
+              <a:t> שפיתחנו לצורכי פיתוח ובדיקות</a:t>
+            </a:r>
+          </a:p>
+          <a:p>
+            <a:pPr marL="342900" indent="-342900" algn="r" rtl="1">
+              <a:buFont typeface="Arial" panose="020B0604020202020204" pitchFamily="34" charset="0"/>
+              <a:buChar char="•"/>
+            </a:pPr>
+            <a:r>
+              <a:rPr lang="he-IL" sz="2400" kern="0" dirty="0" smtClean="0">
+                <a:latin typeface="Segoe UI Light" panose="020B0502040204020203" pitchFamily="34" charset="0"/>
+                <a:cs typeface="Segoe UI Light" panose="020B0502040204020203" pitchFamily="34" charset="0"/>
+              </a:rPr>
+              <a:t>הראינו הכנסה של נתונים למסד הנתונים המרכזי</a:t>
+            </a:r>
+          </a:p>
+          <a:p>
+            <a:pPr marL="342900" indent="-342900" algn="r" rtl="1">
+              <a:buFont typeface="Arial" panose="020B0604020202020204" pitchFamily="34" charset="0"/>
+              <a:buChar char="•"/>
+            </a:pPr>
+            <a:endParaRPr lang="he-IL" sz="2400" kern="0" dirty="0" smtClean="0">
+              <a:latin typeface="Segoe UI Light" panose="020B0502040204020203" pitchFamily="34" charset="0"/>
+              <a:cs typeface="Segoe UI Light" panose="020B0502040204020203" pitchFamily="34" charset="0"/>
+            </a:endParaRPr>
+          </a:p>
+          <a:p>
+            <a:pPr marL="342900" indent="-342900" algn="r" rtl="1">
+              <a:buFont typeface="Arial" panose="020B0604020202020204" pitchFamily="34" charset="0"/>
+              <a:buChar char="•"/>
+            </a:pPr>
+            <a:endParaRPr lang="he-IL" sz="2400" kern="0" dirty="0">
+              <a:latin typeface="Segoe UI Light" panose="020B0502040204020203" pitchFamily="34" charset="0"/>
+              <a:cs typeface="Segoe UI Light" panose="020B0502040204020203" pitchFamily="34" charset="0"/>
+            </a:endParaRPr>
+          </a:p>
+        </p:txBody>
+      </p:sp>
     </p:spTree>
     <p:extLst>
       <p:ext uri="{BB962C8B-B14F-4D97-AF65-F5344CB8AC3E}">
-        <p14:creationId xmlns:p14="http://schemas.microsoft.com/office/powerpoint/2010/main" val="1969894861"/>
+        <p14:creationId xmlns:p14="http://schemas.microsoft.com/office/powerpoint/2010/main" val="824214340"/>
       </p:ext>
     </p:extLst>
   </p:cSld>

</xml_diff>